<commit_message>
Updating the presentation file.
- Added a presentation for LibreOffice
</commit_message>
<xml_diff>
--- a/MongoDB Tips and Advance Features.pptx
+++ b/MongoDB Tips and Advance Features.pptx
@@ -208,7 +208,7 @@
             <a:fld id="{98D74999-3FB0-41B5-A976-1179E7AAE147}" type="datetimeFigureOut">
               <a:rPr lang="en-US" smtClean="0"/>
               <a:pPr/>
-              <a:t>6/18/2016</a:t>
+              <a:t>6/19/2016</a:t>
             </a:fld>
             <a:endParaRPr lang="en-US"/>
           </a:p>
@@ -555,6 +555,28 @@
               </a:rPr>
               <a:t> in production?</a:t>
             </a:r>
+          </a:p>
+          <a:p>
+            <a:r>
+              <a:rPr lang="en-US" sz="1200" dirty="0" smtClean="0">
+                <a:latin typeface="Arial"/>
+              </a:rPr>
+              <a:t>Q3:</a:t>
+            </a:r>
+            <a:r>
+              <a:rPr lang="en-US" sz="1200" baseline="0" dirty="0" smtClean="0">
+                <a:latin typeface="Arial"/>
+              </a:rPr>
+              <a:t> What sort of data are they storing?</a:t>
+            </a:r>
+          </a:p>
+          <a:p>
+            <a:r>
+              <a:rPr lang="en-US" sz="1200" baseline="0" dirty="0" smtClean="0">
+                <a:latin typeface="Arial"/>
+              </a:rPr>
+              <a:t>Q4: Reshuffle if required</a:t>
+            </a:r>
             <a:endParaRPr lang="en-US" dirty="0" smtClean="0"/>
           </a:p>
         </p:txBody>
@@ -658,9 +680,8 @@
             </a:pPr>
             <a:r>
               <a:rPr lang="en-US" baseline="0" dirty="0" smtClean="0"/>
-              <a:t> Explain the logic</a:t>
-            </a:r>
-            <a:endParaRPr lang="en-US" dirty="0" smtClean="0"/>
+              <a:t> Zulu correlation about saving the text file(We found a better option)</a:t>
+            </a:r>
           </a:p>
           <a:p>
             <a:pPr>
@@ -669,11 +690,56 @@
             </a:pPr>
             <a:r>
               <a:rPr lang="en-US" baseline="0" dirty="0" smtClean="0"/>
-              <a:t>Zulu </a:t>
+              <a:t> Use case of </a:t>
             </a:r>
             <a:r>
               <a:rPr lang="en-US" baseline="0" dirty="0" err="1" smtClean="0"/>
-              <a:t>corelation</a:t>
+              <a:t>GridFS</a:t>
+            </a:r>
+            <a:endParaRPr lang="en-US" baseline="0" dirty="0" smtClean="0"/>
+          </a:p>
+          <a:p>
+            <a:pPr lvl="1">
+              <a:buFontTx/>
+              <a:buChar char="-"/>
+            </a:pPr>
+            <a:r>
+              <a:rPr lang="en-US" baseline="0" dirty="0" smtClean="0"/>
+              <a:t> &gt;16MB</a:t>
+            </a:r>
+          </a:p>
+          <a:p>
+            <a:pPr lvl="1">
+              <a:buFontTx/>
+              <a:buChar char="-"/>
+            </a:pPr>
+            <a:r>
+              <a:rPr lang="en-US" baseline="0" dirty="0" smtClean="0"/>
+              <a:t> FS limits the number of files in a directory</a:t>
+            </a:r>
+          </a:p>
+          <a:p>
+            <a:pPr lvl="1">
+              <a:buFontTx/>
+              <a:buChar char="-"/>
+            </a:pPr>
+            <a:r>
+              <a:rPr lang="en-US" baseline="0" dirty="0" smtClean="0"/>
+              <a:t> When not to use: when you will have to update your files saved atomically</a:t>
+            </a:r>
+          </a:p>
+          <a:p>
+            <a:pPr lvl="1">
+              <a:buFontTx/>
+              <a:buChar char="-"/>
+            </a:pPr>
+            <a:r>
+              <a:rPr lang="en-US" baseline="0" dirty="0" smtClean="0"/>
+              <a:t> If you size is &lt;16MB and you still want to store the binary data you can use the type </a:t>
+            </a:r>
+            <a:r>
+              <a:rPr lang="en-US" baseline="0" dirty="0" err="1" smtClean="0"/>
+              <a:t>BinData</a:t>
             </a:r>
             <a:endParaRPr lang="en-US" baseline="0" dirty="0" smtClean="0"/>
           </a:p>
@@ -778,6 +844,21 @@
             </a:pPr>
             <a:r>
               <a:rPr lang="en-US" dirty="0" smtClean="0"/>
+              <a:t> What is the characteristic</a:t>
+            </a:r>
+            <a:r>
+              <a:rPr lang="en-US" baseline="0" dirty="0" smtClean="0"/>
+              <a:t> of transaction</a:t>
+            </a:r>
+            <a:endParaRPr lang="en-US" dirty="0" smtClean="0"/>
+          </a:p>
+          <a:p>
+            <a:pPr>
+              <a:buFontTx/>
+              <a:buChar char="-"/>
+            </a:pPr>
+            <a:r>
+              <a:rPr lang="en-US" dirty="0" smtClean="0"/>
               <a:t>- How many of you know that </a:t>
             </a:r>
             <a:r>
@@ -786,11 +867,7 @@
             </a:r>
             <a:r>
               <a:rPr lang="en-US" dirty="0" smtClean="0"/>
-              <a:t> don’t </a:t>
-            </a:r>
-            <a:r>
-              <a:rPr lang="en-US" smtClean="0"/>
-              <a:t>support transactions</a:t>
+              <a:t> don’t support transactions</a:t>
             </a:r>
             <a:endParaRPr lang="en-US" dirty="0"/>
           </a:p>
@@ -891,6 +968,17 @@
           <a:p>
             <a:pPr>
               <a:buFontTx/>
+              <a:buChar char="-"/>
+            </a:pPr>
+            <a:r>
+              <a:rPr lang="en-US" baseline="0" dirty="0" smtClean="0"/>
+              <a:t> Show the journal files</a:t>
+            </a:r>
+            <a:endParaRPr lang="en-US" dirty="0" smtClean="0"/>
+          </a:p>
+          <a:p>
+            <a:pPr>
+              <a:buFontTx/>
               <a:buNone/>
             </a:pPr>
             <a:r>
@@ -1112,18 +1200,30 @@
               <a:t> There are geo-spatial indexes which can be used to great advantage rather than calling </a:t>
             </a:r>
             <a:r>
+              <a:rPr lang="en-US" baseline="0" dirty="0" smtClean="0"/>
+              <a:t>Google </a:t>
+            </a:r>
+            <a:r>
+              <a:rPr lang="en-US" baseline="0" dirty="0" smtClean="0"/>
+              <a:t>maps API</a:t>
+            </a:r>
+          </a:p>
+          <a:p>
+            <a:r>
+              <a:rPr lang="en-US" baseline="0" dirty="0" smtClean="0"/>
+              <a:t>- There is a lot of </a:t>
+            </a:r>
+            <a:r>
+              <a:rPr lang="en-US" baseline="0" dirty="0" smtClean="0"/>
+              <a:t>promotion for BI with </a:t>
+            </a:r>
+            <a:r>
               <a:rPr lang="en-US" baseline="0" dirty="0" err="1" smtClean="0"/>
-              <a:t>google</a:t>
+              <a:t>MongoDB</a:t>
             </a:r>
             <a:r>
               <a:rPr lang="en-US" baseline="0" dirty="0" smtClean="0"/>
-              <a:t> maps API</a:t>
-            </a:r>
-          </a:p>
-          <a:p>
-            <a:r>
-              <a:rPr lang="en-US" baseline="0" dirty="0" smtClean="0"/>
-              <a:t>- There is a lot of work going on </a:t>
+              <a:t> connector, If anyone is interested we can explore this together</a:t>
             </a:r>
             <a:endParaRPr lang="en-US" dirty="0"/>
           </a:p>
@@ -1287,19 +1387,7 @@
               <a:rPr lang="en-US" sz="1200" baseline="0" dirty="0" smtClean="0">
                 <a:latin typeface="Arial"/>
               </a:rPr>
-              <a:t> Ask people about how many of them are comfortable with </a:t>
-            </a:r>
-            <a:r>
-              <a:rPr lang="en-US" sz="1200" baseline="0" dirty="0" err="1" smtClean="0">
-                <a:latin typeface="Arial"/>
-              </a:rPr>
-              <a:t>nodejs</a:t>
-            </a:r>
-            <a:r>
-              <a:rPr lang="en-US" sz="1200" baseline="0" dirty="0" smtClean="0">
-                <a:latin typeface="Arial"/>
-              </a:rPr>
-              <a:t>? Rearrange people accordingly</a:t>
+              <a:t> ODM is like ORM, just for the relational guys to related to it</a:t>
             </a:r>
             <a:endParaRPr lang="en-US" dirty="0" smtClean="0"/>
           </a:p>
@@ -1608,6 +1696,24 @@
               <a:rPr lang="en-US" baseline="0" dirty="0" smtClean="0"/>
               <a:t> UI mongo client or command line</a:t>
             </a:r>
+          </a:p>
+          <a:p>
+            <a:pPr>
+              <a:buFontTx/>
+              <a:buChar char="-"/>
+            </a:pPr>
+            <a:r>
+              <a:rPr lang="en-US" baseline="0" dirty="0" smtClean="0"/>
+              <a:t> Give the co-relation with Zulu (Markets UI in </a:t>
+            </a:r>
+            <a:r>
+              <a:rPr lang="en-US" baseline="0" dirty="0" err="1" smtClean="0"/>
+              <a:t>Codeshare</a:t>
+            </a:r>
+            <a:r>
+              <a:rPr lang="en-US" baseline="0" dirty="0" smtClean="0"/>
+              <a:t>)</a:t>
+            </a:r>
             <a:endParaRPr lang="en-US" dirty="0" smtClean="0"/>
           </a:p>
           <a:p>
@@ -2153,13 +2259,28 @@
           </a:bodyPr>
           <a:lstStyle/>
           <a:p>
+            <a:pPr>
+              <a:buFontTx/>
+              <a:buChar char="-"/>
+            </a:pPr>
             <a:r>
               <a:rPr lang="en-US" dirty="0" smtClean="0"/>
-              <a:t>- 5 </a:t>
+              <a:t> 5 </a:t>
             </a:r>
             <a:r>
               <a:rPr lang="en-US" dirty="0" err="1" smtClean="0"/>
               <a:t>mins</a:t>
+            </a:r>
+            <a:endParaRPr lang="en-US" dirty="0" smtClean="0"/>
+          </a:p>
+          <a:p>
+            <a:pPr>
+              <a:buFontTx/>
+              <a:buChar char="-"/>
+            </a:pPr>
+            <a:r>
+              <a:rPr lang="en-US" baseline="0" dirty="0" smtClean="0"/>
+              <a:t> We found a way, but we didn’t implement it</a:t>
             </a:r>
             <a:endParaRPr lang="en-US" dirty="0"/>
           </a:p>
@@ -2379,7 +2500,7 @@
             <a:fld id="{A01F82C3-8254-49B4-9F12-D391F85377D6}" type="datetime1">
               <a:rPr lang="en-US" smtClean="0"/>
               <a:pPr/>
-              <a:t>6/18/2016</a:t>
+              <a:t>6/19/2016</a:t>
             </a:fld>
             <a:endParaRPr lang="en-US"/>
           </a:p>
@@ -2555,7 +2676,7 @@
             <a:fld id="{F43E83A3-7EB3-47B6-8E06-C73B8D775CFE}" type="datetime1">
               <a:rPr lang="en-US" smtClean="0"/>
               <a:pPr/>
-              <a:t>6/18/2016</a:t>
+              <a:t>6/19/2016</a:t>
             </a:fld>
             <a:endParaRPr lang="en-US"/>
           </a:p>
@@ -2741,7 +2862,7 @@
             <a:fld id="{8C0F1ADD-78EB-420C-887A-43B847F3E662}" type="datetime1">
               <a:rPr lang="en-US" smtClean="0"/>
               <a:pPr/>
-              <a:t>6/18/2016</a:t>
+              <a:t>6/19/2016</a:t>
             </a:fld>
             <a:endParaRPr lang="en-US"/>
           </a:p>
@@ -2921,7 +3042,7 @@
             <a:fld id="{D5A1C4F2-DAB4-4DBC-9B67-4145EB5CA6F4}" type="datetime1">
               <a:rPr lang="en-US" smtClean="0"/>
               <a:pPr/>
-              <a:t>6/18/2016</a:t>
+              <a:t>6/19/2016</a:t>
             </a:fld>
             <a:endParaRPr lang="en-US"/>
           </a:p>
@@ -3177,7 +3298,7 @@
             <a:fld id="{33CE4B79-AE2B-4454-B439-C180733E9D5A}" type="datetime1">
               <a:rPr lang="en-US" smtClean="0"/>
               <a:pPr/>
-              <a:t>6/18/2016</a:t>
+              <a:t>6/19/2016</a:t>
             </a:fld>
             <a:endParaRPr lang="en-US"/>
           </a:p>
@@ -3471,7 +3592,7 @@
             <a:fld id="{C34ECCE5-A5FB-49AD-B868-93CE599E66C4}" type="datetime1">
               <a:rPr lang="en-US" smtClean="0"/>
               <a:pPr/>
-              <a:t>6/18/2016</a:t>
+              <a:t>6/19/2016</a:t>
             </a:fld>
             <a:endParaRPr lang="en-US"/>
           </a:p>
@@ -3899,7 +4020,7 @@
             <a:fld id="{9C46C979-9F1A-4C9E-8EA4-C47A92B86ED3}" type="datetime1">
               <a:rPr lang="en-US" smtClean="0"/>
               <a:pPr/>
-              <a:t>6/18/2016</a:t>
+              <a:t>6/19/2016</a:t>
             </a:fld>
             <a:endParaRPr lang="en-US"/>
           </a:p>
@@ -4023,7 +4144,7 @@
             <a:fld id="{0DAA53D1-166E-4400-8CBD-FCE51C76C295}" type="datetime1">
               <a:rPr lang="en-US" smtClean="0"/>
               <a:pPr/>
-              <a:t>6/18/2016</a:t>
+              <a:t>6/19/2016</a:t>
             </a:fld>
             <a:endParaRPr lang="en-US"/>
           </a:p>
@@ -4124,7 +4245,7 @@
             <a:fld id="{36244870-D467-4A94-A60C-F9FE831D86ED}" type="datetime1">
               <a:rPr lang="en-US" smtClean="0"/>
               <a:pPr/>
-              <a:t>6/18/2016</a:t>
+              <a:t>6/19/2016</a:t>
             </a:fld>
             <a:endParaRPr lang="en-US"/>
           </a:p>
@@ -4407,7 +4528,7 @@
             <a:fld id="{2D84076B-22E6-4449-90CE-41F45A35B239}" type="datetime1">
               <a:rPr lang="en-US" smtClean="0"/>
               <a:pPr/>
-              <a:t>6/18/2016</a:t>
+              <a:t>6/19/2016</a:t>
             </a:fld>
             <a:endParaRPr lang="en-US"/>
           </a:p>
@@ -4666,7 +4787,7 @@
             <a:fld id="{07283709-4875-4598-BA8B-768670B3A710}" type="datetime1">
               <a:rPr lang="en-US" smtClean="0"/>
               <a:pPr/>
-              <a:t>6/18/2016</a:t>
+              <a:t>6/19/2016</a:t>
             </a:fld>
             <a:endParaRPr lang="en-US"/>
           </a:p>
@@ -4885,7 +5006,7 @@
             <a:fld id="{11FC054B-F4C2-4768-9E97-52376EF3930F}" type="datetime1">
               <a:rPr lang="en-US" smtClean="0"/>
               <a:pPr/>
-              <a:t>6/18/2016</a:t>
+              <a:t>6/19/2016</a:t>
             </a:fld>
             <a:endParaRPr lang="en-US"/>
           </a:p>
@@ -5505,7 +5626,7 @@
         <p:spPr/>
         <p:txBody>
           <a:bodyPr>
-            <a:normAutofit/>
+            <a:normAutofit fontScale="77500" lnSpcReduction="20000"/>
           </a:bodyPr>
           <a:lstStyle/>
           <a:p>
@@ -5513,6 +5634,60 @@
               <a:rPr lang="en-US" dirty="0" smtClean="0"/>
               <a:t>Remember the question we asked about document size being  &lt;16MB</a:t>
             </a:r>
+          </a:p>
+          <a:p>
+            <a:pPr>
+              <a:buNone/>
+            </a:pPr>
+            <a:endParaRPr lang="en-US" dirty="0" smtClean="0"/>
+          </a:p>
+          <a:p>
+            <a:r>
+              <a:rPr lang="en-US" dirty="0" smtClean="0"/>
+              <a:t>Divides the entire file into chunks of 255Kb</a:t>
+            </a:r>
+          </a:p>
+          <a:p>
+            <a:r>
+              <a:rPr lang="en-US" dirty="0" smtClean="0"/>
+              <a:t>Uses 2 collections:</a:t>
+            </a:r>
+          </a:p>
+          <a:p>
+            <a:pPr lvl="1"/>
+            <a:r>
+              <a:rPr lang="en-US" b="1" dirty="0" smtClean="0"/>
+              <a:t>files</a:t>
+            </a:r>
+            <a:r>
+              <a:rPr lang="en-US" dirty="0" smtClean="0"/>
+              <a:t>: stores the metadata about the file</a:t>
+            </a:r>
+          </a:p>
+          <a:p>
+            <a:pPr lvl="1"/>
+            <a:r>
+              <a:rPr lang="en-US" b="1" dirty="0" smtClean="0"/>
+              <a:t>chunks</a:t>
+            </a:r>
+            <a:r>
+              <a:rPr lang="en-US" dirty="0" smtClean="0"/>
+              <a:t>: stores the file chunks</a:t>
+            </a:r>
+          </a:p>
+          <a:p>
+            <a:pPr lvl="1">
+              <a:buNone/>
+            </a:pPr>
+            <a:r>
+              <a:rPr lang="en-US" dirty="0" smtClean="0"/>
+              <a:t>These collections are placed under a bucket named as </a:t>
+            </a:r>
+            <a:r>
+              <a:rPr lang="en-US" b="1" dirty="0" err="1" smtClean="0"/>
+              <a:t>fs</a:t>
+            </a:r>
+            <a:endParaRPr lang="en-US" b="1" dirty="0" smtClean="0"/>
           </a:p>
           <a:p>
             <a:pPr>
@@ -5541,7 +5716,15 @@
                   </a:schemeClr>
                 </a:solidFill>
               </a:rPr>
-              <a:t> node gridFSApp.js</a:t>
+              <a:t> </a:t>
+            </a:r>
+            <a:r>
+              <a:rPr lang="en-US" i="1" dirty="0" smtClean="0">
+                <a:solidFill>
+                  <a:srgbClr val="0000FF"/>
+                </a:solidFill>
+              </a:rPr>
+              <a:t>node gridFSApp.js</a:t>
             </a:r>
           </a:p>
           <a:p>
@@ -5551,12 +5734,9 @@
               <a:t>Test data for this example is available in </a:t>
             </a:r>
             <a:r>
-              <a:rPr lang="en-US" dirty="0" err="1" smtClean="0">
+              <a:rPr lang="en-US" i="1" dirty="0" err="1" smtClean="0">
                 <a:solidFill>
-                  <a:schemeClr val="tx2">
-                    <a:lumMod val="60000"/>
-                    <a:lumOff val="40000"/>
-                  </a:schemeClr>
+                  <a:srgbClr val="0000FF"/>
                 </a:solidFill>
               </a:rPr>
               <a:t>testData</a:t>
@@ -5564,10 +5744,7 @@
             <a:r>
               <a:rPr lang="en-US" dirty="0" smtClean="0">
                 <a:solidFill>
-                  <a:schemeClr val="tx2">
-                    <a:lumMod val="60000"/>
-                    <a:lumOff val="40000"/>
-                  </a:schemeClr>
+                  <a:srgbClr val="0000FF"/>
                 </a:solidFill>
               </a:rPr>
               <a:t> </a:t>
@@ -5745,33 +5922,15 @@
                                   </p:childTnLst>
                                 </p:cTn>
                               </p:par>
-                            </p:childTnLst>
-                          </p:cTn>
-                        </p:par>
-                      </p:childTnLst>
-                    </p:cTn>
-                  </p:par>
-                  <p:par>
-                    <p:cTn id="13" fill="hold">
-                      <p:stCondLst>
-                        <p:cond delay="indefinite"/>
-                      </p:stCondLst>
-                      <p:childTnLst>
-                        <p:par>
-                          <p:cTn id="14" fill="hold">
-                            <p:stCondLst>
-                              <p:cond delay="0"/>
-                            </p:stCondLst>
-                            <p:childTnLst>
                               <p:par>
-                                <p:cTn id="15" presetID="3" presetClass="entr" presetSubtype="10" fill="hold" nodeType="clickEffect">
+                                <p:cTn id="13" presetID="3" presetClass="entr" presetSubtype="10" fill="hold" nodeType="withEffect">
                                   <p:stCondLst>
                                     <p:cond delay="0"/>
                                   </p:stCondLst>
                                   <p:childTnLst>
                                     <p:set>
                                       <p:cBhvr>
-                                        <p:cTn id="16" dur="1" fill="hold">
+                                        <p:cTn id="14" dur="1" fill="hold">
                                           <p:stCondLst>
                                             <p:cond delay="0"/>
                                           </p:stCondLst>
@@ -5793,7 +5952,7 @@
                                     </p:set>
                                     <p:animEffect transition="in" filter="blinds(horizontal)">
                                       <p:cBhvr>
-                                        <p:cTn id="17" dur="500"/>
+                                        <p:cTn id="15" dur="500"/>
                                         <p:tgtEl>
                                           <p:spTgt spid="3">
                                             <p:txEl>
@@ -5806,33 +5965,15 @@
                                   </p:childTnLst>
                                 </p:cTn>
                               </p:par>
-                            </p:childTnLst>
-                          </p:cTn>
-                        </p:par>
-                      </p:childTnLst>
-                    </p:cTn>
-                  </p:par>
-                  <p:par>
-                    <p:cTn id="18" fill="hold">
-                      <p:stCondLst>
-                        <p:cond delay="indefinite"/>
-                      </p:stCondLst>
-                      <p:childTnLst>
-                        <p:par>
-                          <p:cTn id="19" fill="hold">
-                            <p:stCondLst>
-                              <p:cond delay="0"/>
-                            </p:stCondLst>
-                            <p:childTnLst>
                               <p:par>
-                                <p:cTn id="20" presetID="3" presetClass="entr" presetSubtype="10" fill="hold" nodeType="clickEffect">
+                                <p:cTn id="16" presetID="3" presetClass="entr" presetSubtype="10" fill="hold" nodeType="withEffect">
                                   <p:stCondLst>
                                     <p:cond delay="0"/>
                                   </p:stCondLst>
                                   <p:childTnLst>
                                     <p:set>
                                       <p:cBhvr>
-                                        <p:cTn id="21" dur="1" fill="hold">
+                                        <p:cTn id="17" dur="1" fill="hold">
                                           <p:stCondLst>
                                             <p:cond delay="0"/>
                                           </p:stCondLst>
@@ -5854,11 +5995,244 @@
                                     </p:set>
                                     <p:animEffect transition="in" filter="blinds(horizontal)">
                                       <p:cBhvr>
-                                        <p:cTn id="22" dur="500"/>
+                                        <p:cTn id="18" dur="500"/>
                                         <p:tgtEl>
                                           <p:spTgt spid="3">
                                             <p:txEl>
                                               <p:pRg st="4" end="4"/>
+                                            </p:txEl>
+                                          </p:spTgt>
+                                        </p:tgtEl>
+                                      </p:cBhvr>
+                                    </p:animEffect>
+                                  </p:childTnLst>
+                                </p:cTn>
+                              </p:par>
+                              <p:par>
+                                <p:cTn id="19" presetID="3" presetClass="entr" presetSubtype="10" fill="hold" nodeType="withEffect">
+                                  <p:stCondLst>
+                                    <p:cond delay="0"/>
+                                  </p:stCondLst>
+                                  <p:childTnLst>
+                                    <p:set>
+                                      <p:cBhvr>
+                                        <p:cTn id="20" dur="1" fill="hold">
+                                          <p:stCondLst>
+                                            <p:cond delay="0"/>
+                                          </p:stCondLst>
+                                        </p:cTn>
+                                        <p:tgtEl>
+                                          <p:spTgt spid="3">
+                                            <p:txEl>
+                                              <p:pRg st="5" end="5"/>
+                                            </p:txEl>
+                                          </p:spTgt>
+                                        </p:tgtEl>
+                                        <p:attrNameLst>
+                                          <p:attrName>style.visibility</p:attrName>
+                                        </p:attrNameLst>
+                                      </p:cBhvr>
+                                      <p:to>
+                                        <p:strVal val="visible"/>
+                                      </p:to>
+                                    </p:set>
+                                    <p:animEffect transition="in" filter="blinds(horizontal)">
+                                      <p:cBhvr>
+                                        <p:cTn id="21" dur="500"/>
+                                        <p:tgtEl>
+                                          <p:spTgt spid="3">
+                                            <p:txEl>
+                                              <p:pRg st="5" end="5"/>
+                                            </p:txEl>
+                                          </p:spTgt>
+                                        </p:tgtEl>
+                                      </p:cBhvr>
+                                    </p:animEffect>
+                                  </p:childTnLst>
+                                </p:cTn>
+                              </p:par>
+                              <p:par>
+                                <p:cTn id="22" presetID="3" presetClass="entr" presetSubtype="10" fill="hold" nodeType="withEffect">
+                                  <p:stCondLst>
+                                    <p:cond delay="0"/>
+                                  </p:stCondLst>
+                                  <p:childTnLst>
+                                    <p:set>
+                                      <p:cBhvr>
+                                        <p:cTn id="23" dur="1" fill="hold">
+                                          <p:stCondLst>
+                                            <p:cond delay="0"/>
+                                          </p:stCondLst>
+                                        </p:cTn>
+                                        <p:tgtEl>
+                                          <p:spTgt spid="3">
+                                            <p:txEl>
+                                              <p:pRg st="6" end="6"/>
+                                            </p:txEl>
+                                          </p:spTgt>
+                                        </p:tgtEl>
+                                        <p:attrNameLst>
+                                          <p:attrName>style.visibility</p:attrName>
+                                        </p:attrNameLst>
+                                      </p:cBhvr>
+                                      <p:to>
+                                        <p:strVal val="visible"/>
+                                      </p:to>
+                                    </p:set>
+                                    <p:animEffect transition="in" filter="blinds(horizontal)">
+                                      <p:cBhvr>
+                                        <p:cTn id="24" dur="500"/>
+                                        <p:tgtEl>
+                                          <p:spTgt spid="3">
+                                            <p:txEl>
+                                              <p:pRg st="6" end="6"/>
+                                            </p:txEl>
+                                          </p:spTgt>
+                                        </p:tgtEl>
+                                      </p:cBhvr>
+                                    </p:animEffect>
+                                  </p:childTnLst>
+                                </p:cTn>
+                              </p:par>
+                            </p:childTnLst>
+                          </p:cTn>
+                        </p:par>
+                      </p:childTnLst>
+                    </p:cTn>
+                  </p:par>
+                  <p:par>
+                    <p:cTn id="25" fill="hold">
+                      <p:stCondLst>
+                        <p:cond delay="indefinite"/>
+                      </p:stCondLst>
+                      <p:childTnLst>
+                        <p:par>
+                          <p:cTn id="26" fill="hold">
+                            <p:stCondLst>
+                              <p:cond delay="0"/>
+                            </p:stCondLst>
+                            <p:childTnLst>
+                              <p:par>
+                                <p:cTn id="27" presetID="3" presetClass="entr" presetSubtype="10" fill="hold" nodeType="clickEffect">
+                                  <p:stCondLst>
+                                    <p:cond delay="0"/>
+                                  </p:stCondLst>
+                                  <p:childTnLst>
+                                    <p:set>
+                                      <p:cBhvr>
+                                        <p:cTn id="28" dur="1" fill="hold">
+                                          <p:stCondLst>
+                                            <p:cond delay="0"/>
+                                          </p:stCondLst>
+                                        </p:cTn>
+                                        <p:tgtEl>
+                                          <p:spTgt spid="3">
+                                            <p:txEl>
+                                              <p:pRg st="8" end="8"/>
+                                            </p:txEl>
+                                          </p:spTgt>
+                                        </p:tgtEl>
+                                        <p:attrNameLst>
+                                          <p:attrName>style.visibility</p:attrName>
+                                        </p:attrNameLst>
+                                      </p:cBhvr>
+                                      <p:to>
+                                        <p:strVal val="visible"/>
+                                      </p:to>
+                                    </p:set>
+                                    <p:animEffect transition="in" filter="blinds(horizontal)">
+                                      <p:cBhvr>
+                                        <p:cTn id="29" dur="500"/>
+                                        <p:tgtEl>
+                                          <p:spTgt spid="3">
+                                            <p:txEl>
+                                              <p:pRg st="8" end="8"/>
+                                            </p:txEl>
+                                          </p:spTgt>
+                                        </p:tgtEl>
+                                      </p:cBhvr>
+                                    </p:animEffect>
+                                  </p:childTnLst>
+                                </p:cTn>
+                              </p:par>
+                              <p:par>
+                                <p:cTn id="30" presetID="3" presetClass="entr" presetSubtype="10" fill="hold" nodeType="withEffect">
+                                  <p:stCondLst>
+                                    <p:cond delay="0"/>
+                                  </p:stCondLst>
+                                  <p:childTnLst>
+                                    <p:set>
+                                      <p:cBhvr>
+                                        <p:cTn id="31" dur="1" fill="hold">
+                                          <p:stCondLst>
+                                            <p:cond delay="0"/>
+                                          </p:stCondLst>
+                                        </p:cTn>
+                                        <p:tgtEl>
+                                          <p:spTgt spid="3">
+                                            <p:txEl>
+                                              <p:pRg st="9" end="9"/>
+                                            </p:txEl>
+                                          </p:spTgt>
+                                        </p:tgtEl>
+                                        <p:attrNameLst>
+                                          <p:attrName>style.visibility</p:attrName>
+                                        </p:attrNameLst>
+                                      </p:cBhvr>
+                                      <p:to>
+                                        <p:strVal val="visible"/>
+                                      </p:to>
+                                    </p:set>
+                                    <p:animEffect transition="in" filter="blinds(horizontal)">
+                                      <p:cBhvr>
+                                        <p:cTn id="32" dur="500"/>
+                                        <p:tgtEl>
+                                          <p:spTgt spid="3">
+                                            <p:txEl>
+                                              <p:pRg st="9" end="9"/>
+                                            </p:txEl>
+                                          </p:spTgt>
+                                        </p:tgtEl>
+                                      </p:cBhvr>
+                                    </p:animEffect>
+                                  </p:childTnLst>
+                                </p:cTn>
+                              </p:par>
+                              <p:par>
+                                <p:cTn id="33" presetID="3" presetClass="entr" presetSubtype="10" fill="hold" nodeType="withEffect">
+                                  <p:stCondLst>
+                                    <p:cond delay="0"/>
+                                  </p:stCondLst>
+                                  <p:childTnLst>
+                                    <p:set>
+                                      <p:cBhvr>
+                                        <p:cTn id="34" dur="1" fill="hold">
+                                          <p:stCondLst>
+                                            <p:cond delay="0"/>
+                                          </p:stCondLst>
+                                        </p:cTn>
+                                        <p:tgtEl>
+                                          <p:spTgt spid="3">
+                                            <p:txEl>
+                                              <p:pRg st="10" end="10"/>
+                                            </p:txEl>
+                                          </p:spTgt>
+                                        </p:tgtEl>
+                                        <p:attrNameLst>
+                                          <p:attrName>style.visibility</p:attrName>
+                                        </p:attrNameLst>
+                                      </p:cBhvr>
+                                      <p:to>
+                                        <p:strVal val="visible"/>
+                                      </p:to>
+                                    </p:set>
+                                    <p:animEffect transition="in" filter="blinds(horizontal)">
+                                      <p:cBhvr>
+                                        <p:cTn id="35" dur="500"/>
+                                        <p:tgtEl>
+                                          <p:spTgt spid="3">
+                                            <p:txEl>
+                                              <p:pRg st="10" end="10"/>
                                             </p:txEl>
                                           </p:spTgt>
                                         </p:tgtEl>
@@ -5961,19 +6335,469 @@
           <a:p>
             <a:r>
               <a:rPr lang="en-US" sz="2800" dirty="0" smtClean="0"/>
-              <a:t>It can be achieved by 2 phase commit</a:t>
+              <a:t>Operation related to single document is atomic</a:t>
+            </a:r>
+          </a:p>
+          <a:p>
+            <a:r>
+              <a:rPr lang="en-US" sz="2800" dirty="0" smtClean="0"/>
+              <a:t>Can achieve transaction like semantics by 2 </a:t>
+            </a:r>
+            <a:r>
+              <a:rPr lang="en-US" sz="2800" dirty="0" smtClean="0"/>
+              <a:t>phase commit</a:t>
             </a:r>
           </a:p>
           <a:p>
             <a:r>
               <a:rPr lang="en-IN" sz="2800" dirty="0" smtClean="0"/>
-              <a:t>Write operation is atomic on the level of a single document, even if the operation modifies multiple embedded documents within a single document</a:t>
-            </a:r>
+              <a:t>Even </a:t>
+            </a:r>
+            <a:r>
+              <a:rPr lang="en-IN" sz="2800" dirty="0" smtClean="0"/>
+              <a:t>if the operation modifies multiple embedded documents within a single </a:t>
+            </a:r>
+            <a:r>
+              <a:rPr lang="en-IN" sz="2800" dirty="0" smtClean="0"/>
+              <a:t>document, it is atomic</a:t>
+            </a:r>
+          </a:p>
+          <a:p>
+            <a:endParaRPr lang="en-IN" sz="2800" dirty="0" smtClean="0"/>
           </a:p>
           <a:p>
             <a:r>
               <a:rPr lang="en-IN" sz="2800" dirty="0" smtClean="0"/>
               <a:t>Lets follow the example under </a:t>
+            </a:r>
+            <a:r>
+              <a:rPr lang="en-IN" sz="2800" i="1" dirty="0" smtClean="0">
+                <a:solidFill>
+                  <a:srgbClr val="0000FF"/>
+                </a:solidFill>
+              </a:rPr>
+              <a:t>routes/</a:t>
+            </a:r>
+            <a:r>
+              <a:rPr lang="en-IN" sz="2800" i="1" dirty="0" err="1" smtClean="0">
+                <a:solidFill>
+                  <a:srgbClr val="0000FF"/>
+                </a:solidFill>
+              </a:rPr>
+              <a:t>transaction.js</a:t>
+            </a:r>
+            <a:endParaRPr lang="en-IN" sz="2800" i="1" dirty="0" smtClean="0">
+              <a:solidFill>
+                <a:srgbClr val="0000FF"/>
+              </a:solidFill>
+            </a:endParaRPr>
+          </a:p>
+          <a:p>
+            <a:endParaRPr lang="en-IN" sz="2800" dirty="0" smtClean="0">
+              <a:hlinkClick r:id="rId3"/>
+            </a:endParaRPr>
+          </a:p>
+          <a:p>
+            <a:endParaRPr lang="en-IN" sz="2800" dirty="0" smtClean="0"/>
+          </a:p>
+        </p:txBody>
+      </p:sp>
+      <p:sp>
+        <p:nvSpPr>
+          <p:cNvPr id="5" name="Footer Placeholder 3"/>
+          <p:cNvSpPr>
+            <a:spLocks noGrp="1"/>
+          </p:cNvSpPr>
+          <p:nvPr>
+            <p:ph type="ftr" sz="quarter" idx="11"/>
+          </p:nvPr>
+        </p:nvSpPr>
+        <p:spPr>
+          <a:xfrm>
+            <a:off x="3048000" y="6645275"/>
+            <a:ext cx="3048000" cy="288925"/>
+          </a:xfrm>
+        </p:spPr>
+        <p:txBody>
+          <a:bodyPr/>
+          <a:lstStyle/>
+          <a:p>
+            <a:r>
+              <a:rPr lang="en-US" b="1" dirty="0" smtClean="0">
+                <a:solidFill>
+                  <a:schemeClr val="tx2"/>
+                </a:solidFill>
+              </a:rPr>
+              <a:t>https://in.linkedin.com/in/sujithsudhakaran</a:t>
+            </a:r>
+            <a:endParaRPr lang="en-US" b="1" dirty="0">
+              <a:solidFill>
+                <a:schemeClr val="tx2"/>
+              </a:solidFill>
+            </a:endParaRPr>
+          </a:p>
+        </p:txBody>
+      </p:sp>
+    </p:spTree>
+  </p:cSld>
+  <p:clrMapOvr>
+    <a:masterClrMapping/>
+  </p:clrMapOvr>
+  <p:timing>
+    <p:tnLst>
+      <p:par>
+        <p:cTn id="1" dur="indefinite" restart="never" nodeType="tmRoot">
+          <p:childTnLst>
+            <p:seq concurrent="1" nextAc="seek">
+              <p:cTn id="2" dur="indefinite" nodeType="mainSeq">
+                <p:childTnLst>
+                  <p:par>
+                    <p:cTn id="3" fill="hold">
+                      <p:stCondLst>
+                        <p:cond delay="indefinite"/>
+                      </p:stCondLst>
+                      <p:childTnLst>
+                        <p:par>
+                          <p:cTn id="4" fill="hold">
+                            <p:stCondLst>
+                              <p:cond delay="0"/>
+                            </p:stCondLst>
+                            <p:childTnLst>
+                              <p:par>
+                                <p:cTn id="5" presetID="3" presetClass="entr" presetSubtype="10" fill="hold" nodeType="clickEffect">
+                                  <p:stCondLst>
+                                    <p:cond delay="0"/>
+                                  </p:stCondLst>
+                                  <p:childTnLst>
+                                    <p:set>
+                                      <p:cBhvr>
+                                        <p:cTn id="6" dur="1" fill="hold">
+                                          <p:stCondLst>
+                                            <p:cond delay="0"/>
+                                          </p:stCondLst>
+                                        </p:cTn>
+                                        <p:tgtEl>
+                                          <p:spTgt spid="3">
+                                            <p:txEl>
+                                              <p:pRg st="0" end="0"/>
+                                            </p:txEl>
+                                          </p:spTgt>
+                                        </p:tgtEl>
+                                        <p:attrNameLst>
+                                          <p:attrName>style.visibility</p:attrName>
+                                        </p:attrNameLst>
+                                      </p:cBhvr>
+                                      <p:to>
+                                        <p:strVal val="visible"/>
+                                      </p:to>
+                                    </p:set>
+                                    <p:animEffect transition="in" filter="blinds(horizontal)">
+                                      <p:cBhvr>
+                                        <p:cTn id="7" dur="500"/>
+                                        <p:tgtEl>
+                                          <p:spTgt spid="3">
+                                            <p:txEl>
+                                              <p:pRg st="0" end="0"/>
+                                            </p:txEl>
+                                          </p:spTgt>
+                                        </p:tgtEl>
+                                      </p:cBhvr>
+                                    </p:animEffect>
+                                  </p:childTnLst>
+                                </p:cTn>
+                              </p:par>
+                            </p:childTnLst>
+                          </p:cTn>
+                        </p:par>
+                      </p:childTnLst>
+                    </p:cTn>
+                  </p:par>
+                  <p:par>
+                    <p:cTn id="8" fill="hold">
+                      <p:stCondLst>
+                        <p:cond delay="indefinite"/>
+                      </p:stCondLst>
+                      <p:childTnLst>
+                        <p:par>
+                          <p:cTn id="9" fill="hold">
+                            <p:stCondLst>
+                              <p:cond delay="0"/>
+                            </p:stCondLst>
+                            <p:childTnLst>
+                              <p:par>
+                                <p:cTn id="10" presetID="3" presetClass="entr" presetSubtype="10" fill="hold" nodeType="clickEffect">
+                                  <p:stCondLst>
+                                    <p:cond delay="0"/>
+                                  </p:stCondLst>
+                                  <p:childTnLst>
+                                    <p:set>
+                                      <p:cBhvr>
+                                        <p:cTn id="11" dur="1" fill="hold">
+                                          <p:stCondLst>
+                                            <p:cond delay="0"/>
+                                          </p:stCondLst>
+                                        </p:cTn>
+                                        <p:tgtEl>
+                                          <p:spTgt spid="3">
+                                            <p:txEl>
+                                              <p:pRg st="1" end="1"/>
+                                            </p:txEl>
+                                          </p:spTgt>
+                                        </p:tgtEl>
+                                        <p:attrNameLst>
+                                          <p:attrName>style.visibility</p:attrName>
+                                        </p:attrNameLst>
+                                      </p:cBhvr>
+                                      <p:to>
+                                        <p:strVal val="visible"/>
+                                      </p:to>
+                                    </p:set>
+                                    <p:animEffect transition="in" filter="blinds(horizontal)">
+                                      <p:cBhvr>
+                                        <p:cTn id="12" dur="500"/>
+                                        <p:tgtEl>
+                                          <p:spTgt spid="3">
+                                            <p:txEl>
+                                              <p:pRg st="1" end="1"/>
+                                            </p:txEl>
+                                          </p:spTgt>
+                                        </p:tgtEl>
+                                      </p:cBhvr>
+                                    </p:animEffect>
+                                  </p:childTnLst>
+                                </p:cTn>
+                              </p:par>
+                              <p:par>
+                                <p:cTn id="13" presetID="3" presetClass="entr" presetSubtype="10" fill="hold" nodeType="withEffect">
+                                  <p:stCondLst>
+                                    <p:cond delay="0"/>
+                                  </p:stCondLst>
+                                  <p:childTnLst>
+                                    <p:set>
+                                      <p:cBhvr>
+                                        <p:cTn id="14" dur="1" fill="hold">
+                                          <p:stCondLst>
+                                            <p:cond delay="0"/>
+                                          </p:stCondLst>
+                                        </p:cTn>
+                                        <p:tgtEl>
+                                          <p:spTgt spid="3">
+                                            <p:txEl>
+                                              <p:pRg st="2" end="2"/>
+                                            </p:txEl>
+                                          </p:spTgt>
+                                        </p:tgtEl>
+                                        <p:attrNameLst>
+                                          <p:attrName>style.visibility</p:attrName>
+                                        </p:attrNameLst>
+                                      </p:cBhvr>
+                                      <p:to>
+                                        <p:strVal val="visible"/>
+                                      </p:to>
+                                    </p:set>
+                                    <p:animEffect transition="in" filter="blinds(horizontal)">
+                                      <p:cBhvr>
+                                        <p:cTn id="15" dur="500"/>
+                                        <p:tgtEl>
+                                          <p:spTgt spid="3">
+                                            <p:txEl>
+                                              <p:pRg st="2" end="2"/>
+                                            </p:txEl>
+                                          </p:spTgt>
+                                        </p:tgtEl>
+                                      </p:cBhvr>
+                                    </p:animEffect>
+                                  </p:childTnLst>
+                                </p:cTn>
+                              </p:par>
+                            </p:childTnLst>
+                          </p:cTn>
+                        </p:par>
+                      </p:childTnLst>
+                    </p:cTn>
+                  </p:par>
+                  <p:par>
+                    <p:cTn id="16" fill="hold">
+                      <p:stCondLst>
+                        <p:cond delay="indefinite"/>
+                      </p:stCondLst>
+                      <p:childTnLst>
+                        <p:par>
+                          <p:cTn id="17" fill="hold">
+                            <p:stCondLst>
+                              <p:cond delay="0"/>
+                            </p:stCondLst>
+                            <p:childTnLst>
+                              <p:par>
+                                <p:cTn id="18" presetID="3" presetClass="entr" presetSubtype="10" fill="hold" nodeType="clickEffect">
+                                  <p:stCondLst>
+                                    <p:cond delay="0"/>
+                                  </p:stCondLst>
+                                  <p:childTnLst>
+                                    <p:set>
+                                      <p:cBhvr>
+                                        <p:cTn id="19" dur="1" fill="hold">
+                                          <p:stCondLst>
+                                            <p:cond delay="0"/>
+                                          </p:stCondLst>
+                                        </p:cTn>
+                                        <p:tgtEl>
+                                          <p:spTgt spid="3">
+                                            <p:txEl>
+                                              <p:pRg st="4" end="4"/>
+                                            </p:txEl>
+                                          </p:spTgt>
+                                        </p:tgtEl>
+                                        <p:attrNameLst>
+                                          <p:attrName>style.visibility</p:attrName>
+                                        </p:attrNameLst>
+                                      </p:cBhvr>
+                                      <p:to>
+                                        <p:strVal val="visible"/>
+                                      </p:to>
+                                    </p:set>
+                                    <p:animEffect transition="in" filter="blinds(horizontal)">
+                                      <p:cBhvr>
+                                        <p:cTn id="20" dur="500"/>
+                                        <p:tgtEl>
+                                          <p:spTgt spid="3">
+                                            <p:txEl>
+                                              <p:pRg st="4" end="4"/>
+                                            </p:txEl>
+                                          </p:spTgt>
+                                        </p:tgtEl>
+                                      </p:cBhvr>
+                                    </p:animEffect>
+                                  </p:childTnLst>
+                                </p:cTn>
+                              </p:par>
+                            </p:childTnLst>
+                          </p:cTn>
+                        </p:par>
+                      </p:childTnLst>
+                    </p:cTn>
+                  </p:par>
+                </p:childTnLst>
+              </p:cTn>
+              <p:prevCondLst>
+                <p:cond evt="onPrev" delay="0">
+                  <p:tgtEl>
+                    <p:sldTgt/>
+                  </p:tgtEl>
+                </p:cond>
+              </p:prevCondLst>
+              <p:nextCondLst>
+                <p:cond evt="onNext" delay="0">
+                  <p:tgtEl>
+                    <p:sldTgt/>
+                  </p:tgtEl>
+                </p:cond>
+              </p:nextCondLst>
+            </p:seq>
+          </p:childTnLst>
+        </p:cTn>
+      </p:par>
+    </p:tnLst>
+  </p:timing>
+</p:sld>
+</file>
+
+<file path=ppt/slides/slide12.xml><?xml version="1.0" encoding="utf-8"?>
+<p:sld xmlns:a="http://schemas.openxmlformats.org/drawingml/2006/main" xmlns:r="http://schemas.openxmlformats.org/officeDocument/2006/relationships" xmlns:p="http://schemas.openxmlformats.org/presentationml/2006/main">
+  <p:cSld>
+    <p:spTree>
+      <p:nvGrpSpPr>
+        <p:cNvPr id="1" name=""/>
+        <p:cNvGrpSpPr/>
+        <p:nvPr/>
+      </p:nvGrpSpPr>
+      <p:grpSpPr>
+        <a:xfrm>
+          <a:off x="0" y="0"/>
+          <a:ext cx="0" cy="0"/>
+          <a:chOff x="0" y="0"/>
+          <a:chExt cx="0" cy="0"/>
+        </a:xfrm>
+      </p:grpSpPr>
+      <p:sp>
+        <p:nvSpPr>
+          <p:cNvPr id="2" name="Title 1"/>
+          <p:cNvSpPr>
+            <a:spLocks noGrp="1"/>
+          </p:cNvSpPr>
+          <p:nvPr>
+            <p:ph type="title"/>
+          </p:nvPr>
+        </p:nvSpPr>
+        <p:spPr/>
+        <p:txBody>
+          <a:bodyPr/>
+          <a:lstStyle/>
+          <a:p>
+            <a:r>
+              <a:rPr lang="en-US" dirty="0" smtClean="0"/>
+              <a:t>Journaling</a:t>
+            </a:r>
+            <a:endParaRPr lang="en-US" dirty="0"/>
+          </a:p>
+        </p:txBody>
+      </p:sp>
+      <p:sp>
+        <p:nvSpPr>
+          <p:cNvPr id="3" name="Content Placeholder 2"/>
+          <p:cNvSpPr>
+            <a:spLocks noGrp="1"/>
+          </p:cNvSpPr>
+          <p:nvPr>
+            <p:ph idx="1"/>
+          </p:nvPr>
+        </p:nvSpPr>
+        <p:spPr/>
+        <p:txBody>
+          <a:bodyPr>
+            <a:normAutofit/>
+          </a:bodyPr>
+          <a:lstStyle/>
+          <a:p>
+            <a:r>
+              <a:rPr lang="en-IN" sz="2800" dirty="0" err="1" smtClean="0"/>
+              <a:t>MongoDB</a:t>
+            </a:r>
+            <a:r>
+              <a:rPr lang="en-IN" sz="2800" dirty="0" smtClean="0"/>
+              <a:t> uses a journal file size limit of 100 MB</a:t>
+            </a:r>
+          </a:p>
+          <a:p>
+            <a:r>
+              <a:rPr lang="en-IN" sz="2800" dirty="0" smtClean="0"/>
+              <a:t>For the journal files, </a:t>
+            </a:r>
+            <a:r>
+              <a:rPr lang="en-IN" sz="2800" dirty="0" err="1" smtClean="0"/>
+              <a:t>MongoDB</a:t>
+            </a:r>
+            <a:r>
+              <a:rPr lang="en-IN" sz="2800" dirty="0" smtClean="0"/>
+              <a:t> creates a subdirectory named journal under the </a:t>
+            </a:r>
+            <a:r>
+              <a:rPr lang="en-IN" sz="2800" dirty="0" err="1" smtClean="0"/>
+              <a:t>dbPath</a:t>
+            </a:r>
+            <a:r>
+              <a:rPr lang="en-IN" sz="2800" dirty="0" smtClean="0"/>
+              <a:t> directory.</a:t>
+            </a:r>
+          </a:p>
+          <a:p>
+            <a:r>
+              <a:rPr lang="en-IN" sz="2800" dirty="0" err="1" smtClean="0"/>
+              <a:t>Dbpath</a:t>
+            </a:r>
+            <a:r>
+              <a:rPr lang="en-IN" sz="2800" dirty="0" smtClean="0"/>
+              <a:t>:</a:t>
             </a:r>
             <a:r>
               <a:rPr lang="en-IN" sz="2800" dirty="0" smtClean="0">
@@ -5984,35 +6808,56 @@
                   </a:schemeClr>
                 </a:solidFill>
               </a:rPr>
-              <a:t>routes/</a:t>
-            </a:r>
-            <a:r>
-              <a:rPr lang="en-IN" sz="2800" dirty="0" err="1" smtClean="0">
+              <a:t> </a:t>
+            </a:r>
+            <a:r>
+              <a:rPr lang="en-IN" sz="2800" i="1" dirty="0" smtClean="0">
                 <a:solidFill>
-                  <a:schemeClr val="tx2">
-                    <a:lumMod val="60000"/>
-                    <a:lumOff val="40000"/>
-                  </a:schemeClr>
+                  <a:srgbClr val="0000FF"/>
                 </a:solidFill>
               </a:rPr>
-              <a:t>transaction.js</a:t>
-            </a:r>
-            <a:endParaRPr lang="en-IN" sz="2800" dirty="0" smtClean="0">
+              <a:t>/</a:t>
+            </a:r>
+            <a:r>
+              <a:rPr lang="en-IN" sz="2800" i="1" dirty="0" err="1" smtClean="0">
+                <a:solidFill>
+                  <a:srgbClr val="0000FF"/>
+                </a:solidFill>
+              </a:rPr>
+              <a:t>var/lib/mongodb</a:t>
+            </a:r>
+            <a:endParaRPr lang="en-IN" sz="2800" i="1" dirty="0" smtClean="0">
               <a:solidFill>
-                <a:schemeClr val="tx2">
-                  <a:lumMod val="60000"/>
-                  <a:lumOff val="40000"/>
-                </a:schemeClr>
+                <a:srgbClr val="0000FF"/>
               </a:solidFill>
             </a:endParaRPr>
           </a:p>
           <a:p>
-            <a:endParaRPr lang="en-IN" sz="2800" dirty="0" smtClean="0">
-              <a:hlinkClick r:id="rId3"/>
-            </a:endParaRPr>
-          </a:p>
-          <a:p>
-            <a:endParaRPr lang="en-IN" sz="2800" dirty="0" smtClean="0"/>
+            <a:r>
+              <a:rPr lang="en-IN" sz="2800" dirty="0" smtClean="0"/>
+              <a:t>Storage Engines</a:t>
+            </a:r>
+          </a:p>
+          <a:p>
+            <a:pPr lvl="1"/>
+            <a:r>
+              <a:rPr lang="en-IN" dirty="0" smtClean="0"/>
+              <a:t>MMAPv1 Storage Engine</a:t>
+            </a:r>
+          </a:p>
+          <a:p>
+            <a:pPr lvl="1"/>
+            <a:r>
+              <a:rPr lang="en-IN" dirty="0" err="1" smtClean="0"/>
+              <a:t>WiredTiger</a:t>
+            </a:r>
+            <a:r>
+              <a:rPr lang="en-IN" dirty="0" smtClean="0"/>
+              <a:t> Storage Engine</a:t>
+            </a:r>
+          </a:p>
+          <a:p>
+            <a:endParaRPr lang="en-US" sz="2800" dirty="0"/>
           </a:p>
         </p:txBody>
       </p:sp>
@@ -6163,33 +7008,15 @@
                                   </p:childTnLst>
                                 </p:cTn>
                               </p:par>
-                            </p:childTnLst>
-                          </p:cTn>
-                        </p:par>
-                      </p:childTnLst>
-                    </p:cTn>
-                  </p:par>
-                  <p:par>
-                    <p:cTn id="11" fill="hold">
-                      <p:stCondLst>
-                        <p:cond delay="indefinite"/>
-                      </p:stCondLst>
-                      <p:childTnLst>
-                        <p:par>
-                          <p:cTn id="12" fill="hold">
-                            <p:stCondLst>
-                              <p:cond delay="0"/>
-                            </p:stCondLst>
-                            <p:childTnLst>
                               <p:par>
-                                <p:cTn id="13" presetID="3" presetClass="entr" presetSubtype="10" fill="hold" nodeType="clickEffect">
+                                <p:cTn id="11" presetID="3" presetClass="entr" presetSubtype="10" fill="hold" nodeType="withEffect">
                                   <p:stCondLst>
                                     <p:cond delay="0"/>
                                   </p:stCondLst>
                                   <p:childTnLst>
                                     <p:set>
                                       <p:cBhvr>
-                                        <p:cTn id="14" dur="1" fill="hold">
+                                        <p:cTn id="12" dur="1" fill="hold">
                                           <p:stCondLst>
                                             <p:cond delay="0"/>
                                           </p:stCondLst>
@@ -6211,11 +7038,158 @@
                                     </p:set>
                                     <p:animEffect transition="in" filter="blinds(horizontal)">
                                       <p:cBhvr>
-                                        <p:cTn id="15" dur="500"/>
+                                        <p:cTn id="13" dur="500"/>
                                         <p:tgtEl>
                                           <p:spTgt spid="3">
                                             <p:txEl>
                                               <p:pRg st="2" end="2"/>
+                                            </p:txEl>
+                                          </p:spTgt>
+                                        </p:tgtEl>
+                                      </p:cBhvr>
+                                    </p:animEffect>
+                                  </p:childTnLst>
+                                </p:cTn>
+                              </p:par>
+                            </p:childTnLst>
+                          </p:cTn>
+                        </p:par>
+                      </p:childTnLst>
+                    </p:cTn>
+                  </p:par>
+                  <p:par>
+                    <p:cTn id="14" fill="hold">
+                      <p:stCondLst>
+                        <p:cond delay="indefinite"/>
+                      </p:stCondLst>
+                      <p:childTnLst>
+                        <p:par>
+                          <p:cTn id="15" fill="hold">
+                            <p:stCondLst>
+                              <p:cond delay="0"/>
+                            </p:stCondLst>
+                            <p:childTnLst>
+                              <p:par>
+                                <p:cTn id="16" presetID="3" presetClass="entr" presetSubtype="10" fill="hold" nodeType="clickEffect">
+                                  <p:stCondLst>
+                                    <p:cond delay="0"/>
+                                  </p:stCondLst>
+                                  <p:childTnLst>
+                                    <p:set>
+                                      <p:cBhvr>
+                                        <p:cTn id="17" dur="1" fill="hold">
+                                          <p:stCondLst>
+                                            <p:cond delay="0"/>
+                                          </p:stCondLst>
+                                        </p:cTn>
+                                        <p:tgtEl>
+                                          <p:spTgt spid="3">
+                                            <p:txEl>
+                                              <p:pRg st="3" end="3"/>
+                                            </p:txEl>
+                                          </p:spTgt>
+                                        </p:tgtEl>
+                                        <p:attrNameLst>
+                                          <p:attrName>style.visibility</p:attrName>
+                                        </p:attrNameLst>
+                                      </p:cBhvr>
+                                      <p:to>
+                                        <p:strVal val="visible"/>
+                                      </p:to>
+                                    </p:set>
+                                    <p:animEffect transition="in" filter="blinds(horizontal)">
+                                      <p:cBhvr>
+                                        <p:cTn id="18" dur="500"/>
+                                        <p:tgtEl>
+                                          <p:spTgt spid="3">
+                                            <p:txEl>
+                                              <p:pRg st="3" end="3"/>
+                                            </p:txEl>
+                                          </p:spTgt>
+                                        </p:tgtEl>
+                                      </p:cBhvr>
+                                    </p:animEffect>
+                                  </p:childTnLst>
+                                </p:cTn>
+                              </p:par>
+                              <p:par>
+                                <p:cTn id="19" presetID="3" presetClass="entr" presetSubtype="10" fill="hold" nodeType="withEffect">
+                                  <p:stCondLst>
+                                    <p:cond delay="0"/>
+                                  </p:stCondLst>
+                                  <p:childTnLst>
+                                    <p:set>
+                                      <p:cBhvr>
+                                        <p:cTn id="20" dur="1" fill="hold">
+                                          <p:stCondLst>
+                                            <p:cond delay="0"/>
+                                          </p:stCondLst>
+                                        </p:cTn>
+                                        <p:tgtEl>
+                                          <p:spTgt spid="3">
+                                            <p:txEl>
+                                              <p:pRg st="4" end="4"/>
+                                            </p:txEl>
+                                          </p:spTgt>
+                                        </p:tgtEl>
+                                        <p:attrNameLst>
+                                          <p:attrName>style.visibility</p:attrName>
+                                        </p:attrNameLst>
+                                      </p:cBhvr>
+                                      <p:to>
+                                        <p:strVal val="visible"/>
+                                      </p:to>
+                                    </p:set>
+                                    <p:animEffect transition="in" filter="blinds(horizontal)">
+                                      <p:cBhvr>
+                                        <p:cTn id="21" dur="500"/>
+                                        <p:tgtEl>
+                                          <p:spTgt spid="3">
+                                            <p:txEl>
+                                              <p:pRg st="4" end="4"/>
+                                            </p:txEl>
+                                          </p:spTgt>
+                                        </p:tgtEl>
+                                      </p:cBhvr>
+                                    </p:animEffect>
+                                  </p:childTnLst>
+                                </p:cTn>
+                              </p:par>
+                              <p:par>
+                                <p:cTn id="22" presetID="3" presetClass="entr" presetSubtype="10" fill="hold" nodeType="withEffect">
+                                  <p:stCondLst>
+                                    <p:cond delay="0"/>
+                                  </p:stCondLst>
+                                  <p:childTnLst>
+                                    <p:set>
+                                      <p:cBhvr>
+                                        <p:cTn id="23" dur="1" fill="hold">
+                                          <p:stCondLst>
+                                            <p:cond delay="0"/>
+                                          </p:stCondLst>
+                                        </p:cTn>
+                                        <p:tgtEl>
+                                          <p:spTgt spid="3">
+                                            <p:txEl>
+                                              <p:pRg st="5" end="5"/>
+                                            </p:txEl>
+                                          </p:spTgt>
+                                        </p:tgtEl>
+                                        <p:attrNameLst>
+                                          <p:attrName>style.visibility</p:attrName>
+                                        </p:attrNameLst>
+                                      </p:cBhvr>
+                                      <p:to>
+                                        <p:strVal val="visible"/>
+                                      </p:to>
+                                    </p:set>
+                                    <p:animEffect transition="in" filter="blinds(horizontal)">
+                                      <p:cBhvr>
+                                        <p:cTn id="24" dur="500"/>
+                                        <p:tgtEl>
+                                          <p:spTgt spid="3">
+                                            <p:txEl>
+                                              <p:pRg st="5" end="5"/>
                                             </p:txEl>
                                           </p:spTgt>
                                         </p:tgtEl>
@@ -6255,214 +7229,6 @@
 </p:sld>
 </file>
 
-<file path=ppt/slides/slide12.xml><?xml version="1.0" encoding="utf-8"?>
-<p:sld xmlns:a="http://schemas.openxmlformats.org/drawingml/2006/main" xmlns:r="http://schemas.openxmlformats.org/officeDocument/2006/relationships" xmlns:p="http://schemas.openxmlformats.org/presentationml/2006/main">
-  <p:cSld>
-    <p:spTree>
-      <p:nvGrpSpPr>
-        <p:cNvPr id="1" name=""/>
-        <p:cNvGrpSpPr/>
-        <p:nvPr/>
-      </p:nvGrpSpPr>
-      <p:grpSpPr>
-        <a:xfrm>
-          <a:off x="0" y="0"/>
-          <a:ext cx="0" cy="0"/>
-          <a:chOff x="0" y="0"/>
-          <a:chExt cx="0" cy="0"/>
-        </a:xfrm>
-      </p:grpSpPr>
-      <p:sp>
-        <p:nvSpPr>
-          <p:cNvPr id="2" name="Title 1"/>
-          <p:cNvSpPr>
-            <a:spLocks noGrp="1"/>
-          </p:cNvSpPr>
-          <p:nvPr>
-            <p:ph type="title"/>
-          </p:nvPr>
-        </p:nvSpPr>
-        <p:spPr/>
-        <p:txBody>
-          <a:bodyPr/>
-          <a:lstStyle/>
-          <a:p>
-            <a:r>
-              <a:rPr lang="en-US" dirty="0" smtClean="0"/>
-              <a:t>Journaling</a:t>
-            </a:r>
-            <a:endParaRPr lang="en-US" dirty="0"/>
-          </a:p>
-        </p:txBody>
-      </p:sp>
-      <p:sp>
-        <p:nvSpPr>
-          <p:cNvPr id="3" name="Content Placeholder 2"/>
-          <p:cNvSpPr>
-            <a:spLocks noGrp="1"/>
-          </p:cNvSpPr>
-          <p:nvPr>
-            <p:ph idx="1"/>
-          </p:nvPr>
-        </p:nvSpPr>
-        <p:spPr/>
-        <p:txBody>
-          <a:bodyPr>
-            <a:normAutofit/>
-          </a:bodyPr>
-          <a:lstStyle/>
-          <a:p>
-            <a:r>
-              <a:rPr lang="en-IN" sz="2800" dirty="0" err="1" smtClean="0"/>
-              <a:t>MongoDB</a:t>
-            </a:r>
-            <a:r>
-              <a:rPr lang="en-IN" sz="2800" dirty="0" smtClean="0"/>
-              <a:t> uses a journal file size limit of 100 MB</a:t>
-            </a:r>
-          </a:p>
-          <a:p>
-            <a:r>
-              <a:rPr lang="en-IN" sz="2800" dirty="0" smtClean="0"/>
-              <a:t>For the journal files, </a:t>
-            </a:r>
-            <a:r>
-              <a:rPr lang="en-IN" sz="2800" dirty="0" err="1" smtClean="0"/>
-              <a:t>MongoDB</a:t>
-            </a:r>
-            <a:r>
-              <a:rPr lang="en-IN" sz="2800" dirty="0" smtClean="0"/>
-              <a:t> creates a subdirectory named journal under the </a:t>
-            </a:r>
-            <a:r>
-              <a:rPr lang="en-IN" sz="2800" dirty="0" err="1" smtClean="0"/>
-              <a:t>dbPath</a:t>
-            </a:r>
-            <a:r>
-              <a:rPr lang="en-IN" sz="2800" dirty="0" smtClean="0"/>
-              <a:t> directory.</a:t>
-            </a:r>
-          </a:p>
-          <a:p>
-            <a:r>
-              <a:rPr lang="en-IN" sz="2800" dirty="0" err="1" smtClean="0"/>
-              <a:t>Dbpath</a:t>
-            </a:r>
-            <a:r>
-              <a:rPr lang="en-IN" sz="2800" dirty="0" smtClean="0"/>
-              <a:t>:</a:t>
-            </a:r>
-            <a:r>
-              <a:rPr lang="en-IN" sz="2800" dirty="0" smtClean="0">
-                <a:solidFill>
-                  <a:schemeClr val="tx2">
-                    <a:lumMod val="60000"/>
-                    <a:lumOff val="40000"/>
-                  </a:schemeClr>
-                </a:solidFill>
-              </a:rPr>
-              <a:t> /</a:t>
-            </a:r>
-            <a:r>
-              <a:rPr lang="en-IN" sz="2800" dirty="0" err="1" smtClean="0">
-                <a:solidFill>
-                  <a:schemeClr val="tx2">
-                    <a:lumMod val="60000"/>
-                    <a:lumOff val="40000"/>
-                  </a:schemeClr>
-                </a:solidFill>
-              </a:rPr>
-              <a:t>var/lib/mongodb</a:t>
-            </a:r>
-            <a:endParaRPr lang="en-IN" sz="2800" dirty="0" smtClean="0">
-              <a:solidFill>
-                <a:schemeClr val="tx2">
-                  <a:lumMod val="60000"/>
-                  <a:lumOff val="40000"/>
-                </a:schemeClr>
-              </a:solidFill>
-            </a:endParaRPr>
-          </a:p>
-          <a:p>
-            <a:r>
-              <a:rPr lang="en-IN" sz="2800" dirty="0" smtClean="0"/>
-              <a:t>Storage Engines</a:t>
-            </a:r>
-          </a:p>
-          <a:p>
-            <a:pPr lvl="1"/>
-            <a:r>
-              <a:rPr lang="en-IN" dirty="0" smtClean="0"/>
-              <a:t>MMAPv1 Storage Engine</a:t>
-            </a:r>
-          </a:p>
-          <a:p>
-            <a:pPr lvl="1"/>
-            <a:r>
-              <a:rPr lang="en-IN" dirty="0" err="1" smtClean="0"/>
-              <a:t>WiredTiger</a:t>
-            </a:r>
-            <a:r>
-              <a:rPr lang="en-IN" dirty="0" smtClean="0"/>
-              <a:t> Storage Engine</a:t>
-            </a:r>
-          </a:p>
-          <a:p>
-            <a:endParaRPr lang="en-US" sz="2800" dirty="0"/>
-          </a:p>
-        </p:txBody>
-      </p:sp>
-      <p:sp>
-        <p:nvSpPr>
-          <p:cNvPr id="5" name="Footer Placeholder 3"/>
-          <p:cNvSpPr>
-            <a:spLocks noGrp="1"/>
-          </p:cNvSpPr>
-          <p:nvPr>
-            <p:ph type="ftr" sz="quarter" idx="11"/>
-          </p:nvPr>
-        </p:nvSpPr>
-        <p:spPr>
-          <a:xfrm>
-            <a:off x="3048000" y="6645275"/>
-            <a:ext cx="3048000" cy="288925"/>
-          </a:xfrm>
-        </p:spPr>
-        <p:txBody>
-          <a:bodyPr/>
-          <a:lstStyle/>
-          <a:p>
-            <a:r>
-              <a:rPr lang="en-US" b="1" dirty="0" smtClean="0">
-                <a:solidFill>
-                  <a:schemeClr val="tx2"/>
-                </a:solidFill>
-              </a:rPr>
-              <a:t>https://in.linkedin.com/in/sujithsudhakaran</a:t>
-            </a:r>
-            <a:endParaRPr lang="en-US" b="1" dirty="0">
-              <a:solidFill>
-                <a:schemeClr val="tx2"/>
-              </a:solidFill>
-            </a:endParaRPr>
-          </a:p>
-        </p:txBody>
-      </p:sp>
-    </p:spTree>
-  </p:cSld>
-  <p:clrMapOvr>
-    <a:masterClrMapping/>
-  </p:clrMapOvr>
-  <p:timing>
-    <p:tnLst>
-      <p:par>
-        <p:cTn id="1" dur="indefinite" restart="never" nodeType="tmRoot"/>
-      </p:par>
-    </p:tnLst>
-  </p:timing>
-</p:sld>
-</file>
-
 <file path=ppt/slides/slide13.xml><?xml version="1.0" encoding="utf-8"?>
 <p:sld xmlns:a="http://schemas.openxmlformats.org/drawingml/2006/main" xmlns:r="http://schemas.openxmlformats.org/officeDocument/2006/relationships" xmlns:p="http://schemas.openxmlformats.org/presentationml/2006/main">
   <p:cSld>
@@ -6880,9 +7646,9 @@
           <a:p>
             <a:pPr lvl="1"/>
             <a:r>
-              <a:rPr lang="en-IN" dirty="0" smtClean="0">
+              <a:rPr lang="en-IN" i="1" dirty="0" smtClean="0">
                 <a:solidFill>
-                  <a:schemeClr val="tx2"/>
+                  <a:srgbClr val="0000FF"/>
                 </a:solidFill>
               </a:rPr>
               <a:t>Make a small UI, only the login page and welcome page. Initiate a session after login, the session should timeout in 1 min. If you reload the login page after 1 min, the session should timeout(make use of the TTL feature)</a:t>
@@ -6897,9 +7663,9 @@
           <a:p>
             <a:pPr lvl="1"/>
             <a:r>
-              <a:rPr lang="en-US" dirty="0" smtClean="0">
+              <a:rPr lang="en-US" i="1" dirty="0" smtClean="0">
                 <a:solidFill>
-                  <a:schemeClr val="tx2"/>
+                  <a:srgbClr val="0000FF"/>
                 </a:solidFill>
               </a:rPr>
               <a:t>We have seen a rollback scenario when the transaction is in pending state. Implement a rollback scenario where the transaction is in applied state but not completed. So, system should be able to rollback the applied changes.</a:t>
@@ -7127,34 +7893,25 @@
               <a:t>Choose the repo “</a:t>
             </a:r>
             <a:r>
-              <a:rPr lang="en-US" dirty="0" err="1" smtClean="0">
+              <a:rPr lang="en-US" i="1" dirty="0" err="1" smtClean="0">
                 <a:solidFill>
-                  <a:schemeClr val="tx2">
-                    <a:lumMod val="60000"/>
-                    <a:lumOff val="40000"/>
-                  </a:schemeClr>
+                  <a:srgbClr val="0000FF"/>
                 </a:solidFill>
               </a:rPr>
               <a:t>mongodb</a:t>
             </a:r>
             <a:r>
-              <a:rPr lang="en-US" dirty="0" smtClean="0">
+              <a:rPr lang="en-US" i="1" dirty="0" smtClean="0">
                 <a:solidFill>
-                  <a:schemeClr val="tx2">
-                    <a:lumMod val="60000"/>
-                    <a:lumOff val="40000"/>
-                  </a:schemeClr>
+                  <a:srgbClr val="0000FF"/>
                 </a:solidFill>
               </a:rPr>
               <a:t>-tips-and-</a:t>
             </a:r>
             <a:r>
-              <a:rPr lang="en-US" dirty="0" err="1" smtClean="0">
+              <a:rPr lang="en-US" i="1" dirty="0" err="1" smtClean="0">
                 <a:solidFill>
-                  <a:schemeClr val="tx2">
-                    <a:lumMod val="60000"/>
-                    <a:lumOff val="40000"/>
-                  </a:schemeClr>
+                  <a:srgbClr val="0000FF"/>
                 </a:solidFill>
               </a:rPr>
               <a:t>advfeatures</a:t>
@@ -7230,24 +7987,18 @@
             <a:r>
               <a:rPr lang="en-US" i="1" dirty="0" err="1" smtClean="0">
                 <a:solidFill>
-                  <a:schemeClr val="tx2">
-                    <a:lumMod val="60000"/>
-                    <a:lumOff val="40000"/>
-                  </a:schemeClr>
+                  <a:srgbClr val="0000FF"/>
                 </a:solidFill>
               </a:rPr>
-              <a:t>npm</a:t>
+              <a:t>npm install</a:t>
             </a:r>
             <a:r>
               <a:rPr lang="en-US" i="1" dirty="0" smtClean="0">
                 <a:solidFill>
-                  <a:schemeClr val="tx2">
-                    <a:lumMod val="60000"/>
-                    <a:lumOff val="40000"/>
-                  </a:schemeClr>
+                  <a:schemeClr val="tx2"/>
                 </a:solidFill>
               </a:rPr>
-              <a:t> install </a:t>
+              <a:t> </a:t>
             </a:r>
             <a:r>
               <a:rPr lang="en-US" dirty="0" smtClean="0"/>
@@ -7374,7 +8125,7 @@
             <a:r>
               <a:rPr lang="en-IN" i="1" dirty="0" err="1" smtClean="0">
                 <a:solidFill>
-                  <a:srgbClr val="6699CC"/>
+                  <a:srgbClr val="0000FF"/>
                 </a:solidFill>
               </a:rPr>
               <a:t>cloned_location/dbDumps</a:t>
@@ -7387,33 +8138,33 @@
           <a:p>
             <a:pPr lvl="1"/>
             <a:r>
-              <a:rPr lang="en-IN" i="1" dirty="0" err="1" smtClean="0">
+              <a:rPr lang="en-IN" sz="2600" i="1" dirty="0" err="1" smtClean="0">
                 <a:solidFill>
-                  <a:srgbClr val="6699CC"/>
+                  <a:srgbClr val="0000FF"/>
                 </a:solidFill>
               </a:rPr>
               <a:t>mongoimport</a:t>
             </a:r>
             <a:r>
-              <a:rPr lang="en-IN" i="1" dirty="0" smtClean="0">
+              <a:rPr lang="en-IN" sz="2600" i="1" dirty="0" smtClean="0">
                 <a:solidFill>
-                  <a:srgbClr val="6699CC"/>
+                  <a:srgbClr val="0000FF"/>
                 </a:solidFill>
               </a:rPr>
               <a:t> -d </a:t>
             </a:r>
             <a:r>
-              <a:rPr lang="en-IN" i="1" dirty="0" err="1" smtClean="0">
+              <a:rPr lang="en-IN" sz="2600" i="1" dirty="0" err="1" smtClean="0">
                 <a:solidFill>
-                  <a:srgbClr val="6699CC"/>
+                  <a:srgbClr val="0000FF"/>
                 </a:solidFill>
               </a:rPr>
               <a:t>mongodbfeatures</a:t>
             </a:r>
             <a:r>
-              <a:rPr lang="en-IN" i="1" dirty="0" smtClean="0">
+              <a:rPr lang="en-IN" sz="2600" i="1" dirty="0" smtClean="0">
                 <a:solidFill>
-                  <a:srgbClr val="6699CC"/>
+                  <a:srgbClr val="0000FF"/>
                 </a:solidFill>
               </a:rPr>
               <a:t> -c p1 --file positionDump1.json</a:t>
@@ -7422,33 +8173,33 @@
           <a:p>
             <a:pPr lvl="1"/>
             <a:r>
-              <a:rPr lang="en-IN" i="1" dirty="0" err="1" smtClean="0">
+              <a:rPr lang="en-IN" sz="2600" i="1" dirty="0" err="1" smtClean="0">
                 <a:solidFill>
-                  <a:srgbClr val="6699CC"/>
+                  <a:srgbClr val="0000FF"/>
                 </a:solidFill>
               </a:rPr>
               <a:t>mongoimport</a:t>
             </a:r>
             <a:r>
-              <a:rPr lang="en-IN" i="1" dirty="0" smtClean="0">
+              <a:rPr lang="en-IN" sz="2600" i="1" dirty="0" smtClean="0">
                 <a:solidFill>
-                  <a:srgbClr val="6699CC"/>
+                  <a:srgbClr val="0000FF"/>
                 </a:solidFill>
               </a:rPr>
               <a:t> -d </a:t>
             </a:r>
             <a:r>
-              <a:rPr lang="en-IN" i="1" dirty="0" err="1" smtClean="0">
+              <a:rPr lang="en-IN" sz="2600" i="1" dirty="0" err="1" smtClean="0">
                 <a:solidFill>
-                  <a:srgbClr val="6699CC"/>
+                  <a:srgbClr val="0000FF"/>
                 </a:solidFill>
               </a:rPr>
               <a:t>mongodbfeatures</a:t>
             </a:r>
             <a:r>
-              <a:rPr lang="en-IN" i="1" dirty="0" smtClean="0">
+              <a:rPr lang="en-IN" sz="2600" i="1" dirty="0" smtClean="0">
                 <a:solidFill>
-                  <a:srgbClr val="6699CC"/>
+                  <a:srgbClr val="0000FF"/>
                 </a:solidFill>
               </a:rPr>
               <a:t> -c p2 --file positionDump2.json</a:t>
@@ -7457,46 +8208,50 @@
           <a:p>
             <a:pPr lvl="1"/>
             <a:r>
-              <a:rPr lang="en-IN" i="1" dirty="0" err="1" smtClean="0">
+              <a:rPr lang="en-IN" sz="2600" i="1" dirty="0" err="1" smtClean="0">
                 <a:solidFill>
-                  <a:srgbClr val="6699CC"/>
+                  <a:srgbClr val="0000FF"/>
                 </a:solidFill>
               </a:rPr>
               <a:t>mongoimport</a:t>
             </a:r>
             <a:r>
-              <a:rPr lang="en-IN" i="1" dirty="0" smtClean="0">
+              <a:rPr lang="en-IN" sz="2600" i="1" dirty="0" smtClean="0">
                 <a:solidFill>
-                  <a:srgbClr val="6699CC"/>
+                  <a:srgbClr val="0000FF"/>
                 </a:solidFill>
               </a:rPr>
               <a:t> -d </a:t>
             </a:r>
             <a:r>
-              <a:rPr lang="en-IN" i="1" dirty="0" err="1" smtClean="0">
+              <a:rPr lang="en-IN" sz="2600" i="1" dirty="0" err="1" smtClean="0">
                 <a:solidFill>
-                  <a:srgbClr val="6699CC"/>
+                  <a:srgbClr val="0000FF"/>
                 </a:solidFill>
               </a:rPr>
               <a:t>mongodbfeatures</a:t>
             </a:r>
             <a:r>
-              <a:rPr lang="en-IN" i="1" dirty="0" smtClean="0">
+              <a:rPr lang="en-IN" sz="2600" i="1" dirty="0" smtClean="0">
                 <a:solidFill>
-                  <a:srgbClr val="6699CC"/>
+                  <a:srgbClr val="0000FF"/>
                 </a:solidFill>
               </a:rPr>
               <a:t> -c accounts --file </a:t>
             </a:r>
             <a:r>
-              <a:rPr lang="en-IN" i="1" dirty="0" err="1" smtClean="0">
+              <a:rPr lang="en-IN" sz="2600" i="1" dirty="0" err="1" smtClean="0">
                 <a:solidFill>
-                  <a:srgbClr val="6699CC"/>
+                  <a:srgbClr val="0000FF"/>
                 </a:solidFill>
               </a:rPr>
               <a:t>accountsDump.json</a:t>
             </a:r>
-            <a:endParaRPr lang="en-US" dirty="0"/>
+            <a:endParaRPr lang="en-US" sz="2600" i="1" dirty="0">
+              <a:solidFill>
+                <a:srgbClr val="0000FF"/>
+              </a:solidFill>
+            </a:endParaRPr>
           </a:p>
         </p:txBody>
       </p:sp>
@@ -7609,28 +8364,24 @@
         </p:nvSpPr>
         <p:spPr/>
         <p:txBody>
-          <a:bodyPr/>
+          <a:bodyPr>
+            <a:normAutofit/>
+          </a:bodyPr>
           <a:lstStyle/>
           <a:p>
             <a:r>
               <a:rPr lang="en-IN" dirty="0" smtClean="0"/>
-              <a:t>Open-source</a:t>
-            </a:r>
-          </a:p>
-          <a:p>
+              <a:t>Open-source, cross platform and document oriented</a:t>
+            </a:r>
+          </a:p>
+          <a:p>
+            <a:r>
+              <a:rPr lang="en-IN" dirty="0" smtClean="0"/>
+              <a:t>Data </a:t>
+            </a:r>
             <a:r>
               <a:rPr lang="en-IN" dirty="0"/>
-              <a:t>Record is a </a:t>
-            </a:r>
-            <a:r>
-              <a:rPr lang="en-IN" dirty="0" smtClean="0"/>
-              <a:t>document</a:t>
-            </a:r>
-          </a:p>
-          <a:p>
-            <a:r>
-              <a:rPr lang="en-IN" dirty="0"/>
-              <a:t>Data is saved in BSON; JSON is just a subset of </a:t>
+              <a:t>is saved in BSON; JSON is just a subset of </a:t>
             </a:r>
             <a:r>
               <a:rPr lang="en-IN" dirty="0" smtClean="0"/>
@@ -8032,67 +8783,6 @@
                       </p:childTnLst>
                     </p:cTn>
                   </p:par>
-                  <p:par>
-                    <p:cTn id="28" fill="hold">
-                      <p:stCondLst>
-                        <p:cond delay="indefinite"/>
-                      </p:stCondLst>
-                      <p:childTnLst>
-                        <p:par>
-                          <p:cTn id="29" fill="hold">
-                            <p:stCondLst>
-                              <p:cond delay="0"/>
-                            </p:stCondLst>
-                            <p:childTnLst>
-                              <p:par>
-                                <p:cTn id="30" presetID="3" presetClass="entr" presetSubtype="10" fill="hold" nodeType="clickEffect">
-                                  <p:stCondLst>
-                                    <p:cond delay="0"/>
-                                  </p:stCondLst>
-                                  <p:childTnLst>
-                                    <p:set>
-                                      <p:cBhvr>
-                                        <p:cTn id="31" dur="1" fill="hold">
-                                          <p:stCondLst>
-                                            <p:cond delay="0"/>
-                                          </p:stCondLst>
-                                        </p:cTn>
-                                        <p:tgtEl>
-                                          <p:spTgt spid="3">
-                                            <p:txEl>
-                                              <p:pRg st="5" end="5"/>
-                                            </p:txEl>
-                                          </p:spTgt>
-                                        </p:tgtEl>
-                                        <p:attrNameLst>
-                                          <p:attrName>style.visibility</p:attrName>
-                                        </p:attrNameLst>
-                                      </p:cBhvr>
-                                      <p:to>
-                                        <p:strVal val="visible"/>
-                                      </p:to>
-                                    </p:set>
-                                    <p:animEffect transition="in" filter="blinds(horizontal)">
-                                      <p:cBhvr>
-                                        <p:cTn id="32" dur="500"/>
-                                        <p:tgtEl>
-                                          <p:spTgt spid="3">
-                                            <p:txEl>
-                                              <p:pRg st="5" end="5"/>
-                                            </p:txEl>
-                                          </p:spTgt>
-                                        </p:tgtEl>
-                                      </p:cBhvr>
-                                    </p:animEffect>
-                                  </p:childTnLst>
-                                </p:cTn>
-                              </p:par>
-                            </p:childTnLst>
-                          </p:cTn>
-                        </p:par>
-                      </p:childTnLst>
-                    </p:cTn>
-                  </p:par>
                 </p:childTnLst>
               </p:cTn>
               <p:prevCondLst>
@@ -8261,7 +8951,7 @@
             <a:r>
               <a:rPr lang="en-IN" i="1" dirty="0" smtClean="0">
                 <a:solidFill>
-                  <a:srgbClr val="6699CC"/>
+                  <a:srgbClr val="0000FF"/>
                 </a:solidFill>
               </a:rPr>
               <a:t>db.p1.find({grades: {$</a:t>
@@ -8269,7 +8959,7 @@
             <a:r>
               <a:rPr lang="en-IN" i="1" dirty="0" err="1" smtClean="0">
                 <a:solidFill>
-                  <a:srgbClr val="6699CC"/>
+                  <a:srgbClr val="0000FF"/>
                 </a:solidFill>
               </a:rPr>
               <a:t>gt</a:t>
@@ -8277,12 +8967,16 @@
             <a:r>
               <a:rPr lang="en-IN" i="1" dirty="0" smtClean="0">
                 <a:solidFill>
-                  <a:srgbClr val="6699CC"/>
+                  <a:srgbClr val="0000FF"/>
                 </a:solidFill>
               </a:rPr>
               <a:t>: 85}});</a:t>
             </a:r>
-            <a:endParaRPr lang="en-IN" dirty="0" smtClean="0"/>
+            <a:endParaRPr lang="en-IN" dirty="0" smtClean="0">
+              <a:solidFill>
+                <a:srgbClr val="0000FF"/>
+              </a:solidFill>
+            </a:endParaRPr>
           </a:p>
           <a:p>
             <a:r>
@@ -8295,7 +8989,7 @@
             <a:r>
               <a:rPr lang="en-IN" i="1" dirty="0" smtClean="0">
                 <a:solidFill>
-                  <a:srgbClr val="6699CC"/>
+                  <a:srgbClr val="0000FF"/>
                 </a:solidFill>
               </a:rPr>
               <a:t>db.p2.find({“</a:t>
@@ -8303,7 +8997,7 @@
             <a:r>
               <a:rPr lang="en-IN" i="1" dirty="0" err="1" smtClean="0">
                 <a:solidFill>
-                  <a:srgbClr val="6699CC"/>
+                  <a:srgbClr val="0000FF"/>
                 </a:solidFill>
               </a:rPr>
               <a:t>grades.grade</a:t>
@@ -8311,7 +9005,7 @@
             <a:r>
               <a:rPr lang="en-IN" i="1" dirty="0" smtClean="0">
                 <a:solidFill>
-                  <a:srgbClr val="6699CC"/>
+                  <a:srgbClr val="0000FF"/>
                 </a:solidFill>
               </a:rPr>
               <a:t>”: {$</a:t>
@@ -8319,7 +9013,7 @@
             <a:r>
               <a:rPr lang="en-IN" i="1" dirty="0" err="1" smtClean="0">
                 <a:solidFill>
-                  <a:srgbClr val="6699CC"/>
+                  <a:srgbClr val="0000FF"/>
                 </a:solidFill>
               </a:rPr>
               <a:t>gte</a:t>
@@ -8327,7 +9021,7 @@
             <a:r>
               <a:rPr lang="en-IN" i="1" dirty="0" smtClean="0">
                 <a:solidFill>
-                  <a:srgbClr val="6699CC"/>
+                  <a:srgbClr val="0000FF"/>
                 </a:solidFill>
               </a:rPr>
               <a:t>: 85}}, {“grades.$”: 1});</a:t>
@@ -8344,7 +9038,7 @@
             <a:r>
               <a:rPr lang="en-IN" i="1" dirty="0" smtClean="0">
                 <a:solidFill>
-                  <a:srgbClr val="6699CC"/>
+                  <a:srgbClr val="0000FF"/>
                 </a:solidFill>
               </a:rPr>
               <a:t>db.p2.update({“</a:t>
@@ -8352,7 +9046,7 @@
             <a:r>
               <a:rPr lang="en-IN" i="1" dirty="0" err="1" smtClean="0">
                 <a:solidFill>
-                  <a:srgbClr val="6699CC"/>
+                  <a:srgbClr val="0000FF"/>
                 </a:solidFill>
               </a:rPr>
               <a:t>grades.grade</a:t>
@@ -8360,7 +9054,7 @@
             <a:r>
               <a:rPr lang="en-IN" i="1" dirty="0" smtClean="0">
                 <a:solidFill>
-                  <a:srgbClr val="6699CC"/>
+                  <a:srgbClr val="0000FF"/>
                 </a:solidFill>
               </a:rPr>
               <a:t>”: {$</a:t>
@@ -8368,7 +9062,7 @@
             <a:r>
               <a:rPr lang="en-IN" i="1" dirty="0" err="1" smtClean="0">
                 <a:solidFill>
-                  <a:srgbClr val="6699CC"/>
+                  <a:srgbClr val="0000FF"/>
                 </a:solidFill>
               </a:rPr>
               <a:t>gte</a:t>
@@ -8376,7 +9070,7 @@
             <a:r>
               <a:rPr lang="en-IN" i="1" dirty="0" smtClean="0">
                 <a:solidFill>
-                  <a:srgbClr val="6699CC"/>
+                  <a:srgbClr val="0000FF"/>
                 </a:solidFill>
               </a:rPr>
               <a:t>: 85}}, {$set: {</a:t>
@@ -8384,7 +9078,7 @@
             <a:r>
               <a:rPr lang="en-IN" i="1" dirty="0" err="1" smtClean="0">
                 <a:solidFill>
-                  <a:srgbClr val="6699CC"/>
+                  <a:srgbClr val="0000FF"/>
                 </a:solidFill>
               </a:rPr>
               <a:t>grades.$.std</a:t>
@@ -8392,7 +9086,7 @@
             <a:r>
               <a:rPr lang="en-IN" i="1" dirty="0" smtClean="0">
                 <a:solidFill>
-                  <a:srgbClr val="6699CC"/>
+                  <a:srgbClr val="0000FF"/>
                 </a:solidFill>
               </a:rPr>
               <a:t>: 10}}, {multi: true});</a:t>
@@ -9158,17 +9852,22 @@
             <a:r>
               <a:rPr lang="en-IN" sz="2800" i="1" dirty="0" err="1">
                 <a:solidFill>
-                  <a:schemeClr val="tx2">
-                    <a:lumMod val="60000"/>
-                    <a:lumOff val="40000"/>
-                  </a:schemeClr>
+                  <a:srgbClr val="0000FF"/>
                 </a:solidFill>
               </a:rPr>
               <a:t>expireAfterSeconds</a:t>
             </a:r>
             <a:r>
+              <a:rPr lang="en-IN" sz="2800" dirty="0">
+                <a:solidFill>
+                  <a:srgbClr val="0000FF"/>
+                </a:solidFill>
+              </a:rPr>
+              <a:t>:</a:t>
+            </a:r>
+            <a:r>
               <a:rPr lang="en-IN" sz="2800" dirty="0"/>
-              <a:t>: </a:t>
+              <a:t> </a:t>
             </a:r>
             <a:r>
               <a:rPr lang="en-IN" sz="2800" dirty="0" smtClean="0"/>
@@ -9186,10 +9885,7 @@
             <a:r>
               <a:rPr lang="en-IN" sz="2400" i="1" dirty="0" smtClean="0">
                 <a:solidFill>
-                  <a:schemeClr val="tx2">
-                    <a:lumMod val="60000"/>
-                    <a:lumOff val="40000"/>
-                  </a:schemeClr>
+                  <a:srgbClr val="0000FF"/>
                 </a:solidFill>
               </a:rPr>
               <a:t>node </a:t>
@@ -9197,20 +9893,14 @@
             <a:r>
               <a:rPr lang="en-IN" sz="2400" i="1" dirty="0" err="1" smtClean="0">
                 <a:solidFill>
-                  <a:schemeClr val="tx2">
-                    <a:lumMod val="60000"/>
-                    <a:lumOff val="40000"/>
-                  </a:schemeClr>
+                  <a:srgbClr val="0000FF"/>
                 </a:solidFill>
               </a:rPr>
               <a:t>app.js</a:t>
             </a:r>
             <a:endParaRPr lang="en-IN" sz="2400" i="1" dirty="0" smtClean="0">
               <a:solidFill>
-                <a:schemeClr val="tx2">
-                  <a:lumMod val="60000"/>
-                  <a:lumOff val="40000"/>
-                </a:schemeClr>
+                <a:srgbClr val="0000FF"/>
               </a:solidFill>
             </a:endParaRPr>
           </a:p>
@@ -9230,10 +9920,7 @@
             <a:r>
               <a:rPr lang="en-IN" sz="2800" i="1" dirty="0" smtClean="0">
                 <a:solidFill>
-                  <a:schemeClr val="tx2">
-                    <a:lumMod val="60000"/>
-                    <a:lumOff val="40000"/>
-                  </a:schemeClr>
+                  <a:srgbClr val="0000FF"/>
                 </a:solidFill>
               </a:rPr>
               <a:t>routes/</a:t>
@@ -9241,10 +9928,7 @@
             <a:r>
               <a:rPr lang="en-IN" sz="2800" i="1" dirty="0" err="1" smtClean="0">
                 <a:solidFill>
-                  <a:schemeClr val="tx2">
-                    <a:lumMod val="60000"/>
-                    <a:lumOff val="40000"/>
-                  </a:schemeClr>
+                  <a:srgbClr val="0000FF"/>
                 </a:solidFill>
               </a:rPr>
               <a:t>ttl.js</a:t>
@@ -9822,33 +10506,43 @@
             </a:r>
             <a:r>
               <a:rPr lang="en-IN" sz="2800" dirty="0" smtClean="0"/>
-              <a:t> route from </a:t>
+              <a:t> route from</a:t>
             </a:r>
             <a:r>
               <a:rPr lang="en-IN" sz="2800" dirty="0" smtClean="0">
                 <a:solidFill>
-                  <a:schemeClr val="tx2">
-                    <a:lumMod val="60000"/>
-                    <a:lumOff val="40000"/>
-                  </a:schemeClr>
+                  <a:srgbClr val="0000FF"/>
+                </a:solidFill>
+              </a:rPr>
+              <a:t> </a:t>
+            </a:r>
+            <a:r>
+              <a:rPr lang="en-IN" sz="2800" i="1" dirty="0" smtClean="0">
+                <a:solidFill>
+                  <a:srgbClr val="0000FF"/>
                 </a:solidFill>
               </a:rPr>
               <a:t>routes/</a:t>
             </a:r>
             <a:r>
-              <a:rPr lang="en-IN" sz="2800" dirty="0" err="1" smtClean="0">
+              <a:rPr lang="en-IN" sz="2800" i="1" dirty="0" err="1" smtClean="0">
                 <a:solidFill>
-                  <a:schemeClr val="tx2">
-                    <a:lumMod val="60000"/>
-                    <a:lumOff val="40000"/>
-                  </a:schemeClr>
+                  <a:srgbClr val="0000FF"/>
                 </a:solidFill>
               </a:rPr>
               <a:t>bulkInsert.js</a:t>
             </a:r>
             <a:r>
+              <a:rPr lang="en-IN" sz="2800" dirty="0" smtClean="0">
+                <a:solidFill>
+                  <a:srgbClr val="0000FF"/>
+                </a:solidFill>
+              </a:rPr>
+              <a:t> </a:t>
+            </a:r>
+            <a:r>
               <a:rPr lang="en-IN" sz="2800" dirty="0" smtClean="0"/>
-              <a:t> file</a:t>
+              <a:t>file</a:t>
             </a:r>
           </a:p>
           <a:p>
@@ -10537,12 +11231,9 @@
           <a:p>
             <a:pPr lvl="1"/>
             <a:r>
-              <a:rPr lang="en-IN" sz="2400" b="1" i="1" dirty="0" err="1" smtClean="0">
+              <a:rPr lang="en-IN" sz="2400" i="1" dirty="0" err="1" smtClean="0">
                 <a:solidFill>
-                  <a:schemeClr val="tx2">
-                    <a:lumMod val="60000"/>
-                    <a:lumOff val="40000"/>
-                  </a:schemeClr>
+                  <a:srgbClr val="0000FF"/>
                 </a:solidFill>
               </a:rPr>
               <a:t>db.bulk.update</a:t>
@@ -10550,10 +11241,7 @@
             <a:r>
               <a:rPr lang="en-IN" sz="2400" i="1" dirty="0" smtClean="0">
                 <a:solidFill>
-                  <a:schemeClr val="tx2">
-                    <a:lumMod val="60000"/>
-                    <a:lumOff val="40000"/>
-                  </a:schemeClr>
+                  <a:srgbClr val="0000FF"/>
                 </a:solidFill>
               </a:rPr>
               <a:t>({}, {$set: {</a:t>
@@ -10561,10 +11249,7 @@
             <a:r>
               <a:rPr lang="en-IN" sz="2400" i="1" dirty="0" err="1" smtClean="0">
                 <a:solidFill>
-                  <a:schemeClr val="tx2">
-                    <a:lumMod val="60000"/>
-                    <a:lumOff val="40000"/>
-                  </a:schemeClr>
+                  <a:srgbClr val="0000FF"/>
                 </a:solidFill>
               </a:rPr>
               <a:t>val</a:t>
@@ -10572,15 +11257,16 @@
             <a:r>
               <a:rPr lang="en-IN" sz="2400" i="1" dirty="0" smtClean="0">
                 <a:solidFill>
-                  <a:schemeClr val="tx2">
-                    <a:lumMod val="60000"/>
-                    <a:lumOff val="40000"/>
-                  </a:schemeClr>
+                  <a:srgbClr val="0000FF"/>
                 </a:solidFill>
               </a:rPr>
               <a:t>: 1}, {multi: true}}</a:t>
             </a:r>
-            <a:endParaRPr lang="en-IN" sz="2400" dirty="0" smtClean="0"/>
+            <a:endParaRPr lang="en-IN" sz="2400" dirty="0" smtClean="0">
+              <a:solidFill>
+                <a:srgbClr val="0000FF"/>
+              </a:solidFill>
+            </a:endParaRPr>
           </a:p>
           <a:p>
             <a:r>
@@ -10593,10 +11279,7 @@
             <a:r>
               <a:rPr lang="en-IN" sz="2400" i="1" dirty="0" err="1" smtClean="0">
                 <a:solidFill>
-                  <a:schemeClr val="tx2">
-                    <a:lumMod val="60000"/>
-                    <a:lumOff val="40000"/>
-                  </a:schemeClr>
+                  <a:srgbClr val="0000FF"/>
                 </a:solidFill>
               </a:rPr>
               <a:t>db.bulk.update</a:t>
@@ -10604,10 +11287,7 @@
             <a:r>
               <a:rPr lang="en-IN" sz="2400" i="1" dirty="0" smtClean="0">
                 <a:solidFill>
-                  <a:schemeClr val="tx2">
-                    <a:lumMod val="60000"/>
-                    <a:lumOff val="40000"/>
-                  </a:schemeClr>
+                  <a:srgbClr val="0000FF"/>
                 </a:solidFill>
               </a:rPr>
               <a:t>({}, $isolated : 1}, {$set: {</a:t>
@@ -10615,10 +11295,7 @@
             <a:r>
               <a:rPr lang="en-IN" sz="2400" i="1" dirty="0" err="1" smtClean="0">
                 <a:solidFill>
-                  <a:schemeClr val="tx2">
-                    <a:lumMod val="60000"/>
-                    <a:lumOff val="40000"/>
-                  </a:schemeClr>
+                  <a:srgbClr val="0000FF"/>
                 </a:solidFill>
               </a:rPr>
               <a:t>val</a:t>
@@ -10626,20 +11303,14 @@
             <a:r>
               <a:rPr lang="en-IN" sz="2400" i="1" dirty="0" smtClean="0">
                 <a:solidFill>
-                  <a:schemeClr val="tx2">
-                    <a:lumMod val="60000"/>
-                    <a:lumOff val="40000"/>
-                  </a:schemeClr>
+                  <a:srgbClr val="0000FF"/>
                 </a:solidFill>
               </a:rPr>
               <a:t>: 2}, {multi: true}}</a:t>
             </a:r>
             <a:endParaRPr lang="en-US" sz="2400" i="1" dirty="0">
               <a:solidFill>
-                <a:schemeClr val="tx2">
-                  <a:lumMod val="60000"/>
-                  <a:lumOff val="40000"/>
-                </a:schemeClr>
+                <a:srgbClr val="0000FF"/>
               </a:solidFill>
             </a:endParaRPr>
           </a:p>
@@ -11102,10 +11773,34 @@
         <p:spPr/>
         <p:txBody>
           <a:bodyPr>
-            <a:normAutofit/>
+            <a:normAutofit fontScale="92500" lnSpcReduction="20000"/>
           </a:bodyPr>
           <a:lstStyle/>
           <a:p>
+            <a:pPr>
+              <a:buNone/>
+            </a:pPr>
+            <a:r>
+              <a:rPr lang="en-IN" sz="2800" b="1" dirty="0" smtClean="0"/>
+              <a:t>Problem Statement</a:t>
+            </a:r>
+          </a:p>
+          <a:p>
+            <a:pPr>
+              <a:buNone/>
+            </a:pPr>
+            <a:r>
+              <a:rPr lang="en-IN" sz="2800" dirty="0" smtClean="0"/>
+              <a:t>	In our application, we had UI where we had to show the flight details. How could we limit this?</a:t>
+            </a:r>
+          </a:p>
+          <a:p>
+            <a:pPr>
+              <a:buNone/>
+            </a:pPr>
+            <a:endParaRPr lang="en-US" sz="2800" dirty="0" smtClean="0"/>
+          </a:p>
+          <a:p>
             <a:r>
               <a:rPr lang="en-US" sz="2800" dirty="0" smtClean="0"/>
               <a:t>We can make smart use of</a:t>
@@ -11116,10 +11811,7 @@
             <a:r>
               <a:rPr lang="en-US" sz="2400" i="1" dirty="0" smtClean="0">
                 <a:solidFill>
-                  <a:schemeClr val="tx2">
-                    <a:lumMod val="60000"/>
-                    <a:lumOff val="40000"/>
-                  </a:schemeClr>
+                  <a:srgbClr val="0000FF"/>
                 </a:solidFill>
               </a:rPr>
               <a:t>skip()</a:t>
@@ -11130,10 +11822,7 @@
             <a:r>
               <a:rPr lang="en-US" sz="2400" i="1" dirty="0" smtClean="0">
                 <a:solidFill>
-                  <a:schemeClr val="tx2">
-                    <a:lumMod val="60000"/>
-                    <a:lumOff val="40000"/>
-                  </a:schemeClr>
+                  <a:srgbClr val="0000FF"/>
                 </a:solidFill>
               </a:rPr>
               <a:t>limit()</a:t>
@@ -11166,17 +11855,26 @@
             <a:r>
               <a:rPr lang="en-US" sz="2800" dirty="0" smtClean="0">
                 <a:solidFill>
-                  <a:schemeClr val="tx2">
-                    <a:lumMod val="60000"/>
-                    <a:lumOff val="40000"/>
-                  </a:schemeClr>
+                  <a:srgbClr val="0000FF"/>
                 </a:solidFill>
               </a:rPr>
-              <a:t>routes/paging.js</a:t>
+              <a:t>r</a:t>
+            </a:r>
+            <a:r>
+              <a:rPr lang="en-US" sz="2800" i="1" dirty="0" smtClean="0">
+                <a:solidFill>
+                  <a:srgbClr val="0000FF"/>
+                </a:solidFill>
+              </a:rPr>
+              <a:t>outes/paging.js</a:t>
+            </a:r>
+            <a:r>
+              <a:rPr lang="en-US" sz="2800" i="1" dirty="0" smtClean="0"/>
+              <a:t> </a:t>
             </a:r>
             <a:r>
               <a:rPr lang="en-US" sz="2800" dirty="0" smtClean="0"/>
-              <a:t> file</a:t>
+              <a:t>file</a:t>
             </a:r>
           </a:p>
           <a:p>
@@ -11196,23 +11894,17 @@
           <a:p>
             <a:pPr lvl="1"/>
             <a:r>
-              <a:rPr lang="en-US" sz="2400" dirty="0" err="1" smtClean="0">
+              <a:rPr lang="en-US" sz="2400" i="1" dirty="0" err="1" smtClean="0">
                 <a:solidFill>
-                  <a:schemeClr val="tx2">
-                    <a:lumMod val="60000"/>
-                    <a:lumOff val="40000"/>
-                  </a:schemeClr>
+                  <a:srgbClr val="0000FF"/>
                 </a:solidFill>
               </a:rPr>
               <a:t>pageNumber</a:t>
             </a:r>
             <a:r>
-              <a:rPr lang="en-US" sz="2400" dirty="0" smtClean="0">
+              <a:rPr lang="en-US" sz="2400" i="1" dirty="0" smtClean="0">
                 <a:solidFill>
-                  <a:schemeClr val="tx2">
-                    <a:lumMod val="60000"/>
-                    <a:lumOff val="40000"/>
-                  </a:schemeClr>
+                  <a:srgbClr val="0000FF"/>
                 </a:solidFill>
               </a:rPr>
               <a:t>: 1, size: 2</a:t>
@@ -11374,15 +12066,33 @@
                                   </p:childTnLst>
                                 </p:cTn>
                               </p:par>
+                            </p:childTnLst>
+                          </p:cTn>
+                        </p:par>
+                      </p:childTnLst>
+                    </p:cTn>
+                  </p:par>
+                  <p:par>
+                    <p:cTn id="11" fill="hold">
+                      <p:stCondLst>
+                        <p:cond delay="indefinite"/>
+                      </p:stCondLst>
+                      <p:childTnLst>
+                        <p:par>
+                          <p:cTn id="12" fill="hold">
+                            <p:stCondLst>
+                              <p:cond delay="0"/>
+                            </p:stCondLst>
+                            <p:childTnLst>
                               <p:par>
-                                <p:cTn id="11" presetID="3" presetClass="entr" presetSubtype="10" fill="hold" nodeType="withEffect">
+                                <p:cTn id="13" presetID="3" presetClass="entr" presetSubtype="10" fill="hold" nodeType="clickEffect">
                                   <p:stCondLst>
                                     <p:cond delay="0"/>
                                   </p:stCondLst>
                                   <p:childTnLst>
                                     <p:set>
                                       <p:cBhvr>
-                                        <p:cTn id="12" dur="1" fill="hold">
+                                        <p:cTn id="14" dur="1" fill="hold">
                                           <p:stCondLst>
                                             <p:cond delay="0"/>
                                           </p:stCondLst>
@@ -11390,7 +12100,7 @@
                                         <p:tgtEl>
                                           <p:spTgt spid="3">
                                             <p:txEl>
-                                              <p:pRg st="2" end="2"/>
+                                              <p:pRg st="3" end="3"/>
                                             </p:txEl>
                                           </p:spTgt>
                                         </p:tgtEl>
@@ -11404,11 +12114,11 @@
                                     </p:set>
                                     <p:animEffect transition="in" filter="blinds(horizontal)">
                                       <p:cBhvr>
-                                        <p:cTn id="13" dur="500"/>
+                                        <p:cTn id="15" dur="500"/>
                                         <p:tgtEl>
                                           <p:spTgt spid="3">
                                             <p:txEl>
-                                              <p:pRg st="2" end="2"/>
+                                              <p:pRg st="3" end="3"/>
                                             </p:txEl>
                                           </p:spTgt>
                                         </p:tgtEl>
@@ -11417,26 +12127,8 @@
                                   </p:childTnLst>
                                 </p:cTn>
                               </p:par>
-                            </p:childTnLst>
-                          </p:cTn>
-                        </p:par>
-                      </p:childTnLst>
-                    </p:cTn>
-                  </p:par>
-                  <p:par>
-                    <p:cTn id="14" fill="hold">
-                      <p:stCondLst>
-                        <p:cond delay="indefinite"/>
-                      </p:stCondLst>
-                      <p:childTnLst>
-                        <p:par>
-                          <p:cTn id="15" fill="hold">
-                            <p:stCondLst>
-                              <p:cond delay="0"/>
-                            </p:stCondLst>
-                            <p:childTnLst>
                               <p:par>
-                                <p:cTn id="16" presetID="3" presetClass="entr" presetSubtype="10" fill="hold" nodeType="clickEffect">
+                                <p:cTn id="16" presetID="3" presetClass="entr" presetSubtype="10" fill="hold" nodeType="withEffect">
                                   <p:stCondLst>
                                     <p:cond delay="0"/>
                                   </p:stCondLst>
@@ -11521,15 +12213,33 @@
                                   </p:childTnLst>
                                 </p:cTn>
                               </p:par>
+                            </p:childTnLst>
+                          </p:cTn>
+                        </p:par>
+                      </p:childTnLst>
+                    </p:cTn>
+                  </p:par>
+                  <p:par>
+                    <p:cTn id="22" fill="hold">
+                      <p:stCondLst>
+                        <p:cond delay="indefinite"/>
+                      </p:stCondLst>
+                      <p:childTnLst>
+                        <p:par>
+                          <p:cTn id="23" fill="hold">
+                            <p:stCondLst>
+                              <p:cond delay="0"/>
+                            </p:stCondLst>
+                            <p:childTnLst>
                               <p:par>
-                                <p:cTn id="22" presetID="3" presetClass="entr" presetSubtype="10" fill="hold" nodeType="withEffect">
+                                <p:cTn id="24" presetID="3" presetClass="entr" presetSubtype="10" fill="hold" nodeType="clickEffect">
                                   <p:stCondLst>
                                     <p:cond delay="0"/>
                                   </p:stCondLst>
                                   <p:childTnLst>
                                     <p:set>
                                       <p:cBhvr>
-                                        <p:cTn id="23" dur="1" fill="hold">
+                                        <p:cTn id="25" dur="1" fill="hold">
                                           <p:stCondLst>
                                             <p:cond delay="0"/>
                                           </p:stCondLst>
@@ -11537,7 +12247,7 @@
                                         <p:tgtEl>
                                           <p:spTgt spid="3">
                                             <p:txEl>
-                                              <p:pRg st="6" end="6"/>
+                                              <p:pRg st="7" end="7"/>
                                             </p:txEl>
                                           </p:spTgt>
                                         </p:tgtEl>
@@ -11551,11 +12261,97 @@
                                     </p:set>
                                     <p:animEffect transition="in" filter="blinds(horizontal)">
                                       <p:cBhvr>
-                                        <p:cTn id="24" dur="500"/>
+                                        <p:cTn id="26" dur="500"/>
                                         <p:tgtEl>
                                           <p:spTgt spid="3">
                                             <p:txEl>
-                                              <p:pRg st="6" end="6"/>
+                                              <p:pRg st="7" end="7"/>
+                                            </p:txEl>
+                                          </p:spTgt>
+                                        </p:tgtEl>
+                                      </p:cBhvr>
+                                    </p:animEffect>
+                                  </p:childTnLst>
+                                </p:cTn>
+                              </p:par>
+                              <p:par>
+                                <p:cTn id="27" presetID="3" presetClass="entr" presetSubtype="10" fill="hold" nodeType="withEffect">
+                                  <p:stCondLst>
+                                    <p:cond delay="0"/>
+                                  </p:stCondLst>
+                                  <p:childTnLst>
+                                    <p:set>
+                                      <p:cBhvr>
+                                        <p:cTn id="28" dur="1" fill="hold">
+                                          <p:stCondLst>
+                                            <p:cond delay="0"/>
+                                          </p:stCondLst>
+                                        </p:cTn>
+                                        <p:tgtEl>
+                                          <p:spTgt spid="3">
+                                            <p:txEl>
+                                              <p:pRg st="8" end="8"/>
+                                            </p:txEl>
+                                          </p:spTgt>
+                                        </p:tgtEl>
+                                        <p:attrNameLst>
+                                          <p:attrName>style.visibility</p:attrName>
+                                        </p:attrNameLst>
+                                      </p:cBhvr>
+                                      <p:to>
+                                        <p:strVal val="visible"/>
+                                      </p:to>
+                                    </p:set>
+                                    <p:animEffect transition="in" filter="blinds(horizontal)">
+                                      <p:cBhvr>
+                                        <p:cTn id="29" dur="500"/>
+                                        <p:tgtEl>
+                                          <p:spTgt spid="3">
+                                            <p:txEl>
+                                              <p:pRg st="8" end="8"/>
+                                            </p:txEl>
+                                          </p:spTgt>
+                                        </p:tgtEl>
+                                      </p:cBhvr>
+                                    </p:animEffect>
+                                  </p:childTnLst>
+                                </p:cTn>
+                              </p:par>
+                              <p:par>
+                                <p:cTn id="30" presetID="3" presetClass="entr" presetSubtype="10" fill="hold" nodeType="withEffect">
+                                  <p:stCondLst>
+                                    <p:cond delay="0"/>
+                                  </p:stCondLst>
+                                  <p:childTnLst>
+                                    <p:set>
+                                      <p:cBhvr>
+                                        <p:cTn id="31" dur="1" fill="hold">
+                                          <p:stCondLst>
+                                            <p:cond delay="0"/>
+                                          </p:stCondLst>
+                                        </p:cTn>
+                                        <p:tgtEl>
+                                          <p:spTgt spid="3">
+                                            <p:txEl>
+                                              <p:pRg st="9" end="9"/>
+                                            </p:txEl>
+                                          </p:spTgt>
+                                        </p:tgtEl>
+                                        <p:attrNameLst>
+                                          <p:attrName>style.visibility</p:attrName>
+                                        </p:attrNameLst>
+                                      </p:cBhvr>
+                                      <p:to>
+                                        <p:strVal val="visible"/>
+                                      </p:to>
+                                    </p:set>
+                                    <p:animEffect transition="in" filter="blinds(horizontal)">
+                                      <p:cBhvr>
+                                        <p:cTn id="32" dur="500"/>
+                                        <p:tgtEl>
+                                          <p:spTgt spid="3">
+                                            <p:txEl>
+                                              <p:pRg st="9" end="9"/>
                                             </p:txEl>
                                           </p:spTgt>
                                         </p:tgtEl>

</xml_diff>

<commit_message>
Updating the 1st page of presentation.
</commit_message>
<xml_diff>
--- a/MongoDB Tips and Advance Features.pptx
+++ b/MongoDB Tips and Advance Features.pptx
@@ -1197,25 +1197,13 @@
             </a:r>
             <a:r>
               <a:rPr lang="en-US" baseline="0" dirty="0" smtClean="0"/>
-              <a:t> There are geo-spatial indexes which can be used to great advantage rather than calling </a:t>
-            </a:r>
+              <a:t> There are geo-spatial indexes which can be used to great advantage rather than calling Google maps API</a:t>
+            </a:r>
+          </a:p>
+          <a:p>
             <a:r>
               <a:rPr lang="en-US" baseline="0" dirty="0" smtClean="0"/>
-              <a:t>Google </a:t>
-            </a:r>
-            <a:r>
-              <a:rPr lang="en-US" baseline="0" dirty="0" smtClean="0"/>
-              <a:t>maps API</a:t>
-            </a:r>
-          </a:p>
-          <a:p>
-            <a:r>
-              <a:rPr lang="en-US" baseline="0" dirty="0" smtClean="0"/>
-              <a:t>- There is a lot of </a:t>
-            </a:r>
-            <a:r>
-              <a:rPr lang="en-US" baseline="0" dirty="0" smtClean="0"/>
-              <a:t>promotion for BI with </a:t>
+              <a:t>- There is a lot of promotion for BI with </a:t>
             </a:r>
             <a:r>
               <a:rPr lang="en-US" baseline="0" dirty="0" err="1" smtClean="0"/>
@@ -2556,7 +2544,7 @@
     </p:spTree>
     <p:extLst>
       <p:ext uri="{BB962C8B-B14F-4D97-AF65-F5344CB8AC3E}">
-        <p14:creationId xmlns="" xmlns:p14="http://schemas.microsoft.com/office/powerpoint/2010/main" val="1104625445"/>
+        <p14:creationId xmlns:p14="http://schemas.microsoft.com/office/powerpoint/2010/main" xmlns="" val="1104625445"/>
       </p:ext>
     </p:extLst>
   </p:cSld>
@@ -2732,7 +2720,7 @@
     </p:spTree>
     <p:extLst>
       <p:ext uri="{BB962C8B-B14F-4D97-AF65-F5344CB8AC3E}">
-        <p14:creationId xmlns="" xmlns:p14="http://schemas.microsoft.com/office/powerpoint/2010/main" val="3894135913"/>
+        <p14:creationId xmlns:p14="http://schemas.microsoft.com/office/powerpoint/2010/main" xmlns="" val="3894135913"/>
       </p:ext>
     </p:extLst>
   </p:cSld>
@@ -2918,7 +2906,7 @@
     </p:spTree>
     <p:extLst>
       <p:ext uri="{BB962C8B-B14F-4D97-AF65-F5344CB8AC3E}">
-        <p14:creationId xmlns="" xmlns:p14="http://schemas.microsoft.com/office/powerpoint/2010/main" val="4232184826"/>
+        <p14:creationId xmlns:p14="http://schemas.microsoft.com/office/powerpoint/2010/main" xmlns="" val="4232184826"/>
       </p:ext>
     </p:extLst>
   </p:cSld>
@@ -3102,7 +3090,7 @@
     </p:spTree>
     <p:extLst>
       <p:ext uri="{BB962C8B-B14F-4D97-AF65-F5344CB8AC3E}">
-        <p14:creationId xmlns="" xmlns:p14="http://schemas.microsoft.com/office/powerpoint/2010/main" val="4006190316"/>
+        <p14:creationId xmlns:p14="http://schemas.microsoft.com/office/powerpoint/2010/main" xmlns="" val="4006190316"/>
       </p:ext>
     </p:extLst>
   </p:cSld>
@@ -3354,7 +3342,7 @@
     </p:spTree>
     <p:extLst>
       <p:ext uri="{BB962C8B-B14F-4D97-AF65-F5344CB8AC3E}">
-        <p14:creationId xmlns="" xmlns:p14="http://schemas.microsoft.com/office/powerpoint/2010/main" val="2009787710"/>
+        <p14:creationId xmlns:p14="http://schemas.microsoft.com/office/powerpoint/2010/main" xmlns="" val="2009787710"/>
       </p:ext>
     </p:extLst>
   </p:cSld>
@@ -3648,7 +3636,7 @@
     </p:spTree>
     <p:extLst>
       <p:ext uri="{BB962C8B-B14F-4D97-AF65-F5344CB8AC3E}">
-        <p14:creationId xmlns="" xmlns:p14="http://schemas.microsoft.com/office/powerpoint/2010/main" val="1916558251"/>
+        <p14:creationId xmlns:p14="http://schemas.microsoft.com/office/powerpoint/2010/main" xmlns="" val="1916558251"/>
       </p:ext>
     </p:extLst>
   </p:cSld>
@@ -4076,7 +4064,7 @@
     </p:spTree>
     <p:extLst>
       <p:ext uri="{BB962C8B-B14F-4D97-AF65-F5344CB8AC3E}">
-        <p14:creationId xmlns="" xmlns:p14="http://schemas.microsoft.com/office/powerpoint/2010/main" val="2598941471"/>
+        <p14:creationId xmlns:p14="http://schemas.microsoft.com/office/powerpoint/2010/main" xmlns="" val="2598941471"/>
       </p:ext>
     </p:extLst>
   </p:cSld>
@@ -4200,7 +4188,7 @@
     </p:spTree>
     <p:extLst>
       <p:ext uri="{BB962C8B-B14F-4D97-AF65-F5344CB8AC3E}">
-        <p14:creationId xmlns="" xmlns:p14="http://schemas.microsoft.com/office/powerpoint/2010/main" val="800577860"/>
+        <p14:creationId xmlns:p14="http://schemas.microsoft.com/office/powerpoint/2010/main" xmlns="" val="800577860"/>
       </p:ext>
     </p:extLst>
   </p:cSld>
@@ -4301,7 +4289,7 @@
     </p:spTree>
     <p:extLst>
       <p:ext uri="{BB962C8B-B14F-4D97-AF65-F5344CB8AC3E}">
-        <p14:creationId xmlns="" xmlns:p14="http://schemas.microsoft.com/office/powerpoint/2010/main" val="3697849113"/>
+        <p14:creationId xmlns:p14="http://schemas.microsoft.com/office/powerpoint/2010/main" xmlns="" val="3697849113"/>
       </p:ext>
     </p:extLst>
   </p:cSld>
@@ -4584,7 +4572,7 @@
     </p:spTree>
     <p:extLst>
       <p:ext uri="{BB962C8B-B14F-4D97-AF65-F5344CB8AC3E}">
-        <p14:creationId xmlns="" xmlns:p14="http://schemas.microsoft.com/office/powerpoint/2010/main" val="1020482669"/>
+        <p14:creationId xmlns:p14="http://schemas.microsoft.com/office/powerpoint/2010/main" xmlns="" val="1020482669"/>
       </p:ext>
     </p:extLst>
   </p:cSld>
@@ -4843,7 +4831,7 @@
     </p:spTree>
     <p:extLst>
       <p:ext uri="{BB962C8B-B14F-4D97-AF65-F5344CB8AC3E}">
-        <p14:creationId xmlns="" xmlns:p14="http://schemas.microsoft.com/office/powerpoint/2010/main" val="2519315238"/>
+        <p14:creationId xmlns:p14="http://schemas.microsoft.com/office/powerpoint/2010/main" xmlns="" val="2519315238"/>
       </p:ext>
     </p:extLst>
   </p:cSld>
@@ -5165,7 +5153,7 @@
     </p:spTree>
     <p:extLst>
       <p:ext uri="{BB962C8B-B14F-4D97-AF65-F5344CB8AC3E}">
-        <p14:creationId xmlns="" xmlns:p14="http://schemas.microsoft.com/office/powerpoint/2010/main" val="563125133"/>
+        <p14:creationId xmlns:p14="http://schemas.microsoft.com/office/powerpoint/2010/main" xmlns="" val="563125133"/>
       </p:ext>
     </p:extLst>
   </p:cSld>
@@ -5557,6 +5545,58 @@
           </a:p>
         </p:txBody>
       </p:sp>
+      <p:pic>
+        <p:nvPicPr>
+          <p:cNvPr id="1026" name="Picture 2" descr="E:\17528230-Cartoon-illustration-of-a-light-bulb-with-an-idea--Stock-Vector.jpg"/>
+          <p:cNvPicPr>
+            <a:picLocks noChangeAspect="1" noChangeArrowheads="1"/>
+          </p:cNvPicPr>
+          <p:nvPr/>
+        </p:nvPicPr>
+        <p:blipFill>
+          <a:blip r:embed="rId3" cstate="print"/>
+          <a:srcRect/>
+          <a:stretch>
+            <a:fillRect/>
+          </a:stretch>
+        </p:blipFill>
+        <p:spPr bwMode="auto">
+          <a:xfrm>
+            <a:off x="0" y="1828800"/>
+            <a:ext cx="1524000" cy="1877544"/>
+          </a:xfrm>
+          <a:prstGeom prst="rect">
+            <a:avLst/>
+          </a:prstGeom>
+          <a:noFill/>
+        </p:spPr>
+      </p:pic>
+      <p:pic>
+        <p:nvPicPr>
+          <p:cNvPr id="6" name="Picture 2" descr="E:\17528230-Cartoon-illustration-of-a-light-bulb-with-an-idea--Stock-Vector.jpg"/>
+          <p:cNvPicPr>
+            <a:picLocks noChangeAspect="1" noChangeArrowheads="1"/>
+          </p:cNvPicPr>
+          <p:nvPr/>
+        </p:nvPicPr>
+        <p:blipFill>
+          <a:blip r:embed="rId3" cstate="print"/>
+          <a:srcRect/>
+          <a:stretch>
+            <a:fillRect/>
+          </a:stretch>
+        </p:blipFill>
+        <p:spPr bwMode="auto">
+          <a:xfrm>
+            <a:off x="7543800" y="1828800"/>
+            <a:ext cx="1524000" cy="1877544"/>
+          </a:xfrm>
+          <a:prstGeom prst="rect">
+            <a:avLst/>
+          </a:prstGeom>
+          <a:noFill/>
+        </p:spPr>
+      </p:pic>
     </p:spTree>
   </p:cSld>
   <p:clrMapOvr>
@@ -6341,25 +6381,13 @@
           <a:p>
             <a:r>
               <a:rPr lang="en-US" sz="2800" dirty="0" smtClean="0"/>
-              <a:t>Can achieve transaction like semantics by 2 </a:t>
-            </a:r>
-            <a:r>
-              <a:rPr lang="en-US" sz="2800" dirty="0" smtClean="0"/>
-              <a:t>phase commit</a:t>
+              <a:t>Can achieve transaction like semantics by 2 phase commit</a:t>
             </a:r>
           </a:p>
           <a:p>
             <a:r>
               <a:rPr lang="en-IN" sz="2800" dirty="0" smtClean="0"/>
-              <a:t>Even </a:t>
-            </a:r>
-            <a:r>
-              <a:rPr lang="en-IN" sz="2800" dirty="0" smtClean="0"/>
-              <a:t>if the operation modifies multiple embedded documents within a single </a:t>
-            </a:r>
-            <a:r>
-              <a:rPr lang="en-IN" sz="2800" dirty="0" smtClean="0"/>
-              <a:t>document, it is atomic</a:t>
+              <a:t>Even if the operation modifies multiple embedded documents within a single document, it is atomic</a:t>
             </a:r>
           </a:p>
           <a:p>

</xml_diff>

<commit_message>
Changing the order of slides.
- Transactions topics is moved to last
</commit_message>
<xml_diff>
--- a/MongoDB Tips and Advance Features.pptx
+++ b/MongoDB Tips and Advance Features.pptx
@@ -18,10 +18,10 @@
     <p:sldId id="262" r:id="rId9"/>
     <p:sldId id="263" r:id="rId10"/>
     <p:sldId id="264" r:id="rId11"/>
-    <p:sldId id="265" r:id="rId12"/>
-    <p:sldId id="266" r:id="rId13"/>
-    <p:sldId id="267" r:id="rId14"/>
-    <p:sldId id="275" r:id="rId15"/>
+    <p:sldId id="266" r:id="rId12"/>
+    <p:sldId id="267" r:id="rId13"/>
+    <p:sldId id="275" r:id="rId14"/>
+    <p:sldId id="265" r:id="rId15"/>
     <p:sldId id="277" r:id="rId16"/>
     <p:sldId id="268" r:id="rId17"/>
   </p:sldIdLst>
@@ -208,7 +208,7 @@
             <a:fld id="{98D74999-3FB0-41B5-A976-1179E7AAE147}" type="datetimeFigureOut">
               <a:rPr lang="en-US" smtClean="0"/>
               <a:pPr/>
-              <a:t>6/19/2016</a:t>
+              <a:t>6/21/2016</a:t>
             </a:fld>
             <a:endParaRPr lang="en-US"/>
           </a:p>
@@ -829,7 +829,7 @@
             </a:pPr>
             <a:r>
               <a:rPr lang="en-US" dirty="0" smtClean="0"/>
-              <a:t>10 </a:t>
+              <a:t>5 </a:t>
             </a:r>
             <a:r>
               <a:rPr lang="en-US" dirty="0" err="1" smtClean="0"/>
@@ -843,31 +843,49 @@
               <a:buChar char="-"/>
             </a:pPr>
             <a:r>
-              <a:rPr lang="en-US" dirty="0" smtClean="0"/>
-              <a:t> What is the characteristic</a:t>
-            </a:r>
-            <a:r>
               <a:rPr lang="en-US" baseline="0" dirty="0" smtClean="0"/>
-              <a:t> of transaction</a:t>
+              <a:t> Show the journal files</a:t>
             </a:r>
             <a:endParaRPr lang="en-US" dirty="0" smtClean="0"/>
           </a:p>
           <a:p>
             <a:pPr>
               <a:buFontTx/>
-              <a:buChar char="-"/>
+              <a:buNone/>
             </a:pPr>
             <a:r>
-              <a:rPr lang="en-US" dirty="0" smtClean="0"/>
-              <a:t>- How many of you know that </a:t>
-            </a:r>
-            <a:r>
-              <a:rPr lang="en-US" dirty="0" err="1" smtClean="0"/>
-              <a:t>mongoDB</a:t>
-            </a:r>
-            <a:r>
-              <a:rPr lang="en-US" dirty="0" smtClean="0"/>
-              <a:t> don’t support transactions</a:t>
+              <a:rPr lang="en-US" baseline="0" dirty="0" smtClean="0"/>
+              <a:t>- </a:t>
+            </a:r>
+            <a:r>
+              <a:rPr lang="en-US" baseline="0" dirty="0" err="1" smtClean="0"/>
+              <a:t>WiredTiger</a:t>
+            </a:r>
+            <a:r>
+              <a:rPr lang="en-US" baseline="0" dirty="0" smtClean="0"/>
+              <a:t> was acquired by </a:t>
+            </a:r>
+            <a:r>
+              <a:rPr lang="en-US" baseline="0" dirty="0" err="1" smtClean="0"/>
+              <a:t>MongoDB</a:t>
+            </a:r>
+            <a:r>
+              <a:rPr lang="en-US" baseline="0" dirty="0" smtClean="0"/>
+              <a:t> in Dec, 2014</a:t>
+            </a:r>
+          </a:p>
+          <a:p>
+            <a:r>
+              <a:rPr lang="en-US" baseline="0" dirty="0" smtClean="0"/>
+              <a:t>- With latest 3.2, </a:t>
+            </a:r>
+            <a:r>
+              <a:rPr lang="en-US" baseline="0" dirty="0" err="1" smtClean="0"/>
+              <a:t>WiredTiger</a:t>
+            </a:r>
+            <a:r>
+              <a:rPr lang="en-US" baseline="0" dirty="0" smtClean="0"/>
+              <a:t> is default storage engine</a:t>
             </a:r>
             <a:endParaRPr lang="en-US" dirty="0"/>
           </a:p>
@@ -951,69 +969,17 @@
           </a:bodyPr>
           <a:lstStyle/>
           <a:p>
-            <a:pPr>
-              <a:buFontTx/>
-              <a:buChar char="-"/>
-            </a:pPr>
             <a:r>
               <a:rPr lang="en-US" dirty="0" smtClean="0"/>
-              <a:t>5 </a:t>
-            </a:r>
-            <a:r>
-              <a:rPr lang="en-US" dirty="0" err="1" smtClean="0"/>
+              <a:t>-</a:t>
+            </a:r>
+            <a:r>
+              <a:rPr lang="en-US" baseline="0" dirty="0" smtClean="0"/>
+              <a:t> 5 </a:t>
+            </a:r>
+            <a:r>
+              <a:rPr lang="en-US" baseline="0" dirty="0" err="1" smtClean="0"/>
               <a:t>mins</a:t>
-            </a:r>
-            <a:endParaRPr lang="en-US" dirty="0" smtClean="0"/>
-          </a:p>
-          <a:p>
-            <a:pPr>
-              <a:buFontTx/>
-              <a:buChar char="-"/>
-            </a:pPr>
-            <a:r>
-              <a:rPr lang="en-US" baseline="0" dirty="0" smtClean="0"/>
-              <a:t> Show the journal files</a:t>
-            </a:r>
-            <a:endParaRPr lang="en-US" dirty="0" smtClean="0"/>
-          </a:p>
-          <a:p>
-            <a:pPr>
-              <a:buFontTx/>
-              <a:buNone/>
-            </a:pPr>
-            <a:r>
-              <a:rPr lang="en-US" baseline="0" dirty="0" smtClean="0"/>
-              <a:t>- </a:t>
-            </a:r>
-            <a:r>
-              <a:rPr lang="en-US" baseline="0" dirty="0" err="1" smtClean="0"/>
-              <a:t>WiredTiger</a:t>
-            </a:r>
-            <a:r>
-              <a:rPr lang="en-US" baseline="0" dirty="0" smtClean="0"/>
-              <a:t> was acquired by </a:t>
-            </a:r>
-            <a:r>
-              <a:rPr lang="en-US" baseline="0" dirty="0" err="1" smtClean="0"/>
-              <a:t>MongoDB</a:t>
-            </a:r>
-            <a:r>
-              <a:rPr lang="en-US" baseline="0" dirty="0" smtClean="0"/>
-              <a:t> in Dec, 2014</a:t>
-            </a:r>
-          </a:p>
-          <a:p>
-            <a:r>
-              <a:rPr lang="en-US" baseline="0" dirty="0" smtClean="0"/>
-              <a:t>- With latest 3.2, </a:t>
-            </a:r>
-            <a:r>
-              <a:rPr lang="en-US" baseline="0" dirty="0" err="1" smtClean="0"/>
-              <a:t>WiredTiger</a:t>
-            </a:r>
-            <a:r>
-              <a:rPr lang="en-US" baseline="0" dirty="0" smtClean="0"/>
-              <a:t> is default storage engine</a:t>
             </a:r>
             <a:endParaRPr lang="en-US" dirty="0"/>
           </a:p>
@@ -1097,17 +1063,51 @@
           </a:bodyPr>
           <a:lstStyle/>
           <a:p>
+            <a:pPr>
+              <a:buFontTx/>
+              <a:buChar char="-"/>
+            </a:pPr>
             <a:r>
               <a:rPr lang="en-US" dirty="0" smtClean="0"/>
-              <a:t>-</a:t>
+              <a:t>10 </a:t>
+            </a:r>
+            <a:r>
+              <a:rPr lang="en-US" dirty="0" err="1" smtClean="0"/>
+              <a:t>mins</a:t>
+            </a:r>
+            <a:endParaRPr lang="en-US" dirty="0" smtClean="0"/>
+          </a:p>
+          <a:p>
+            <a:pPr>
+              <a:buFontTx/>
+              <a:buChar char="-"/>
+            </a:pPr>
+            <a:r>
+              <a:rPr lang="en-US" dirty="0" smtClean="0"/>
+              <a:t> What is the characteristic</a:t>
             </a:r>
             <a:r>
               <a:rPr lang="en-US" baseline="0" dirty="0" smtClean="0"/>
-              <a:t> 5 </a:t>
-            </a:r>
-            <a:r>
-              <a:rPr lang="en-US" baseline="0" dirty="0" err="1" smtClean="0"/>
-              <a:t>mins</a:t>
+              <a:t> of transaction</a:t>
+            </a:r>
+            <a:endParaRPr lang="en-US" dirty="0" smtClean="0"/>
+          </a:p>
+          <a:p>
+            <a:pPr>
+              <a:buFontTx/>
+              <a:buChar char="-"/>
+            </a:pPr>
+            <a:r>
+              <a:rPr lang="en-US" dirty="0" smtClean="0"/>
+              <a:t>- How many of you know that </a:t>
+            </a:r>
+            <a:r>
+              <a:rPr lang="en-US" dirty="0" err="1" smtClean="0"/>
+              <a:t>mongoDB</a:t>
+            </a:r>
+            <a:r>
+              <a:rPr lang="en-US" dirty="0" smtClean="0"/>
+              <a:t> don’t support transactions</a:t>
             </a:r>
             <a:endParaRPr lang="en-US" dirty="0"/>
           </a:p>
@@ -1131,7 +1131,7 @@
             <a:fld id="{A0653071-FB95-4806-80FD-8F29A534B87A}" type="slidenum">
               <a:rPr lang="en-US" smtClean="0"/>
               <a:pPr/>
-              <a:t>13</a:t>
+              <a:t>14</a:t>
             </a:fld>
             <a:endParaRPr lang="en-US"/>
           </a:p>
@@ -2488,7 +2488,7 @@
             <a:fld id="{A01F82C3-8254-49B4-9F12-D391F85377D6}" type="datetime1">
               <a:rPr lang="en-US" smtClean="0"/>
               <a:pPr/>
-              <a:t>6/19/2016</a:t>
+              <a:t>6/21/2016</a:t>
             </a:fld>
             <a:endParaRPr lang="en-US"/>
           </a:p>
@@ -2544,7 +2544,7 @@
     </p:spTree>
     <p:extLst>
       <p:ext uri="{BB962C8B-B14F-4D97-AF65-F5344CB8AC3E}">
-        <p14:creationId xmlns:p14="http://schemas.microsoft.com/office/powerpoint/2010/main" xmlns="" val="1104625445"/>
+        <p14:creationId xmlns="" xmlns:p14="http://schemas.microsoft.com/office/powerpoint/2010/main" val="1104625445"/>
       </p:ext>
     </p:extLst>
   </p:cSld>
@@ -2664,7 +2664,7 @@
             <a:fld id="{F43E83A3-7EB3-47B6-8E06-C73B8D775CFE}" type="datetime1">
               <a:rPr lang="en-US" smtClean="0"/>
               <a:pPr/>
-              <a:t>6/19/2016</a:t>
+              <a:t>6/21/2016</a:t>
             </a:fld>
             <a:endParaRPr lang="en-US"/>
           </a:p>
@@ -2720,7 +2720,7 @@
     </p:spTree>
     <p:extLst>
       <p:ext uri="{BB962C8B-B14F-4D97-AF65-F5344CB8AC3E}">
-        <p14:creationId xmlns:p14="http://schemas.microsoft.com/office/powerpoint/2010/main" xmlns="" val="3894135913"/>
+        <p14:creationId xmlns="" xmlns:p14="http://schemas.microsoft.com/office/powerpoint/2010/main" val="3894135913"/>
       </p:ext>
     </p:extLst>
   </p:cSld>
@@ -2850,7 +2850,7 @@
             <a:fld id="{8C0F1ADD-78EB-420C-887A-43B847F3E662}" type="datetime1">
               <a:rPr lang="en-US" smtClean="0"/>
               <a:pPr/>
-              <a:t>6/19/2016</a:t>
+              <a:t>6/21/2016</a:t>
             </a:fld>
             <a:endParaRPr lang="en-US"/>
           </a:p>
@@ -2906,7 +2906,7 @@
     </p:spTree>
     <p:extLst>
       <p:ext uri="{BB962C8B-B14F-4D97-AF65-F5344CB8AC3E}">
-        <p14:creationId xmlns:p14="http://schemas.microsoft.com/office/powerpoint/2010/main" xmlns="" val="4232184826"/>
+        <p14:creationId xmlns="" xmlns:p14="http://schemas.microsoft.com/office/powerpoint/2010/main" val="4232184826"/>
       </p:ext>
     </p:extLst>
   </p:cSld>
@@ -3030,7 +3030,7 @@
             <a:fld id="{D5A1C4F2-DAB4-4DBC-9B67-4145EB5CA6F4}" type="datetime1">
               <a:rPr lang="en-US" smtClean="0"/>
               <a:pPr/>
-              <a:t>6/19/2016</a:t>
+              <a:t>6/21/2016</a:t>
             </a:fld>
             <a:endParaRPr lang="en-US"/>
           </a:p>
@@ -3090,7 +3090,7 @@
     </p:spTree>
     <p:extLst>
       <p:ext uri="{BB962C8B-B14F-4D97-AF65-F5344CB8AC3E}">
-        <p14:creationId xmlns:p14="http://schemas.microsoft.com/office/powerpoint/2010/main" xmlns="" val="4006190316"/>
+        <p14:creationId xmlns="" xmlns:p14="http://schemas.microsoft.com/office/powerpoint/2010/main" val="4006190316"/>
       </p:ext>
     </p:extLst>
   </p:cSld>
@@ -3286,7 +3286,7 @@
             <a:fld id="{33CE4B79-AE2B-4454-B439-C180733E9D5A}" type="datetime1">
               <a:rPr lang="en-US" smtClean="0"/>
               <a:pPr/>
-              <a:t>6/19/2016</a:t>
+              <a:t>6/21/2016</a:t>
             </a:fld>
             <a:endParaRPr lang="en-US"/>
           </a:p>
@@ -3342,7 +3342,7 @@
     </p:spTree>
     <p:extLst>
       <p:ext uri="{BB962C8B-B14F-4D97-AF65-F5344CB8AC3E}">
-        <p14:creationId xmlns:p14="http://schemas.microsoft.com/office/powerpoint/2010/main" xmlns="" val="2009787710"/>
+        <p14:creationId xmlns="" xmlns:p14="http://schemas.microsoft.com/office/powerpoint/2010/main" val="2009787710"/>
       </p:ext>
     </p:extLst>
   </p:cSld>
@@ -3580,7 +3580,7 @@
             <a:fld id="{C34ECCE5-A5FB-49AD-B868-93CE599E66C4}" type="datetime1">
               <a:rPr lang="en-US" smtClean="0"/>
               <a:pPr/>
-              <a:t>6/19/2016</a:t>
+              <a:t>6/21/2016</a:t>
             </a:fld>
             <a:endParaRPr lang="en-US"/>
           </a:p>
@@ -3636,7 +3636,7 @@
     </p:spTree>
     <p:extLst>
       <p:ext uri="{BB962C8B-B14F-4D97-AF65-F5344CB8AC3E}">
-        <p14:creationId xmlns:p14="http://schemas.microsoft.com/office/powerpoint/2010/main" xmlns="" val="1916558251"/>
+        <p14:creationId xmlns="" xmlns:p14="http://schemas.microsoft.com/office/powerpoint/2010/main" val="1916558251"/>
       </p:ext>
     </p:extLst>
   </p:cSld>
@@ -4008,7 +4008,7 @@
             <a:fld id="{9C46C979-9F1A-4C9E-8EA4-C47A92B86ED3}" type="datetime1">
               <a:rPr lang="en-US" smtClean="0"/>
               <a:pPr/>
-              <a:t>6/19/2016</a:t>
+              <a:t>6/21/2016</a:t>
             </a:fld>
             <a:endParaRPr lang="en-US"/>
           </a:p>
@@ -4064,7 +4064,7 @@
     </p:spTree>
     <p:extLst>
       <p:ext uri="{BB962C8B-B14F-4D97-AF65-F5344CB8AC3E}">
-        <p14:creationId xmlns:p14="http://schemas.microsoft.com/office/powerpoint/2010/main" xmlns="" val="2598941471"/>
+        <p14:creationId xmlns="" xmlns:p14="http://schemas.microsoft.com/office/powerpoint/2010/main" val="2598941471"/>
       </p:ext>
     </p:extLst>
   </p:cSld>
@@ -4132,7 +4132,7 @@
             <a:fld id="{0DAA53D1-166E-4400-8CBD-FCE51C76C295}" type="datetime1">
               <a:rPr lang="en-US" smtClean="0"/>
               <a:pPr/>
-              <a:t>6/19/2016</a:t>
+              <a:t>6/21/2016</a:t>
             </a:fld>
             <a:endParaRPr lang="en-US"/>
           </a:p>
@@ -4188,7 +4188,7 @@
     </p:spTree>
     <p:extLst>
       <p:ext uri="{BB962C8B-B14F-4D97-AF65-F5344CB8AC3E}">
-        <p14:creationId xmlns:p14="http://schemas.microsoft.com/office/powerpoint/2010/main" xmlns="" val="800577860"/>
+        <p14:creationId xmlns="" xmlns:p14="http://schemas.microsoft.com/office/powerpoint/2010/main" val="800577860"/>
       </p:ext>
     </p:extLst>
   </p:cSld>
@@ -4233,7 +4233,7 @@
             <a:fld id="{36244870-D467-4A94-A60C-F9FE831D86ED}" type="datetime1">
               <a:rPr lang="en-US" smtClean="0"/>
               <a:pPr/>
-              <a:t>6/19/2016</a:t>
+              <a:t>6/21/2016</a:t>
             </a:fld>
             <a:endParaRPr lang="en-US"/>
           </a:p>
@@ -4289,7 +4289,7 @@
     </p:spTree>
     <p:extLst>
       <p:ext uri="{BB962C8B-B14F-4D97-AF65-F5344CB8AC3E}">
-        <p14:creationId xmlns:p14="http://schemas.microsoft.com/office/powerpoint/2010/main" xmlns="" val="3697849113"/>
+        <p14:creationId xmlns="" xmlns:p14="http://schemas.microsoft.com/office/powerpoint/2010/main" val="3697849113"/>
       </p:ext>
     </p:extLst>
   </p:cSld>
@@ -4516,7 +4516,7 @@
             <a:fld id="{2D84076B-22E6-4449-90CE-41F45A35B239}" type="datetime1">
               <a:rPr lang="en-US" smtClean="0"/>
               <a:pPr/>
-              <a:t>6/19/2016</a:t>
+              <a:t>6/21/2016</a:t>
             </a:fld>
             <a:endParaRPr lang="en-US"/>
           </a:p>
@@ -4572,7 +4572,7 @@
     </p:spTree>
     <p:extLst>
       <p:ext uri="{BB962C8B-B14F-4D97-AF65-F5344CB8AC3E}">
-        <p14:creationId xmlns:p14="http://schemas.microsoft.com/office/powerpoint/2010/main" xmlns="" val="1020482669"/>
+        <p14:creationId xmlns="" xmlns:p14="http://schemas.microsoft.com/office/powerpoint/2010/main" val="1020482669"/>
       </p:ext>
     </p:extLst>
   </p:cSld>
@@ -4775,7 +4775,7 @@
             <a:fld id="{07283709-4875-4598-BA8B-768670B3A710}" type="datetime1">
               <a:rPr lang="en-US" smtClean="0"/>
               <a:pPr/>
-              <a:t>6/19/2016</a:t>
+              <a:t>6/21/2016</a:t>
             </a:fld>
             <a:endParaRPr lang="en-US"/>
           </a:p>
@@ -4831,7 +4831,7 @@
     </p:spTree>
     <p:extLst>
       <p:ext uri="{BB962C8B-B14F-4D97-AF65-F5344CB8AC3E}">
-        <p14:creationId xmlns:p14="http://schemas.microsoft.com/office/powerpoint/2010/main" xmlns="" val="2519315238"/>
+        <p14:creationId xmlns="" xmlns:p14="http://schemas.microsoft.com/office/powerpoint/2010/main" val="2519315238"/>
       </p:ext>
     </p:extLst>
   </p:cSld>
@@ -4994,7 +4994,7 @@
             <a:fld id="{11FC054B-F4C2-4768-9E97-52376EF3930F}" type="datetime1">
               <a:rPr lang="en-US" smtClean="0"/>
               <a:pPr/>
-              <a:t>6/19/2016</a:t>
+              <a:t>6/21/2016</a:t>
             </a:fld>
             <a:endParaRPr lang="en-US"/>
           </a:p>
@@ -5153,7 +5153,7 @@
     </p:spTree>
     <p:extLst>
       <p:ext uri="{BB962C8B-B14F-4D97-AF65-F5344CB8AC3E}">
-        <p14:creationId xmlns:p14="http://schemas.microsoft.com/office/powerpoint/2010/main" xmlns="" val="563125133"/>
+        <p14:creationId xmlns="" xmlns:p14="http://schemas.microsoft.com/office/powerpoint/2010/main" val="563125133"/>
       </p:ext>
     </p:extLst>
   </p:cSld>
@@ -6346,424 +6346,6 @@
           <a:p>
             <a:r>
               <a:rPr lang="en-US" dirty="0" smtClean="0"/>
-              <a:t>No Transactions in </a:t>
-            </a:r>
-            <a:r>
-              <a:rPr lang="en-US" dirty="0" err="1" smtClean="0"/>
-              <a:t>MongoDB</a:t>
-            </a:r>
-            <a:endParaRPr lang="en-US" dirty="0"/>
-          </a:p>
-        </p:txBody>
-      </p:sp>
-      <p:sp>
-        <p:nvSpPr>
-          <p:cNvPr id="3" name="Content Placeholder 2"/>
-          <p:cNvSpPr>
-            <a:spLocks noGrp="1"/>
-          </p:cNvSpPr>
-          <p:nvPr>
-            <p:ph idx="1"/>
-          </p:nvPr>
-        </p:nvSpPr>
-        <p:spPr/>
-        <p:txBody>
-          <a:bodyPr>
-            <a:normAutofit/>
-          </a:bodyPr>
-          <a:lstStyle/>
-          <a:p>
-            <a:r>
-              <a:rPr lang="en-US" sz="2800" dirty="0" smtClean="0"/>
-              <a:t>Operation related to single document is atomic</a:t>
-            </a:r>
-          </a:p>
-          <a:p>
-            <a:r>
-              <a:rPr lang="en-US" sz="2800" dirty="0" smtClean="0"/>
-              <a:t>Can achieve transaction like semantics by 2 phase commit</a:t>
-            </a:r>
-          </a:p>
-          <a:p>
-            <a:r>
-              <a:rPr lang="en-IN" sz="2800" dirty="0" smtClean="0"/>
-              <a:t>Even if the operation modifies multiple embedded documents within a single document, it is atomic</a:t>
-            </a:r>
-          </a:p>
-          <a:p>
-            <a:endParaRPr lang="en-IN" sz="2800" dirty="0" smtClean="0"/>
-          </a:p>
-          <a:p>
-            <a:r>
-              <a:rPr lang="en-IN" sz="2800" dirty="0" smtClean="0"/>
-              <a:t>Lets follow the example under </a:t>
-            </a:r>
-            <a:r>
-              <a:rPr lang="en-IN" sz="2800" i="1" dirty="0" smtClean="0">
-                <a:solidFill>
-                  <a:srgbClr val="0000FF"/>
-                </a:solidFill>
-              </a:rPr>
-              <a:t>routes/</a:t>
-            </a:r>
-            <a:r>
-              <a:rPr lang="en-IN" sz="2800" i="1" dirty="0" err="1" smtClean="0">
-                <a:solidFill>
-                  <a:srgbClr val="0000FF"/>
-                </a:solidFill>
-              </a:rPr>
-              <a:t>transaction.js</a:t>
-            </a:r>
-            <a:endParaRPr lang="en-IN" sz="2800" i="1" dirty="0" smtClean="0">
-              <a:solidFill>
-                <a:srgbClr val="0000FF"/>
-              </a:solidFill>
-            </a:endParaRPr>
-          </a:p>
-          <a:p>
-            <a:endParaRPr lang="en-IN" sz="2800" dirty="0" smtClean="0">
-              <a:hlinkClick r:id="rId3"/>
-            </a:endParaRPr>
-          </a:p>
-          <a:p>
-            <a:endParaRPr lang="en-IN" sz="2800" dirty="0" smtClean="0"/>
-          </a:p>
-        </p:txBody>
-      </p:sp>
-      <p:sp>
-        <p:nvSpPr>
-          <p:cNvPr id="5" name="Footer Placeholder 3"/>
-          <p:cNvSpPr>
-            <a:spLocks noGrp="1"/>
-          </p:cNvSpPr>
-          <p:nvPr>
-            <p:ph type="ftr" sz="quarter" idx="11"/>
-          </p:nvPr>
-        </p:nvSpPr>
-        <p:spPr>
-          <a:xfrm>
-            <a:off x="3048000" y="6645275"/>
-            <a:ext cx="3048000" cy="288925"/>
-          </a:xfrm>
-        </p:spPr>
-        <p:txBody>
-          <a:bodyPr/>
-          <a:lstStyle/>
-          <a:p>
-            <a:r>
-              <a:rPr lang="en-US" b="1" dirty="0" smtClean="0">
-                <a:solidFill>
-                  <a:schemeClr val="tx2"/>
-                </a:solidFill>
-              </a:rPr>
-              <a:t>https://in.linkedin.com/in/sujithsudhakaran</a:t>
-            </a:r>
-            <a:endParaRPr lang="en-US" b="1" dirty="0">
-              <a:solidFill>
-                <a:schemeClr val="tx2"/>
-              </a:solidFill>
-            </a:endParaRPr>
-          </a:p>
-        </p:txBody>
-      </p:sp>
-    </p:spTree>
-  </p:cSld>
-  <p:clrMapOvr>
-    <a:masterClrMapping/>
-  </p:clrMapOvr>
-  <p:timing>
-    <p:tnLst>
-      <p:par>
-        <p:cTn id="1" dur="indefinite" restart="never" nodeType="tmRoot">
-          <p:childTnLst>
-            <p:seq concurrent="1" nextAc="seek">
-              <p:cTn id="2" dur="indefinite" nodeType="mainSeq">
-                <p:childTnLst>
-                  <p:par>
-                    <p:cTn id="3" fill="hold">
-                      <p:stCondLst>
-                        <p:cond delay="indefinite"/>
-                      </p:stCondLst>
-                      <p:childTnLst>
-                        <p:par>
-                          <p:cTn id="4" fill="hold">
-                            <p:stCondLst>
-                              <p:cond delay="0"/>
-                            </p:stCondLst>
-                            <p:childTnLst>
-                              <p:par>
-                                <p:cTn id="5" presetID="3" presetClass="entr" presetSubtype="10" fill="hold" nodeType="clickEffect">
-                                  <p:stCondLst>
-                                    <p:cond delay="0"/>
-                                  </p:stCondLst>
-                                  <p:childTnLst>
-                                    <p:set>
-                                      <p:cBhvr>
-                                        <p:cTn id="6" dur="1" fill="hold">
-                                          <p:stCondLst>
-                                            <p:cond delay="0"/>
-                                          </p:stCondLst>
-                                        </p:cTn>
-                                        <p:tgtEl>
-                                          <p:spTgt spid="3">
-                                            <p:txEl>
-                                              <p:pRg st="0" end="0"/>
-                                            </p:txEl>
-                                          </p:spTgt>
-                                        </p:tgtEl>
-                                        <p:attrNameLst>
-                                          <p:attrName>style.visibility</p:attrName>
-                                        </p:attrNameLst>
-                                      </p:cBhvr>
-                                      <p:to>
-                                        <p:strVal val="visible"/>
-                                      </p:to>
-                                    </p:set>
-                                    <p:animEffect transition="in" filter="blinds(horizontal)">
-                                      <p:cBhvr>
-                                        <p:cTn id="7" dur="500"/>
-                                        <p:tgtEl>
-                                          <p:spTgt spid="3">
-                                            <p:txEl>
-                                              <p:pRg st="0" end="0"/>
-                                            </p:txEl>
-                                          </p:spTgt>
-                                        </p:tgtEl>
-                                      </p:cBhvr>
-                                    </p:animEffect>
-                                  </p:childTnLst>
-                                </p:cTn>
-                              </p:par>
-                            </p:childTnLst>
-                          </p:cTn>
-                        </p:par>
-                      </p:childTnLst>
-                    </p:cTn>
-                  </p:par>
-                  <p:par>
-                    <p:cTn id="8" fill="hold">
-                      <p:stCondLst>
-                        <p:cond delay="indefinite"/>
-                      </p:stCondLst>
-                      <p:childTnLst>
-                        <p:par>
-                          <p:cTn id="9" fill="hold">
-                            <p:stCondLst>
-                              <p:cond delay="0"/>
-                            </p:stCondLst>
-                            <p:childTnLst>
-                              <p:par>
-                                <p:cTn id="10" presetID="3" presetClass="entr" presetSubtype="10" fill="hold" nodeType="clickEffect">
-                                  <p:stCondLst>
-                                    <p:cond delay="0"/>
-                                  </p:stCondLst>
-                                  <p:childTnLst>
-                                    <p:set>
-                                      <p:cBhvr>
-                                        <p:cTn id="11" dur="1" fill="hold">
-                                          <p:stCondLst>
-                                            <p:cond delay="0"/>
-                                          </p:stCondLst>
-                                        </p:cTn>
-                                        <p:tgtEl>
-                                          <p:spTgt spid="3">
-                                            <p:txEl>
-                                              <p:pRg st="1" end="1"/>
-                                            </p:txEl>
-                                          </p:spTgt>
-                                        </p:tgtEl>
-                                        <p:attrNameLst>
-                                          <p:attrName>style.visibility</p:attrName>
-                                        </p:attrNameLst>
-                                      </p:cBhvr>
-                                      <p:to>
-                                        <p:strVal val="visible"/>
-                                      </p:to>
-                                    </p:set>
-                                    <p:animEffect transition="in" filter="blinds(horizontal)">
-                                      <p:cBhvr>
-                                        <p:cTn id="12" dur="500"/>
-                                        <p:tgtEl>
-                                          <p:spTgt spid="3">
-                                            <p:txEl>
-                                              <p:pRg st="1" end="1"/>
-                                            </p:txEl>
-                                          </p:spTgt>
-                                        </p:tgtEl>
-                                      </p:cBhvr>
-                                    </p:animEffect>
-                                  </p:childTnLst>
-                                </p:cTn>
-                              </p:par>
-                              <p:par>
-                                <p:cTn id="13" presetID="3" presetClass="entr" presetSubtype="10" fill="hold" nodeType="withEffect">
-                                  <p:stCondLst>
-                                    <p:cond delay="0"/>
-                                  </p:stCondLst>
-                                  <p:childTnLst>
-                                    <p:set>
-                                      <p:cBhvr>
-                                        <p:cTn id="14" dur="1" fill="hold">
-                                          <p:stCondLst>
-                                            <p:cond delay="0"/>
-                                          </p:stCondLst>
-                                        </p:cTn>
-                                        <p:tgtEl>
-                                          <p:spTgt spid="3">
-                                            <p:txEl>
-                                              <p:pRg st="2" end="2"/>
-                                            </p:txEl>
-                                          </p:spTgt>
-                                        </p:tgtEl>
-                                        <p:attrNameLst>
-                                          <p:attrName>style.visibility</p:attrName>
-                                        </p:attrNameLst>
-                                      </p:cBhvr>
-                                      <p:to>
-                                        <p:strVal val="visible"/>
-                                      </p:to>
-                                    </p:set>
-                                    <p:animEffect transition="in" filter="blinds(horizontal)">
-                                      <p:cBhvr>
-                                        <p:cTn id="15" dur="500"/>
-                                        <p:tgtEl>
-                                          <p:spTgt spid="3">
-                                            <p:txEl>
-                                              <p:pRg st="2" end="2"/>
-                                            </p:txEl>
-                                          </p:spTgt>
-                                        </p:tgtEl>
-                                      </p:cBhvr>
-                                    </p:animEffect>
-                                  </p:childTnLst>
-                                </p:cTn>
-                              </p:par>
-                            </p:childTnLst>
-                          </p:cTn>
-                        </p:par>
-                      </p:childTnLst>
-                    </p:cTn>
-                  </p:par>
-                  <p:par>
-                    <p:cTn id="16" fill="hold">
-                      <p:stCondLst>
-                        <p:cond delay="indefinite"/>
-                      </p:stCondLst>
-                      <p:childTnLst>
-                        <p:par>
-                          <p:cTn id="17" fill="hold">
-                            <p:stCondLst>
-                              <p:cond delay="0"/>
-                            </p:stCondLst>
-                            <p:childTnLst>
-                              <p:par>
-                                <p:cTn id="18" presetID="3" presetClass="entr" presetSubtype="10" fill="hold" nodeType="clickEffect">
-                                  <p:stCondLst>
-                                    <p:cond delay="0"/>
-                                  </p:stCondLst>
-                                  <p:childTnLst>
-                                    <p:set>
-                                      <p:cBhvr>
-                                        <p:cTn id="19" dur="1" fill="hold">
-                                          <p:stCondLst>
-                                            <p:cond delay="0"/>
-                                          </p:stCondLst>
-                                        </p:cTn>
-                                        <p:tgtEl>
-                                          <p:spTgt spid="3">
-                                            <p:txEl>
-                                              <p:pRg st="4" end="4"/>
-                                            </p:txEl>
-                                          </p:spTgt>
-                                        </p:tgtEl>
-                                        <p:attrNameLst>
-                                          <p:attrName>style.visibility</p:attrName>
-                                        </p:attrNameLst>
-                                      </p:cBhvr>
-                                      <p:to>
-                                        <p:strVal val="visible"/>
-                                      </p:to>
-                                    </p:set>
-                                    <p:animEffect transition="in" filter="blinds(horizontal)">
-                                      <p:cBhvr>
-                                        <p:cTn id="20" dur="500"/>
-                                        <p:tgtEl>
-                                          <p:spTgt spid="3">
-                                            <p:txEl>
-                                              <p:pRg st="4" end="4"/>
-                                            </p:txEl>
-                                          </p:spTgt>
-                                        </p:tgtEl>
-                                      </p:cBhvr>
-                                    </p:animEffect>
-                                  </p:childTnLst>
-                                </p:cTn>
-                              </p:par>
-                            </p:childTnLst>
-                          </p:cTn>
-                        </p:par>
-                      </p:childTnLst>
-                    </p:cTn>
-                  </p:par>
-                </p:childTnLst>
-              </p:cTn>
-              <p:prevCondLst>
-                <p:cond evt="onPrev" delay="0">
-                  <p:tgtEl>
-                    <p:sldTgt/>
-                  </p:tgtEl>
-                </p:cond>
-              </p:prevCondLst>
-              <p:nextCondLst>
-                <p:cond evt="onNext" delay="0">
-                  <p:tgtEl>
-                    <p:sldTgt/>
-                  </p:tgtEl>
-                </p:cond>
-              </p:nextCondLst>
-            </p:seq>
-          </p:childTnLst>
-        </p:cTn>
-      </p:par>
-    </p:tnLst>
-  </p:timing>
-</p:sld>
-</file>
-
-<file path=ppt/slides/slide12.xml><?xml version="1.0" encoding="utf-8"?>
-<p:sld xmlns:a="http://schemas.openxmlformats.org/drawingml/2006/main" xmlns:r="http://schemas.openxmlformats.org/officeDocument/2006/relationships" xmlns:p="http://schemas.openxmlformats.org/presentationml/2006/main">
-  <p:cSld>
-    <p:spTree>
-      <p:nvGrpSpPr>
-        <p:cNvPr id="1" name=""/>
-        <p:cNvGrpSpPr/>
-        <p:nvPr/>
-      </p:nvGrpSpPr>
-      <p:grpSpPr>
-        <a:xfrm>
-          <a:off x="0" y="0"/>
-          <a:ext cx="0" cy="0"/>
-          <a:chOff x="0" y="0"/>
-          <a:chExt cx="0" cy="0"/>
-        </a:xfrm>
-      </p:grpSpPr>
-      <p:sp>
-        <p:nvSpPr>
-          <p:cNvPr id="2" name="Title 1"/>
-          <p:cNvSpPr>
-            <a:spLocks noGrp="1"/>
-          </p:cNvSpPr>
-          <p:nvPr>
-            <p:ph type="title"/>
-          </p:nvPr>
-        </p:nvSpPr>
-        <p:spPr/>
-        <p:txBody>
-          <a:bodyPr/>
-          <a:lstStyle/>
-          <a:p>
-            <a:r>
-              <a:rPr lang="en-US" dirty="0" smtClean="0"/>
               <a:t>Journaling</a:t>
             </a:r>
             <a:endParaRPr lang="en-US" dirty="0"/>
@@ -7257,6 +6839,208 @@
 </p:sld>
 </file>
 
+<file path=ppt/slides/slide12.xml><?xml version="1.0" encoding="utf-8"?>
+<p:sld xmlns:a="http://schemas.openxmlformats.org/drawingml/2006/main" xmlns:r="http://schemas.openxmlformats.org/officeDocument/2006/relationships" xmlns:p="http://schemas.openxmlformats.org/presentationml/2006/main">
+  <p:cSld>
+    <p:spTree>
+      <p:nvGrpSpPr>
+        <p:cNvPr id="1" name=""/>
+        <p:cNvGrpSpPr/>
+        <p:nvPr/>
+      </p:nvGrpSpPr>
+      <p:grpSpPr>
+        <a:xfrm>
+          <a:off x="0" y="0"/>
+          <a:ext cx="0" cy="0"/>
+          <a:chOff x="0" y="0"/>
+          <a:chExt cx="0" cy="0"/>
+        </a:xfrm>
+      </p:grpSpPr>
+      <p:sp>
+        <p:nvSpPr>
+          <p:cNvPr id="2" name="Title 1"/>
+          <p:cNvSpPr>
+            <a:spLocks noGrp="1"/>
+          </p:cNvSpPr>
+          <p:nvPr>
+            <p:ph type="title"/>
+          </p:nvPr>
+        </p:nvSpPr>
+        <p:spPr/>
+        <p:txBody>
+          <a:bodyPr/>
+          <a:lstStyle/>
+          <a:p>
+            <a:r>
+              <a:rPr lang="en-IN" dirty="0" smtClean="0"/>
+              <a:t>MMAPv1 Storage Engine</a:t>
+            </a:r>
+            <a:endParaRPr lang="en-US" dirty="0"/>
+          </a:p>
+        </p:txBody>
+      </p:sp>
+      <p:sp>
+        <p:nvSpPr>
+          <p:cNvPr id="3" name="Content Placeholder 2"/>
+          <p:cNvSpPr>
+            <a:spLocks noGrp="1"/>
+          </p:cNvSpPr>
+          <p:nvPr>
+            <p:ph idx="1"/>
+          </p:nvPr>
+        </p:nvSpPr>
+        <p:spPr/>
+        <p:txBody>
+          <a:bodyPr>
+            <a:normAutofit fontScale="55000" lnSpcReduction="20000"/>
+          </a:bodyPr>
+          <a:lstStyle/>
+          <a:p>
+            <a:r>
+              <a:rPr lang="en-IN" dirty="0" smtClean="0"/>
+              <a:t>Internal views for data sets</a:t>
+            </a:r>
+          </a:p>
+          <a:p>
+            <a:pPr lvl="1"/>
+            <a:r>
+              <a:rPr lang="en-IN" dirty="0" smtClean="0"/>
+              <a:t>Private: used to write the journal files</a:t>
+            </a:r>
+          </a:p>
+          <a:p>
+            <a:pPr lvl="1"/>
+            <a:r>
+              <a:rPr lang="en-IN" dirty="0" smtClean="0"/>
+              <a:t>Shared: used to write the data files</a:t>
+            </a:r>
+          </a:p>
+          <a:p>
+            <a:r>
+              <a:rPr lang="en-IN" dirty="0" smtClean="0"/>
+              <a:t>Firstly, write operation on private view(In-memory)</a:t>
+            </a:r>
+          </a:p>
+          <a:p>
+            <a:r>
+              <a:rPr lang="en-IN" dirty="0" smtClean="0"/>
+              <a:t>Now, write the changes to the journal files on disk every 100 ms(called as commit)</a:t>
+            </a:r>
+          </a:p>
+          <a:p>
+            <a:r>
+              <a:rPr lang="en-IN" dirty="0" smtClean="0"/>
+              <a:t>After journal commit, changes are applied to the shared view</a:t>
+            </a:r>
+          </a:p>
+          <a:p>
+            <a:r>
+              <a:rPr lang="en-IN" dirty="0" smtClean="0"/>
+              <a:t>Lastly, changes from the shared view are applied to the data files</a:t>
+            </a:r>
+          </a:p>
+          <a:p>
+            <a:r>
+              <a:rPr lang="en-IN" dirty="0" smtClean="0"/>
+              <a:t>Once this process is done, the journal file is not required for any recovery, hence it can be recycled</a:t>
+            </a:r>
+          </a:p>
+          <a:p>
+            <a:r>
+              <a:rPr lang="en-IN" dirty="0" smtClean="0"/>
+              <a:t>This process is similar when you don't use the journaling feature</a:t>
+            </a:r>
+          </a:p>
+          <a:p>
+            <a:r>
+              <a:rPr lang="en-IN" dirty="0" smtClean="0"/>
+              <a:t>Only thing is that OS flushes the in-memory changes to the data files every 60 secs</a:t>
+            </a:r>
+          </a:p>
+          <a:p>
+            <a:r>
+              <a:rPr lang="en-IN" dirty="0" smtClean="0"/>
+              <a:t>The journal files under the journal directory in </a:t>
+            </a:r>
+            <a:r>
+              <a:rPr lang="en-IN" dirty="0" err="1" smtClean="0"/>
+              <a:t>dbpath</a:t>
+            </a:r>
+            <a:r>
+              <a:rPr lang="en-IN" dirty="0" smtClean="0"/>
+              <a:t> is removed if there is a clean shutdown.</a:t>
+            </a:r>
+          </a:p>
+          <a:p>
+            <a:r>
+              <a:rPr lang="en-IN" dirty="0" smtClean="0"/>
+              <a:t>But, if there is any crash, these journal files are used to bring the database to a consistent state when </a:t>
+            </a:r>
+            <a:r>
+              <a:rPr lang="en-IN" dirty="0" err="1" smtClean="0"/>
+              <a:t>mongod</a:t>
+            </a:r>
+            <a:r>
+              <a:rPr lang="en-IN" dirty="0" smtClean="0"/>
+              <a:t> instance is restarted</a:t>
+            </a:r>
+          </a:p>
+          <a:p>
+            <a:endParaRPr lang="en-US" dirty="0"/>
+          </a:p>
+        </p:txBody>
+      </p:sp>
+      <p:sp>
+        <p:nvSpPr>
+          <p:cNvPr id="5" name="Footer Placeholder 3"/>
+          <p:cNvSpPr>
+            <a:spLocks noGrp="1"/>
+          </p:cNvSpPr>
+          <p:nvPr>
+            <p:ph type="ftr" sz="quarter" idx="11"/>
+          </p:nvPr>
+        </p:nvSpPr>
+        <p:spPr>
+          <a:xfrm>
+            <a:off x="3048000" y="6645275"/>
+            <a:ext cx="3048000" cy="288925"/>
+          </a:xfrm>
+        </p:spPr>
+        <p:txBody>
+          <a:bodyPr/>
+          <a:lstStyle/>
+          <a:p>
+            <a:r>
+              <a:rPr lang="en-US" b="1" dirty="0" smtClean="0">
+                <a:solidFill>
+                  <a:schemeClr val="tx2"/>
+                </a:solidFill>
+              </a:rPr>
+              <a:t>https://in.linkedin.com/in/sujithsudhakaran</a:t>
+            </a:r>
+            <a:endParaRPr lang="en-US" b="1" dirty="0">
+              <a:solidFill>
+                <a:schemeClr val="tx2"/>
+              </a:solidFill>
+            </a:endParaRPr>
+          </a:p>
+        </p:txBody>
+      </p:sp>
+    </p:spTree>
+  </p:cSld>
+  <p:clrMapOvr>
+    <a:masterClrMapping/>
+  </p:clrMapOvr>
+  <p:timing>
+    <p:tnLst>
+      <p:par>
+        <p:cTn id="1" dur="indefinite" restart="never" nodeType="tmRoot"/>
+      </p:par>
+    </p:tnLst>
+  </p:timing>
+</p:sld>
+</file>
+
 <file path=ppt/slides/slide13.xml><?xml version="1.0" encoding="utf-8"?>
 <p:sld xmlns:a="http://schemas.openxmlformats.org/drawingml/2006/main" xmlns:r="http://schemas.openxmlformats.org/officeDocument/2006/relationships" xmlns:p="http://schemas.openxmlformats.org/presentationml/2006/main">
   <p:cSld>
@@ -7290,124 +7074,36 @@
           <a:lstStyle/>
           <a:p>
             <a:r>
-              <a:rPr lang="en-IN" dirty="0" smtClean="0"/>
-              <a:t>MMAPv1 Storage Engine</a:t>
+              <a:rPr lang="en-US" dirty="0" smtClean="0"/>
+              <a:t>Comparison Table</a:t>
             </a:r>
             <a:endParaRPr lang="en-US" dirty="0"/>
           </a:p>
         </p:txBody>
       </p:sp>
-      <p:sp>
-        <p:nvSpPr>
-          <p:cNvPr id="3" name="Content Placeholder 2"/>
-          <p:cNvSpPr>
-            <a:spLocks noGrp="1"/>
-          </p:cNvSpPr>
+      <p:pic>
+        <p:nvPicPr>
+          <p:cNvPr id="4" name="Content Placeholder 3" descr="WiredTiger-MMVP-comparison.png"/>
+          <p:cNvPicPr>
+            <a:picLocks noGrp="1" noChangeAspect="1"/>
+          </p:cNvPicPr>
           <p:nvPr>
             <p:ph idx="1"/>
           </p:nvPr>
-        </p:nvSpPr>
-        <p:spPr/>
-        <p:txBody>
-          <a:bodyPr>
-            <a:normAutofit fontScale="55000" lnSpcReduction="20000"/>
-          </a:bodyPr>
-          <a:lstStyle/>
-          <a:p>
-            <a:r>
-              <a:rPr lang="en-IN" dirty="0" smtClean="0"/>
-              <a:t>Internal views for data sets</a:t>
-            </a:r>
-          </a:p>
-          <a:p>
-            <a:pPr lvl="1"/>
-            <a:r>
-              <a:rPr lang="en-IN" dirty="0" smtClean="0"/>
-              <a:t>Private: used to write the journal files</a:t>
-            </a:r>
-          </a:p>
-          <a:p>
-            <a:pPr lvl="1"/>
-            <a:r>
-              <a:rPr lang="en-IN" dirty="0" smtClean="0"/>
-              <a:t>Shared: used to write the data files</a:t>
-            </a:r>
-          </a:p>
-          <a:p>
-            <a:r>
-              <a:rPr lang="en-IN" dirty="0" smtClean="0"/>
-              <a:t>Firstly, write operation on private view(In-memory)</a:t>
-            </a:r>
-          </a:p>
-          <a:p>
-            <a:r>
-              <a:rPr lang="en-IN" dirty="0" smtClean="0"/>
-              <a:t>Now, write the changes to the journal files on disk every 100 ms(called as commit)</a:t>
-            </a:r>
-          </a:p>
-          <a:p>
-            <a:r>
-              <a:rPr lang="en-IN" dirty="0" smtClean="0"/>
-              <a:t>After journal commit, changes are applied to the shared view</a:t>
-            </a:r>
-          </a:p>
-          <a:p>
-            <a:r>
-              <a:rPr lang="en-IN" dirty="0" smtClean="0"/>
-              <a:t>Lastly, changes from the shared view are applied to the data files</a:t>
-            </a:r>
-          </a:p>
-          <a:p>
-            <a:r>
-              <a:rPr lang="en-IN" dirty="0" smtClean="0"/>
-              <a:t>Once this process is done, the journal file is not required for any recovery, hence it can be recycled</a:t>
-            </a:r>
-          </a:p>
-          <a:p>
-            <a:r>
-              <a:rPr lang="en-IN" dirty="0" smtClean="0"/>
-              <a:t>This process is similar when you don't use the journaling feature</a:t>
-            </a:r>
-          </a:p>
-          <a:p>
-            <a:r>
-              <a:rPr lang="en-IN" dirty="0" smtClean="0"/>
-              <a:t>Only thing is that OS flushes the in-memory changes to the data files every 60 secs</a:t>
-            </a:r>
-          </a:p>
-          <a:p>
-            <a:r>
-              <a:rPr lang="en-IN" dirty="0" smtClean="0"/>
-              <a:t>The journal files under the journal directory in </a:t>
-            </a:r>
-            <a:r>
-              <a:rPr lang="en-IN" dirty="0" err="1" smtClean="0"/>
-              <a:t>dbpath</a:t>
-            </a:r>
-            <a:r>
-              <a:rPr lang="en-IN" dirty="0" smtClean="0"/>
-              <a:t> is removed if there is a clean shutdown.</a:t>
-            </a:r>
-          </a:p>
-          <a:p>
-            <a:r>
-              <a:rPr lang="en-IN" dirty="0" smtClean="0"/>
-              <a:t>But, if there is any crash, these journal files are used to bring the database to a consistent state when </a:t>
-            </a:r>
-            <a:r>
-              <a:rPr lang="en-IN" dirty="0" err="1" smtClean="0"/>
-              <a:t>mongod</a:t>
-            </a:r>
-            <a:r>
-              <a:rPr lang="en-IN" dirty="0" smtClean="0"/>
-              <a:t> instance is restarted</a:t>
-            </a:r>
-          </a:p>
-          <a:p>
-            <a:endParaRPr lang="en-US" dirty="0"/>
-          </a:p>
-        </p:txBody>
-      </p:sp>
+        </p:nvPicPr>
+        <p:blipFill>
+          <a:blip r:embed="rId2" cstate="print"/>
+          <a:stretch>
+            <a:fillRect/>
+          </a:stretch>
+        </p:blipFill>
+        <p:spPr>
+          <a:xfrm>
+            <a:off x="609601" y="1524000"/>
+            <a:ext cx="7848600" cy="4648200"/>
+          </a:xfrm>
+        </p:spPr>
+      </p:pic>
       <p:sp>
         <p:nvSpPr>
           <p:cNvPr id="5" name="Footer Placeholder 3"/>
@@ -7493,35 +7189,90 @@
           <a:p>
             <a:r>
               <a:rPr lang="en-US" dirty="0" smtClean="0"/>
-              <a:t>Comparison Table</a:t>
+              <a:t>No Transactions in </a:t>
+            </a:r>
+            <a:r>
+              <a:rPr lang="en-US" dirty="0" err="1" smtClean="0"/>
+              <a:t>MongoDB</a:t>
             </a:r>
             <a:endParaRPr lang="en-US" dirty="0"/>
           </a:p>
         </p:txBody>
       </p:sp>
-      <p:pic>
-        <p:nvPicPr>
-          <p:cNvPr id="4" name="Content Placeholder 3" descr="WiredTiger-MMVP-comparison.png"/>
-          <p:cNvPicPr>
-            <a:picLocks noGrp="1" noChangeAspect="1"/>
-          </p:cNvPicPr>
+      <p:sp>
+        <p:nvSpPr>
+          <p:cNvPr id="3" name="Content Placeholder 2"/>
+          <p:cNvSpPr>
+            <a:spLocks noGrp="1"/>
+          </p:cNvSpPr>
           <p:nvPr>
             <p:ph idx="1"/>
           </p:nvPr>
-        </p:nvPicPr>
-        <p:blipFill>
-          <a:blip r:embed="rId2" cstate="print"/>
-          <a:stretch>
-            <a:fillRect/>
-          </a:stretch>
-        </p:blipFill>
-        <p:spPr>
-          <a:xfrm>
-            <a:off x="609601" y="1524000"/>
-            <a:ext cx="7848600" cy="4648200"/>
-          </a:xfrm>
-        </p:spPr>
-      </p:pic>
+        </p:nvSpPr>
+        <p:spPr/>
+        <p:txBody>
+          <a:bodyPr>
+            <a:normAutofit/>
+          </a:bodyPr>
+          <a:lstStyle/>
+          <a:p>
+            <a:r>
+              <a:rPr lang="en-US" sz="2800" dirty="0" smtClean="0"/>
+              <a:t>Operation related to single document is atomic</a:t>
+            </a:r>
+          </a:p>
+          <a:p>
+            <a:r>
+              <a:rPr lang="en-US" sz="2800" dirty="0" smtClean="0"/>
+              <a:t>Can achieve transaction like semantics by 2 phase commit</a:t>
+            </a:r>
+          </a:p>
+          <a:p>
+            <a:r>
+              <a:rPr lang="en-IN" sz="2800" dirty="0" smtClean="0"/>
+              <a:t>Even if the operation modifies multiple embedded documents within a single document, it is atomic</a:t>
+            </a:r>
+          </a:p>
+          <a:p>
+            <a:endParaRPr lang="en-IN" sz="2800" dirty="0" smtClean="0"/>
+          </a:p>
+          <a:p>
+            <a:r>
+              <a:rPr lang="en-IN" sz="2800" dirty="0" smtClean="0"/>
+              <a:t>Lets follow the example under </a:t>
+            </a:r>
+            <a:r>
+              <a:rPr lang="en-IN" sz="2800" i="1" dirty="0" smtClean="0">
+                <a:solidFill>
+                  <a:srgbClr val="0000FF"/>
+                </a:solidFill>
+              </a:rPr>
+              <a:t>routes/</a:t>
+            </a:r>
+            <a:r>
+              <a:rPr lang="en-IN" sz="2800" i="1" dirty="0" err="1" smtClean="0">
+                <a:solidFill>
+                  <a:srgbClr val="0000FF"/>
+                </a:solidFill>
+              </a:rPr>
+              <a:t>transaction.js</a:t>
+            </a:r>
+            <a:endParaRPr lang="en-IN" sz="2800" i="1" dirty="0" smtClean="0">
+              <a:solidFill>
+                <a:srgbClr val="0000FF"/>
+              </a:solidFill>
+            </a:endParaRPr>
+          </a:p>
+          <a:p>
+            <a:endParaRPr lang="en-IN" sz="2800" dirty="0" smtClean="0">
+              <a:hlinkClick r:id="rId3"/>
+            </a:endParaRPr>
+          </a:p>
+          <a:p>
+            <a:endParaRPr lang="en-IN" sz="2800" dirty="0" smtClean="0"/>
+          </a:p>
+        </p:txBody>
+      </p:sp>
       <p:sp>
         <p:nvSpPr>
           <p:cNvPr id="5" name="Footer Placeholder 3"/>
@@ -7566,7 +7317,256 @@
   <p:timing>
     <p:tnLst>
       <p:par>
-        <p:cTn id="1" dur="indefinite" restart="never" nodeType="tmRoot"/>
+        <p:cTn id="1" dur="indefinite" restart="never" nodeType="tmRoot">
+          <p:childTnLst>
+            <p:seq concurrent="1" nextAc="seek">
+              <p:cTn id="2" dur="indefinite" nodeType="mainSeq">
+                <p:childTnLst>
+                  <p:par>
+                    <p:cTn id="3" fill="hold">
+                      <p:stCondLst>
+                        <p:cond delay="indefinite"/>
+                      </p:stCondLst>
+                      <p:childTnLst>
+                        <p:par>
+                          <p:cTn id="4" fill="hold">
+                            <p:stCondLst>
+                              <p:cond delay="0"/>
+                            </p:stCondLst>
+                            <p:childTnLst>
+                              <p:par>
+                                <p:cTn id="5" presetID="3" presetClass="entr" presetSubtype="10" fill="hold" nodeType="clickEffect">
+                                  <p:stCondLst>
+                                    <p:cond delay="0"/>
+                                  </p:stCondLst>
+                                  <p:childTnLst>
+                                    <p:set>
+                                      <p:cBhvr>
+                                        <p:cTn id="6" dur="1" fill="hold">
+                                          <p:stCondLst>
+                                            <p:cond delay="0"/>
+                                          </p:stCondLst>
+                                        </p:cTn>
+                                        <p:tgtEl>
+                                          <p:spTgt spid="3">
+                                            <p:txEl>
+                                              <p:pRg st="0" end="0"/>
+                                            </p:txEl>
+                                          </p:spTgt>
+                                        </p:tgtEl>
+                                        <p:attrNameLst>
+                                          <p:attrName>style.visibility</p:attrName>
+                                        </p:attrNameLst>
+                                      </p:cBhvr>
+                                      <p:to>
+                                        <p:strVal val="visible"/>
+                                      </p:to>
+                                    </p:set>
+                                    <p:animEffect transition="in" filter="blinds(horizontal)">
+                                      <p:cBhvr>
+                                        <p:cTn id="7" dur="500"/>
+                                        <p:tgtEl>
+                                          <p:spTgt spid="3">
+                                            <p:txEl>
+                                              <p:pRg st="0" end="0"/>
+                                            </p:txEl>
+                                          </p:spTgt>
+                                        </p:tgtEl>
+                                      </p:cBhvr>
+                                    </p:animEffect>
+                                  </p:childTnLst>
+                                </p:cTn>
+                              </p:par>
+                            </p:childTnLst>
+                          </p:cTn>
+                        </p:par>
+                      </p:childTnLst>
+                    </p:cTn>
+                  </p:par>
+                  <p:par>
+                    <p:cTn id="8" fill="hold">
+                      <p:stCondLst>
+                        <p:cond delay="indefinite"/>
+                      </p:stCondLst>
+                      <p:childTnLst>
+                        <p:par>
+                          <p:cTn id="9" fill="hold">
+                            <p:stCondLst>
+                              <p:cond delay="0"/>
+                            </p:stCondLst>
+                            <p:childTnLst>
+                              <p:par>
+                                <p:cTn id="10" presetID="3" presetClass="entr" presetSubtype="10" fill="hold" nodeType="clickEffect">
+                                  <p:stCondLst>
+                                    <p:cond delay="0"/>
+                                  </p:stCondLst>
+                                  <p:childTnLst>
+                                    <p:set>
+                                      <p:cBhvr>
+                                        <p:cTn id="11" dur="1" fill="hold">
+                                          <p:stCondLst>
+                                            <p:cond delay="0"/>
+                                          </p:stCondLst>
+                                        </p:cTn>
+                                        <p:tgtEl>
+                                          <p:spTgt spid="3">
+                                            <p:txEl>
+                                              <p:pRg st="1" end="1"/>
+                                            </p:txEl>
+                                          </p:spTgt>
+                                        </p:tgtEl>
+                                        <p:attrNameLst>
+                                          <p:attrName>style.visibility</p:attrName>
+                                        </p:attrNameLst>
+                                      </p:cBhvr>
+                                      <p:to>
+                                        <p:strVal val="visible"/>
+                                      </p:to>
+                                    </p:set>
+                                    <p:animEffect transition="in" filter="blinds(horizontal)">
+                                      <p:cBhvr>
+                                        <p:cTn id="12" dur="500"/>
+                                        <p:tgtEl>
+                                          <p:spTgt spid="3">
+                                            <p:txEl>
+                                              <p:pRg st="1" end="1"/>
+                                            </p:txEl>
+                                          </p:spTgt>
+                                        </p:tgtEl>
+                                      </p:cBhvr>
+                                    </p:animEffect>
+                                  </p:childTnLst>
+                                </p:cTn>
+                              </p:par>
+                              <p:par>
+                                <p:cTn id="13" presetID="3" presetClass="entr" presetSubtype="10" fill="hold" nodeType="withEffect">
+                                  <p:stCondLst>
+                                    <p:cond delay="0"/>
+                                  </p:stCondLst>
+                                  <p:childTnLst>
+                                    <p:set>
+                                      <p:cBhvr>
+                                        <p:cTn id="14" dur="1" fill="hold">
+                                          <p:stCondLst>
+                                            <p:cond delay="0"/>
+                                          </p:stCondLst>
+                                        </p:cTn>
+                                        <p:tgtEl>
+                                          <p:spTgt spid="3">
+                                            <p:txEl>
+                                              <p:pRg st="2" end="2"/>
+                                            </p:txEl>
+                                          </p:spTgt>
+                                        </p:tgtEl>
+                                        <p:attrNameLst>
+                                          <p:attrName>style.visibility</p:attrName>
+                                        </p:attrNameLst>
+                                      </p:cBhvr>
+                                      <p:to>
+                                        <p:strVal val="visible"/>
+                                      </p:to>
+                                    </p:set>
+                                    <p:animEffect transition="in" filter="blinds(horizontal)">
+                                      <p:cBhvr>
+                                        <p:cTn id="15" dur="500"/>
+                                        <p:tgtEl>
+                                          <p:spTgt spid="3">
+                                            <p:txEl>
+                                              <p:pRg st="2" end="2"/>
+                                            </p:txEl>
+                                          </p:spTgt>
+                                        </p:tgtEl>
+                                      </p:cBhvr>
+                                    </p:animEffect>
+                                  </p:childTnLst>
+                                </p:cTn>
+                              </p:par>
+                            </p:childTnLst>
+                          </p:cTn>
+                        </p:par>
+                      </p:childTnLst>
+                    </p:cTn>
+                  </p:par>
+                  <p:par>
+                    <p:cTn id="16" fill="hold">
+                      <p:stCondLst>
+                        <p:cond delay="indefinite"/>
+                      </p:stCondLst>
+                      <p:childTnLst>
+                        <p:par>
+                          <p:cTn id="17" fill="hold">
+                            <p:stCondLst>
+                              <p:cond delay="0"/>
+                            </p:stCondLst>
+                            <p:childTnLst>
+                              <p:par>
+                                <p:cTn id="18" presetID="3" presetClass="entr" presetSubtype="10" fill="hold" nodeType="clickEffect">
+                                  <p:stCondLst>
+                                    <p:cond delay="0"/>
+                                  </p:stCondLst>
+                                  <p:childTnLst>
+                                    <p:set>
+                                      <p:cBhvr>
+                                        <p:cTn id="19" dur="1" fill="hold">
+                                          <p:stCondLst>
+                                            <p:cond delay="0"/>
+                                          </p:stCondLst>
+                                        </p:cTn>
+                                        <p:tgtEl>
+                                          <p:spTgt spid="3">
+                                            <p:txEl>
+                                              <p:pRg st="4" end="4"/>
+                                            </p:txEl>
+                                          </p:spTgt>
+                                        </p:tgtEl>
+                                        <p:attrNameLst>
+                                          <p:attrName>style.visibility</p:attrName>
+                                        </p:attrNameLst>
+                                      </p:cBhvr>
+                                      <p:to>
+                                        <p:strVal val="visible"/>
+                                      </p:to>
+                                    </p:set>
+                                    <p:animEffect transition="in" filter="blinds(horizontal)">
+                                      <p:cBhvr>
+                                        <p:cTn id="20" dur="500"/>
+                                        <p:tgtEl>
+                                          <p:spTgt spid="3">
+                                            <p:txEl>
+                                              <p:pRg st="4" end="4"/>
+                                            </p:txEl>
+                                          </p:spTgt>
+                                        </p:tgtEl>
+                                      </p:cBhvr>
+                                    </p:animEffect>
+                                  </p:childTnLst>
+                                </p:cTn>
+                              </p:par>
+                            </p:childTnLst>
+                          </p:cTn>
+                        </p:par>
+                      </p:childTnLst>
+                    </p:cTn>
+                  </p:par>
+                </p:childTnLst>
+              </p:cTn>
+              <p:prevCondLst>
+                <p:cond evt="onPrev" delay="0">
+                  <p:tgtEl>
+                    <p:sldTgt/>
+                  </p:tgtEl>
+                </p:cond>
+              </p:prevCondLst>
+              <p:nextCondLst>
+                <p:cond evt="onNext" delay="0">
+                  <p:tgtEl>
+                    <p:sldTgt/>
+                  </p:tgtEl>
+                </p:cond>
+              </p:nextCondLst>
+            </p:seq>
+          </p:childTnLst>
+        </p:cTn>
       </p:par>
     </p:tnLst>
   </p:timing>

</xml_diff>

<commit_message>
Finalizing the stuffs for session.
</commit_message>
<xml_diff>
--- a/MongoDB Tips and Advance Features.pptx
+++ b/MongoDB Tips and Advance Features.pptx
@@ -208,7 +208,7 @@
             <a:fld id="{98D74999-3FB0-41B5-A976-1179E7AAE147}" type="datetimeFigureOut">
               <a:rPr lang="en-US" smtClean="0"/>
               <a:pPr/>
-              <a:t>6/22/2016</a:t>
+              <a:t>6/23/2016</a:t>
             </a:fld>
             <a:endParaRPr lang="en-US"/>
           </a:p>
@@ -592,16 +592,16 @@
               <a:t>- With this session, I have tried to showcase few of the </a:t>
             </a:r>
             <a:r>
-              <a:rPr lang="en-US" sz="1200" dirty="0" err="1" smtClean="0">
-                <a:latin typeface="Arial"/>
-              </a:rPr>
-              <a:t>learnings</a:t>
-            </a:r>
-            <a:r>
               <a:rPr lang="en-US" sz="1200" dirty="0" smtClean="0">
                 <a:latin typeface="Arial"/>
               </a:rPr>
-              <a:t> from my experience</a:t>
+              <a:t>learning </a:t>
+            </a:r>
+            <a:r>
+              <a:rPr lang="en-US" sz="1200" dirty="0" smtClean="0">
+                <a:latin typeface="Arial"/>
+              </a:rPr>
+              <a:t>from my experience</a:t>
             </a:r>
           </a:p>
           <a:p>
@@ -2218,9 +2218,6 @@
               </a:rPr>
               <a:t> Assignment 1: Make a small UI, only the login page and welcome page. Start a session, the session should timeout in 1 min. If you reload the login page after 1 min, the session should timeout</a:t>
             </a:r>
-            <a:endParaRPr lang="en-US" sz="1200" dirty="0" smtClean="0">
-              <a:latin typeface="Arial"/>
-            </a:endParaRPr>
           </a:p>
         </p:txBody>
       </p:sp>
@@ -2799,7 +2796,7 @@
             <a:fld id="{A01F82C3-8254-49B4-9F12-D391F85377D6}" type="datetime1">
               <a:rPr lang="en-US" smtClean="0"/>
               <a:pPr/>
-              <a:t>6/22/2016</a:t>
+              <a:t>6/23/2016</a:t>
             </a:fld>
             <a:endParaRPr lang="en-US"/>
           </a:p>
@@ -2975,7 +2972,7 @@
             <a:fld id="{F43E83A3-7EB3-47B6-8E06-C73B8D775CFE}" type="datetime1">
               <a:rPr lang="en-US" smtClean="0"/>
               <a:pPr/>
-              <a:t>6/22/2016</a:t>
+              <a:t>6/23/2016</a:t>
             </a:fld>
             <a:endParaRPr lang="en-US"/>
           </a:p>
@@ -3161,7 +3158,7 @@
             <a:fld id="{8C0F1ADD-78EB-420C-887A-43B847F3E662}" type="datetime1">
               <a:rPr lang="en-US" smtClean="0"/>
               <a:pPr/>
-              <a:t>6/22/2016</a:t>
+              <a:t>6/23/2016</a:t>
             </a:fld>
             <a:endParaRPr lang="en-US"/>
           </a:p>
@@ -3341,7 +3338,7 @@
             <a:fld id="{D5A1C4F2-DAB4-4DBC-9B67-4145EB5CA6F4}" type="datetime1">
               <a:rPr lang="en-US" smtClean="0"/>
               <a:pPr/>
-              <a:t>6/22/2016</a:t>
+              <a:t>6/23/2016</a:t>
             </a:fld>
             <a:endParaRPr lang="en-US"/>
           </a:p>
@@ -3597,7 +3594,7 @@
             <a:fld id="{33CE4B79-AE2B-4454-B439-C180733E9D5A}" type="datetime1">
               <a:rPr lang="en-US" smtClean="0"/>
               <a:pPr/>
-              <a:t>6/22/2016</a:t>
+              <a:t>6/23/2016</a:t>
             </a:fld>
             <a:endParaRPr lang="en-US"/>
           </a:p>
@@ -3891,7 +3888,7 @@
             <a:fld id="{C34ECCE5-A5FB-49AD-B868-93CE599E66C4}" type="datetime1">
               <a:rPr lang="en-US" smtClean="0"/>
               <a:pPr/>
-              <a:t>6/22/2016</a:t>
+              <a:t>6/23/2016</a:t>
             </a:fld>
             <a:endParaRPr lang="en-US"/>
           </a:p>
@@ -4319,7 +4316,7 @@
             <a:fld id="{9C46C979-9F1A-4C9E-8EA4-C47A92B86ED3}" type="datetime1">
               <a:rPr lang="en-US" smtClean="0"/>
               <a:pPr/>
-              <a:t>6/22/2016</a:t>
+              <a:t>6/23/2016</a:t>
             </a:fld>
             <a:endParaRPr lang="en-US"/>
           </a:p>
@@ -4443,7 +4440,7 @@
             <a:fld id="{0DAA53D1-166E-4400-8CBD-FCE51C76C295}" type="datetime1">
               <a:rPr lang="en-US" smtClean="0"/>
               <a:pPr/>
-              <a:t>6/22/2016</a:t>
+              <a:t>6/23/2016</a:t>
             </a:fld>
             <a:endParaRPr lang="en-US"/>
           </a:p>
@@ -4544,7 +4541,7 @@
             <a:fld id="{36244870-D467-4A94-A60C-F9FE831D86ED}" type="datetime1">
               <a:rPr lang="en-US" smtClean="0"/>
               <a:pPr/>
-              <a:t>6/22/2016</a:t>
+              <a:t>6/23/2016</a:t>
             </a:fld>
             <a:endParaRPr lang="en-US"/>
           </a:p>
@@ -4827,7 +4824,7 @@
             <a:fld id="{2D84076B-22E6-4449-90CE-41F45A35B239}" type="datetime1">
               <a:rPr lang="en-US" smtClean="0"/>
               <a:pPr/>
-              <a:t>6/22/2016</a:t>
+              <a:t>6/23/2016</a:t>
             </a:fld>
             <a:endParaRPr lang="en-US"/>
           </a:p>
@@ -5086,7 +5083,7 @@
             <a:fld id="{07283709-4875-4598-BA8B-768670B3A710}" type="datetime1">
               <a:rPr lang="en-US" smtClean="0"/>
               <a:pPr/>
-              <a:t>6/22/2016</a:t>
+              <a:t>6/23/2016</a:t>
             </a:fld>
             <a:endParaRPr lang="en-US"/>
           </a:p>
@@ -5305,7 +5302,7 @@
             <a:fld id="{11FC054B-F4C2-4768-9E97-52376EF3930F}" type="datetime1">
               <a:rPr lang="en-US" smtClean="0"/>
               <a:pPr/>
-              <a:t>6/22/2016</a:t>
+              <a:t>6/23/2016</a:t>
             </a:fld>
             <a:endParaRPr lang="en-US"/>
           </a:p>
@@ -5873,7 +5870,7 @@
         </p:blipFill>
         <p:spPr bwMode="auto">
           <a:xfrm>
-            <a:off x="0" y="1828800"/>
+            <a:off x="76200" y="1828800"/>
             <a:ext cx="1524000" cy="1877544"/>
           </a:xfrm>
           <a:prstGeom prst="rect">
@@ -5899,7 +5896,7 @@
         </p:blipFill>
         <p:spPr bwMode="auto">
           <a:xfrm>
-            <a:off x="7543800" y="1828800"/>
+            <a:off x="7620000" y="1828800"/>
             <a:ext cx="1524000" cy="1877544"/>
           </a:xfrm>
           <a:prstGeom prst="rect">
@@ -5983,13 +5980,8 @@
           <a:p>
             <a:r>
               <a:rPr lang="en-US" dirty="0" smtClean="0"/>
-              <a:t>Remember the question we asked about document size being  </a:t>
-            </a:r>
-            <a:r>
-              <a:rPr lang="en-US" dirty="0" smtClean="0"/>
-              <a:t>&gt;16MB</a:t>
-            </a:r>
-            <a:endParaRPr lang="en-US" dirty="0" smtClean="0"/>
+              <a:t>Remember the question we asked about document size being  &gt;16MB</a:t>
+            </a:r>
           </a:p>
           <a:p>
             <a:pPr>
@@ -8396,435 +8388,7 @@
   <p:timing>
     <p:tnLst>
       <p:par>
-        <p:cTn id="1" dur="indefinite" restart="never" nodeType="tmRoot">
-          <p:childTnLst>
-            <p:seq concurrent="1" nextAc="seek">
-              <p:cTn id="2" dur="indefinite" nodeType="mainSeq">
-                <p:childTnLst>
-                  <p:par>
-                    <p:cTn id="3" fill="hold">
-                      <p:stCondLst>
-                        <p:cond delay="indefinite"/>
-                      </p:stCondLst>
-                      <p:childTnLst>
-                        <p:par>
-                          <p:cTn id="4" fill="hold">
-                            <p:stCondLst>
-                              <p:cond delay="0"/>
-                            </p:stCondLst>
-                            <p:childTnLst>
-                              <p:par>
-                                <p:cTn id="5" presetID="3" presetClass="entr" presetSubtype="10" fill="hold" nodeType="clickEffect">
-                                  <p:stCondLst>
-                                    <p:cond delay="0"/>
-                                  </p:stCondLst>
-                                  <p:childTnLst>
-                                    <p:set>
-                                      <p:cBhvr>
-                                        <p:cTn id="6" dur="1" fill="hold">
-                                          <p:stCondLst>
-                                            <p:cond delay="0"/>
-                                          </p:stCondLst>
-                                        </p:cTn>
-                                        <p:tgtEl>
-                                          <p:spTgt spid="3">
-                                            <p:txEl>
-                                              <p:pRg st="0" end="0"/>
-                                            </p:txEl>
-                                          </p:spTgt>
-                                        </p:tgtEl>
-                                        <p:attrNameLst>
-                                          <p:attrName>style.visibility</p:attrName>
-                                        </p:attrNameLst>
-                                      </p:cBhvr>
-                                      <p:to>
-                                        <p:strVal val="visible"/>
-                                      </p:to>
-                                    </p:set>
-                                    <p:animEffect transition="in" filter="blinds(horizontal)">
-                                      <p:cBhvr>
-                                        <p:cTn id="7" dur="500"/>
-                                        <p:tgtEl>
-                                          <p:spTgt spid="3">
-                                            <p:txEl>
-                                              <p:pRg st="0" end="0"/>
-                                            </p:txEl>
-                                          </p:spTgt>
-                                        </p:tgtEl>
-                                      </p:cBhvr>
-                                    </p:animEffect>
-                                  </p:childTnLst>
-                                </p:cTn>
-                              </p:par>
-                              <p:par>
-                                <p:cTn id="8" presetID="3" presetClass="entr" presetSubtype="10" fill="hold" nodeType="withEffect">
-                                  <p:stCondLst>
-                                    <p:cond delay="0"/>
-                                  </p:stCondLst>
-                                  <p:childTnLst>
-                                    <p:set>
-                                      <p:cBhvr>
-                                        <p:cTn id="9" dur="1" fill="hold">
-                                          <p:stCondLst>
-                                            <p:cond delay="0"/>
-                                          </p:stCondLst>
-                                        </p:cTn>
-                                        <p:tgtEl>
-                                          <p:spTgt spid="3">
-                                            <p:txEl>
-                                              <p:pRg st="1" end="1"/>
-                                            </p:txEl>
-                                          </p:spTgt>
-                                        </p:tgtEl>
-                                        <p:attrNameLst>
-                                          <p:attrName>style.visibility</p:attrName>
-                                        </p:attrNameLst>
-                                      </p:cBhvr>
-                                      <p:to>
-                                        <p:strVal val="visible"/>
-                                      </p:to>
-                                    </p:set>
-                                    <p:animEffect transition="in" filter="blinds(horizontal)">
-                                      <p:cBhvr>
-                                        <p:cTn id="10" dur="500"/>
-                                        <p:tgtEl>
-                                          <p:spTgt spid="3">
-                                            <p:txEl>
-                                              <p:pRg st="1" end="1"/>
-                                            </p:txEl>
-                                          </p:spTgt>
-                                        </p:tgtEl>
-                                      </p:cBhvr>
-                                    </p:animEffect>
-                                  </p:childTnLst>
-                                </p:cTn>
-                              </p:par>
-                              <p:par>
-                                <p:cTn id="11" presetID="3" presetClass="entr" presetSubtype="10" fill="hold" nodeType="withEffect">
-                                  <p:stCondLst>
-                                    <p:cond delay="0"/>
-                                  </p:stCondLst>
-                                  <p:childTnLst>
-                                    <p:set>
-                                      <p:cBhvr>
-                                        <p:cTn id="12" dur="1" fill="hold">
-                                          <p:stCondLst>
-                                            <p:cond delay="0"/>
-                                          </p:stCondLst>
-                                        </p:cTn>
-                                        <p:tgtEl>
-                                          <p:spTgt spid="3">
-                                            <p:txEl>
-                                              <p:pRg st="2" end="2"/>
-                                            </p:txEl>
-                                          </p:spTgt>
-                                        </p:tgtEl>
-                                        <p:attrNameLst>
-                                          <p:attrName>style.visibility</p:attrName>
-                                        </p:attrNameLst>
-                                      </p:cBhvr>
-                                      <p:to>
-                                        <p:strVal val="visible"/>
-                                      </p:to>
-                                    </p:set>
-                                    <p:animEffect transition="in" filter="blinds(horizontal)">
-                                      <p:cBhvr>
-                                        <p:cTn id="13" dur="500"/>
-                                        <p:tgtEl>
-                                          <p:spTgt spid="3">
-                                            <p:txEl>
-                                              <p:pRg st="2" end="2"/>
-                                            </p:txEl>
-                                          </p:spTgt>
-                                        </p:tgtEl>
-                                      </p:cBhvr>
-                                    </p:animEffect>
-                                  </p:childTnLst>
-                                </p:cTn>
-                              </p:par>
-                              <p:par>
-                                <p:cTn id="14" presetID="3" presetClass="entr" presetSubtype="10" fill="hold" nodeType="withEffect">
-                                  <p:stCondLst>
-                                    <p:cond delay="0"/>
-                                  </p:stCondLst>
-                                  <p:childTnLst>
-                                    <p:set>
-                                      <p:cBhvr>
-                                        <p:cTn id="15" dur="1" fill="hold">
-                                          <p:stCondLst>
-                                            <p:cond delay="0"/>
-                                          </p:stCondLst>
-                                        </p:cTn>
-                                        <p:tgtEl>
-                                          <p:spTgt spid="3">
-                                            <p:txEl>
-                                              <p:pRg st="4" end="4"/>
-                                            </p:txEl>
-                                          </p:spTgt>
-                                        </p:tgtEl>
-                                        <p:attrNameLst>
-                                          <p:attrName>style.visibility</p:attrName>
-                                        </p:attrNameLst>
-                                      </p:cBhvr>
-                                      <p:to>
-                                        <p:strVal val="visible"/>
-                                      </p:to>
-                                    </p:set>
-                                    <p:animEffect transition="in" filter="blinds(horizontal)">
-                                      <p:cBhvr>
-                                        <p:cTn id="16" dur="500"/>
-                                        <p:tgtEl>
-                                          <p:spTgt spid="3">
-                                            <p:txEl>
-                                              <p:pRg st="4" end="4"/>
-                                            </p:txEl>
-                                          </p:spTgt>
-                                        </p:tgtEl>
-                                      </p:cBhvr>
-                                    </p:animEffect>
-                                  </p:childTnLst>
-                                </p:cTn>
-                              </p:par>
-                              <p:par>
-                                <p:cTn id="17" presetID="3" presetClass="entr" presetSubtype="10" fill="hold" nodeType="withEffect">
-                                  <p:stCondLst>
-                                    <p:cond delay="0"/>
-                                  </p:stCondLst>
-                                  <p:childTnLst>
-                                    <p:set>
-                                      <p:cBhvr>
-                                        <p:cTn id="18" dur="1" fill="hold">
-                                          <p:stCondLst>
-                                            <p:cond delay="0"/>
-                                          </p:stCondLst>
-                                        </p:cTn>
-                                        <p:tgtEl>
-                                          <p:spTgt spid="3">
-                                            <p:txEl>
-                                              <p:pRg st="5" end="5"/>
-                                            </p:txEl>
-                                          </p:spTgt>
-                                        </p:tgtEl>
-                                        <p:attrNameLst>
-                                          <p:attrName>style.visibility</p:attrName>
-                                        </p:attrNameLst>
-                                      </p:cBhvr>
-                                      <p:to>
-                                        <p:strVal val="visible"/>
-                                      </p:to>
-                                    </p:set>
-                                    <p:animEffect transition="in" filter="blinds(horizontal)">
-                                      <p:cBhvr>
-                                        <p:cTn id="19" dur="500"/>
-                                        <p:tgtEl>
-                                          <p:spTgt spid="3">
-                                            <p:txEl>
-                                              <p:pRg st="5" end="5"/>
-                                            </p:txEl>
-                                          </p:spTgt>
-                                        </p:tgtEl>
-                                      </p:cBhvr>
-                                    </p:animEffect>
-                                  </p:childTnLst>
-                                </p:cTn>
-                              </p:par>
-                              <p:par>
-                                <p:cTn id="20" presetID="3" presetClass="entr" presetSubtype="10" fill="hold" nodeType="withEffect">
-                                  <p:stCondLst>
-                                    <p:cond delay="0"/>
-                                  </p:stCondLst>
-                                  <p:childTnLst>
-                                    <p:set>
-                                      <p:cBhvr>
-                                        <p:cTn id="21" dur="1" fill="hold">
-                                          <p:stCondLst>
-                                            <p:cond delay="0"/>
-                                          </p:stCondLst>
-                                        </p:cTn>
-                                        <p:tgtEl>
-                                          <p:spTgt spid="3">
-                                            <p:txEl>
-                                              <p:pRg st="6" end="6"/>
-                                            </p:txEl>
-                                          </p:spTgt>
-                                        </p:tgtEl>
-                                        <p:attrNameLst>
-                                          <p:attrName>style.visibility</p:attrName>
-                                        </p:attrNameLst>
-                                      </p:cBhvr>
-                                      <p:to>
-                                        <p:strVal val="visible"/>
-                                      </p:to>
-                                    </p:set>
-                                    <p:animEffect transition="in" filter="blinds(horizontal)">
-                                      <p:cBhvr>
-                                        <p:cTn id="22" dur="500"/>
-                                        <p:tgtEl>
-                                          <p:spTgt spid="3">
-                                            <p:txEl>
-                                              <p:pRg st="6" end="6"/>
-                                            </p:txEl>
-                                          </p:spTgt>
-                                        </p:tgtEl>
-                                      </p:cBhvr>
-                                    </p:animEffect>
-                                  </p:childTnLst>
-                                </p:cTn>
-                              </p:par>
-                              <p:par>
-                                <p:cTn id="23" presetID="3" presetClass="entr" presetSubtype="10" fill="hold" nodeType="withEffect">
-                                  <p:stCondLst>
-                                    <p:cond delay="0"/>
-                                  </p:stCondLst>
-                                  <p:childTnLst>
-                                    <p:set>
-                                      <p:cBhvr>
-                                        <p:cTn id="24" dur="1" fill="hold">
-                                          <p:stCondLst>
-                                            <p:cond delay="0"/>
-                                          </p:stCondLst>
-                                        </p:cTn>
-                                        <p:tgtEl>
-                                          <p:spTgt spid="3">
-                                            <p:txEl>
-                                              <p:pRg st="7" end="7"/>
-                                            </p:txEl>
-                                          </p:spTgt>
-                                        </p:tgtEl>
-                                        <p:attrNameLst>
-                                          <p:attrName>style.visibility</p:attrName>
-                                        </p:attrNameLst>
-                                      </p:cBhvr>
-                                      <p:to>
-                                        <p:strVal val="visible"/>
-                                      </p:to>
-                                    </p:set>
-                                    <p:animEffect transition="in" filter="blinds(horizontal)">
-                                      <p:cBhvr>
-                                        <p:cTn id="25" dur="500"/>
-                                        <p:tgtEl>
-                                          <p:spTgt spid="3">
-                                            <p:txEl>
-                                              <p:pRg st="7" end="7"/>
-                                            </p:txEl>
-                                          </p:spTgt>
-                                        </p:tgtEl>
-                                      </p:cBhvr>
-                                    </p:animEffect>
-                                  </p:childTnLst>
-                                </p:cTn>
-                              </p:par>
-                              <p:par>
-                                <p:cTn id="26" presetID="3" presetClass="entr" presetSubtype="10" fill="hold" nodeType="withEffect">
-                                  <p:stCondLst>
-                                    <p:cond delay="0"/>
-                                  </p:stCondLst>
-                                  <p:childTnLst>
-                                    <p:set>
-                                      <p:cBhvr>
-                                        <p:cTn id="27" dur="1" fill="hold">
-                                          <p:stCondLst>
-                                            <p:cond delay="0"/>
-                                          </p:stCondLst>
-                                        </p:cTn>
-                                        <p:tgtEl>
-                                          <p:spTgt spid="3">
-                                            <p:txEl>
-                                              <p:pRg st="8" end="8"/>
-                                            </p:txEl>
-                                          </p:spTgt>
-                                        </p:tgtEl>
-                                        <p:attrNameLst>
-                                          <p:attrName>style.visibility</p:attrName>
-                                        </p:attrNameLst>
-                                      </p:cBhvr>
-                                      <p:to>
-                                        <p:strVal val="visible"/>
-                                      </p:to>
-                                    </p:set>
-                                    <p:animEffect transition="in" filter="blinds(horizontal)">
-                                      <p:cBhvr>
-                                        <p:cTn id="28" dur="500"/>
-                                        <p:tgtEl>
-                                          <p:spTgt spid="3">
-                                            <p:txEl>
-                                              <p:pRg st="8" end="8"/>
-                                            </p:txEl>
-                                          </p:spTgt>
-                                        </p:tgtEl>
-                                      </p:cBhvr>
-                                    </p:animEffect>
-                                  </p:childTnLst>
-                                </p:cTn>
-                              </p:par>
-                              <p:par>
-                                <p:cTn id="29" presetID="3" presetClass="entr" presetSubtype="10" fill="hold" nodeType="withEffect">
-                                  <p:stCondLst>
-                                    <p:cond delay="0"/>
-                                  </p:stCondLst>
-                                  <p:childTnLst>
-                                    <p:set>
-                                      <p:cBhvr>
-                                        <p:cTn id="30" dur="1" fill="hold">
-                                          <p:stCondLst>
-                                            <p:cond delay="0"/>
-                                          </p:stCondLst>
-                                        </p:cTn>
-                                        <p:tgtEl>
-                                          <p:spTgt spid="3">
-                                            <p:txEl>
-                                              <p:pRg st="10" end="10"/>
-                                            </p:txEl>
-                                          </p:spTgt>
-                                        </p:tgtEl>
-                                        <p:attrNameLst>
-                                          <p:attrName>style.visibility</p:attrName>
-                                        </p:attrNameLst>
-                                      </p:cBhvr>
-                                      <p:to>
-                                        <p:strVal val="visible"/>
-                                      </p:to>
-                                    </p:set>
-                                    <p:animEffect transition="in" filter="blinds(horizontal)">
-                                      <p:cBhvr>
-                                        <p:cTn id="31" dur="500"/>
-                                        <p:tgtEl>
-                                          <p:spTgt spid="3">
-                                            <p:txEl>
-                                              <p:pRg st="10" end="10"/>
-                                            </p:txEl>
-                                          </p:spTgt>
-                                        </p:tgtEl>
-                                      </p:cBhvr>
-                                    </p:animEffect>
-                                  </p:childTnLst>
-                                </p:cTn>
-                              </p:par>
-                            </p:childTnLst>
-                          </p:cTn>
-                        </p:par>
-                      </p:childTnLst>
-                    </p:cTn>
-                  </p:par>
-                </p:childTnLst>
-              </p:cTn>
-              <p:prevCondLst>
-                <p:cond evt="onPrev" delay="0">
-                  <p:tgtEl>
-                    <p:sldTgt/>
-                  </p:tgtEl>
-                </p:cond>
-              </p:prevCondLst>
-              <p:nextCondLst>
-                <p:cond evt="onNext" delay="0">
-                  <p:tgtEl>
-                    <p:sldTgt/>
-                  </p:tgtEl>
-                </p:cond>
-              </p:nextCondLst>
-            </p:seq>
-          </p:childTnLst>
-        </p:cTn>
+        <p:cTn id="1" dur="indefinite" restart="never" nodeType="tmRoot"/>
       </p:par>
     </p:tnLst>
   </p:timing>
@@ -9850,7 +9414,7 @@
           <a:p>
             <a:r>
               <a:rPr lang="en-IN" dirty="0" smtClean="0"/>
-              <a:t>On p2 collection, update the std to 10 for records &gt;85</a:t>
+              <a:t>On p2 collection, update the std to 10 for records &gt;=85</a:t>
             </a:r>
           </a:p>
           <a:p>
@@ -11353,7 +10917,7 @@
             <a:pPr lvl="1"/>
             <a:r>
               <a:rPr lang="en-IN" sz="2400" dirty="0" smtClean="0"/>
-              <a:t>Just increase counter of for loop 10000 -&gt; 100000</a:t>
+              <a:t>Just increase counter of the loop from 10000 -&gt; 100000</a:t>
             </a:r>
           </a:p>
           <a:p>
@@ -12023,7 +11587,7 @@
             </a:r>
             <a:r>
               <a:rPr lang="en-IN" sz="2200" dirty="0" smtClean="0"/>
-              <a:t>What will happen when you are updating and read request comes for the records which are getting updated?</a:t>
+              <a:t>What will happen when you are updating and read request comes for the records which are getting updated(Dirty Read Problem)?</a:t>
             </a:r>
           </a:p>
           <a:p>
@@ -12064,7 +11628,7 @@
                   <a:srgbClr val="0000FF"/>
                 </a:solidFill>
               </a:rPr>
-              <a:t>: 1}, {multi: true}}</a:t>
+              <a:t>: 1}, {multi: true});</a:t>
             </a:r>
             <a:endParaRPr lang="en-IN" sz="2400" dirty="0" smtClean="0">
               <a:solidFill>
@@ -12094,15 +11658,7 @@
                   <a:srgbClr val="0000FF"/>
                 </a:solidFill>
               </a:rPr>
-              <a:t>({$isolated : 1}}, </a:t>
-            </a:r>
-            <a:r>
-              <a:rPr lang="en-IN" sz="2400" i="1" dirty="0" smtClean="0">
-                <a:solidFill>
-                  <a:srgbClr val="0000FF"/>
-                </a:solidFill>
-              </a:rPr>
-              <a:t>{$set: {</a:t>
+              <a:t>({$isolated : 1}}, {$set: {</a:t>
             </a:r>
             <a:r>
               <a:rPr lang="en-IN" sz="2400" i="1" dirty="0" err="1" smtClean="0">
@@ -12118,7 +11674,15 @@
                   <a:srgbClr val="0000FF"/>
                 </a:solidFill>
               </a:rPr>
-              <a:t>: 2}, {multi: true}}</a:t>
+              <a:t>: 2}, {multi: </a:t>
+            </a:r>
+            <a:r>
+              <a:rPr lang="en-IN" sz="2400" i="1" smtClean="0">
+                <a:solidFill>
+                  <a:srgbClr val="0000FF"/>
+                </a:solidFill>
+              </a:rPr>
+              <a:t>true})</a:t>
             </a:r>
             <a:endParaRPr lang="en-US" sz="2400" i="1" dirty="0">
               <a:solidFill>
@@ -12585,7 +12149,7 @@
         <p:spPr/>
         <p:txBody>
           <a:bodyPr>
-            <a:normAutofit fontScale="92500" lnSpcReduction="20000"/>
+            <a:normAutofit fontScale="85000" lnSpcReduction="20000"/>
           </a:bodyPr>
           <a:lstStyle/>
           <a:p>
@@ -12603,7 +12167,15 @@
             </a:pPr>
             <a:r>
               <a:rPr lang="en-IN" sz="2800" dirty="0" smtClean="0"/>
-              <a:t>	In our application, we had UI where we had to show the flight details. How could we limit this?</a:t>
+              <a:t>	In our application, we had UI where we had to show all the flights in the schedule. But, user could not see all the flights in one page view; so, there was a scope of </a:t>
+            </a:r>
+            <a:r>
+              <a:rPr lang="en-IN" sz="2800" dirty="0" smtClean="0"/>
+              <a:t>improvisation</a:t>
+            </a:r>
+            <a:r>
+              <a:rPr lang="en-IN" sz="2800" dirty="0" smtClean="0"/>
+              <a:t>.</a:t>
             </a:r>
           </a:p>
           <a:p>

</xml_diff>